<commit_message>
Update to Teck Stack used. Update to DB to include isDeleted field to solft delete data
</commit_message>
<xml_diff>
--- a/Docs/Arquitetura_Sistema_de_Informação.pptx
+++ b/Docs/Arquitetura_Sistema_de_Informação.pptx
@@ -5,11 +5,12 @@
     <p:sldMasterId id="2147483648" r:id="rId1"/>
   </p:sldMasterIdLst>
   <p:notesMasterIdLst>
-    <p:notesMasterId r:id="rId6"/>
+    <p:notesMasterId r:id="rId7"/>
   </p:notesMasterIdLst>
   <p:sldIdLst>
     <p:sldId id="256" r:id="rId4"/>
     <p:sldId id="257" r:id="rId5"/>
+    <p:sldId id="258" r:id="rId6"/>
   </p:sldIdLst>
   <p:sldSz cx="12192000" cy="6858000"/>
   <p:notesSz cx="6858000" cy="9144000"/>
@@ -135,7 +136,7 @@
       </p:grpSpPr>
       <p:sp>
         <p:nvSpPr>
-          <p:cNvPr id="2047476099" name="Espaço reservado para o cabeçalho 1"/>
+          <p:cNvPr id="2102708833" name="Espaço reservado para o cabeçalho 1"/>
           <p:cNvSpPr>
             <a:spLocks noGrp="1"/>
           </p:cNvSpPr>
@@ -169,7 +170,7 @@
       </p:sp>
       <p:sp>
         <p:nvSpPr>
-          <p:cNvPr id="280863637" name="Espaço reservado para a data 2"/>
+          <p:cNvPr id="952804024" name="Espaço reservado para a data 2"/>
           <p:cNvSpPr>
             <a:spLocks noGrp="1"/>
           </p:cNvSpPr>
@@ -207,7 +208,7 @@
       </p:sp>
       <p:sp>
         <p:nvSpPr>
-          <p:cNvPr id="1111001905" name="Espaço reservado para imagem de diapositivo 3"/>
+          <p:cNvPr id="609643619" name="Espaço reservado para imagem de diapositivo 3"/>
           <p:cNvSpPr>
             <a:spLocks noChangeAspect="1" noGrp="1" noRot="1"/>
           </p:cNvSpPr>
@@ -243,7 +244,7 @@
       </p:sp>
       <p:sp>
         <p:nvSpPr>
-          <p:cNvPr id="853624061" name="Espaço reservado às notas 4"/>
+          <p:cNvPr id="509105657" name="Espaço reservado às notas 4"/>
           <p:cNvSpPr>
             <a:spLocks noGrp="1"/>
           </p:cNvSpPr>
@@ -317,7 +318,7 @@
       </p:sp>
       <p:sp>
         <p:nvSpPr>
-          <p:cNvPr id="1956933935" name="Espaço reservado ao rodapé 5"/>
+          <p:cNvPr id="1127370916" name="Espaço reservado ao rodapé 5"/>
           <p:cNvSpPr>
             <a:spLocks noGrp="1"/>
           </p:cNvSpPr>
@@ -351,7 +352,7 @@
       </p:sp>
       <p:sp>
         <p:nvSpPr>
-          <p:cNvPr id="102403820" name="Espaço reservado para o número do diapositivo 6"/>
+          <p:cNvPr id="929087290" name="Espaço reservado para o número do diapositivo 6"/>
           <p:cNvSpPr>
             <a:spLocks noGrp="1"/>
           </p:cNvSpPr>
@@ -504,7 +505,7 @@
       </p:grpSpPr>
       <p:sp>
         <p:nvSpPr>
-          <p:cNvPr id="1156912785" name="Espaço reservado para imagem de diapositivo 1"/>
+          <p:cNvPr id="1786225275" name="Espaço reservado para imagem de diapositivo 1"/>
           <p:cNvSpPr>
             <a:spLocks noChangeAspect="1" noGrp="1" noRot="1"/>
           </p:cNvSpPr>
@@ -521,7 +522,7 @@
       </p:sp>
       <p:sp>
         <p:nvSpPr>
-          <p:cNvPr id="349111405" name="Notes Placeholder 2"/>
+          <p:cNvPr id="1585715240" name="Notes Placeholder 2"/>
           <p:cNvSpPr>
             <a:spLocks noGrp="1"/>
           </p:cNvSpPr>
@@ -546,7 +547,7 @@
       </p:sp>
       <p:sp>
         <p:nvSpPr>
-          <p:cNvPr id="1420492754" name="Slide Number Placeholder 3"/>
+          <p:cNvPr id="869189810" name="Slide Number Placeholder 3"/>
           <p:cNvSpPr>
             <a:spLocks noGrp="1"/>
           </p:cNvSpPr>
@@ -594,7 +595,7 @@
       </p:grpSpPr>
       <p:sp>
         <p:nvSpPr>
-          <p:cNvPr id="293516959" name="Espaço reservado para imagem de diapositivo 1"/>
+          <p:cNvPr id="1556723322" name="Espaço reservado para imagem de diapositivo 1"/>
           <p:cNvSpPr>
             <a:spLocks noChangeAspect="1" noGrp="1" noRot="1"/>
           </p:cNvSpPr>
@@ -611,7 +612,7 @@
       </p:sp>
       <p:sp>
         <p:nvSpPr>
-          <p:cNvPr id="1130857944" name="Notes Placeholder 2"/>
+          <p:cNvPr id="899137233" name="Notes Placeholder 2"/>
           <p:cNvSpPr>
             <a:spLocks noGrp="1"/>
           </p:cNvSpPr>
@@ -636,7 +637,97 @@
       </p:sp>
       <p:sp>
         <p:nvSpPr>
-          <p:cNvPr id="1634342644" name="Slide Number Placeholder 3"/>
+          <p:cNvPr id="335647341" name="Slide Number Placeholder 3"/>
+          <p:cNvSpPr>
+            <a:spLocks noGrp="1"/>
+          </p:cNvSpPr>
+          <p:nvPr>
+            <p:ph type="sldNum" sz="quarter" idx="10"/>
+          </p:nvPr>
+        </p:nvSpPr>
+        <p:spPr bwMode="auto"/>
+        <p:txBody>
+          <a:bodyPr/>
+          <a:lstStyle/>
+          <a:p>
+            <a:pPr>
+              <a:defRPr/>
+            </a:pPr>
+            <a:fld id="{6DDAD37F-3C27-3219-2F78-1C91AC7F2F54}" type="slidenum">
+              <a:rPr lang="pt-PT"/>
+              <a:t/>
+            </a:fld>
+            <a:endParaRPr lang="pt-PT"/>
+          </a:p>
+        </p:txBody>
+      </p:sp>
+    </p:spTree>
+  </p:cSld>
+</p:notes>
+</file>
+
+<file path=ppt/notesSlides/notesSlide3.xml><?xml version="1.0" encoding="utf-8"?>
+<p:notes xmlns:a="http://schemas.openxmlformats.org/drawingml/2006/main" xmlns:r="http://schemas.openxmlformats.org/officeDocument/2006/relationships" xmlns:p="http://schemas.openxmlformats.org/presentationml/2006/main" xmlns:m="http://schemas.openxmlformats.org/officeDocument/2006/math" xmlns:w="http://schemas.openxmlformats.org/wordprocessingml/2006/main">
+  <p:cSld name="">
+    <p:spTree>
+      <p:nvGrpSpPr>
+        <p:cNvPr id="1" name=""/>
+        <p:cNvGrpSpPr/>
+        <p:nvPr/>
+      </p:nvGrpSpPr>
+      <p:grpSpPr bwMode="auto">
+        <a:xfrm>
+          <a:off x="0" y="0"/>
+          <a:ext cx="0" cy="0"/>
+          <a:chOff x="0" y="0"/>
+          <a:chExt cx="0" cy="0"/>
+        </a:xfrm>
+      </p:grpSpPr>
+      <p:sp>
+        <p:nvSpPr>
+          <p:cNvPr id="1884855941" name="Espaço reservado para imagem de diapositivo 1"/>
+          <p:cNvSpPr>
+            <a:spLocks noChangeAspect="1" noGrp="1" noRot="1"/>
+          </p:cNvSpPr>
+          <p:nvPr>
+            <p:ph type="sldImg"/>
+          </p:nvPr>
+        </p:nvSpPr>
+        <p:spPr bwMode="auto">
+          <a:xfrm>
+            <a:off x="685800" y="1143000"/>
+            <a:ext cx="5486400" cy="3086100"/>
+          </a:xfrm>
+        </p:spPr>
+      </p:sp>
+      <p:sp>
+        <p:nvSpPr>
+          <p:cNvPr id="938990585" name="Notes Placeholder 2"/>
+          <p:cNvSpPr>
+            <a:spLocks noGrp="1"/>
+          </p:cNvSpPr>
+          <p:nvPr>
+            <p:ph type="body" idx="1"/>
+          </p:nvPr>
+        </p:nvSpPr>
+        <p:spPr bwMode="auto"/>
+        <p:txBody>
+          <a:bodyPr/>
+          <a:lstStyle/>
+          <a:p>
+            <a:pPr>
+              <a:defRPr/>
+            </a:pPr>
+            <a:endParaRPr lang="pt-PT">
+              <a:latin typeface="Arial"/>
+              <a:cs typeface="Arial"/>
+            </a:endParaRPr>
+          </a:p>
+        </p:txBody>
+      </p:sp>
+      <p:sp>
+        <p:nvSpPr>
+          <p:cNvPr id="84552899" name="Slide Number Placeholder 3"/>
           <p:cNvSpPr>
             <a:spLocks noGrp="1"/>
           </p:cNvSpPr>
@@ -684,7 +775,7 @@
       </p:grpSpPr>
       <p:sp>
         <p:nvSpPr>
-          <p:cNvPr id="1355095215" name="Título 1"/>
+          <p:cNvPr id="582031555" name="Título 1"/>
           <p:cNvSpPr>
             <a:spLocks noGrp="1"/>
           </p:cNvSpPr>
@@ -719,7 +810,7 @@
       </p:sp>
       <p:sp>
         <p:nvSpPr>
-          <p:cNvPr id="1101427371" name="Subtítulo 2"/>
+          <p:cNvPr id="603012644" name="Subtítulo 2"/>
           <p:cNvSpPr>
             <a:spLocks noGrp="1"/>
           </p:cNvSpPr>
@@ -787,7 +878,7 @@
       </p:sp>
       <p:sp>
         <p:nvSpPr>
-          <p:cNvPr id="1019834839" name="Date Placeholder 3"/>
+          <p:cNvPr id="1712452652" name="Date Placeholder 3"/>
           <p:cNvSpPr>
             <a:spLocks noGrp="1"/>
           </p:cNvSpPr>
@@ -813,7 +904,7 @@
       </p:sp>
       <p:sp>
         <p:nvSpPr>
-          <p:cNvPr id="733362750" name="Marcador de Posição do Rodapé 4"/>
+          <p:cNvPr id="949693722" name="Marcador de Posição do Rodapé 4"/>
           <p:cNvSpPr>
             <a:spLocks noGrp="1"/>
           </p:cNvSpPr>
@@ -835,7 +926,7 @@
       </p:sp>
       <p:sp>
         <p:nvSpPr>
-          <p:cNvPr id="229222451" name="Marcador de Posição do Número do Diapositivo 5"/>
+          <p:cNvPr id="84287888" name="Marcador de Posição do Número do Diapositivo 5"/>
           <p:cNvSpPr>
             <a:spLocks noGrp="1"/>
           </p:cNvSpPr>
@@ -886,7 +977,7 @@
       </p:grpSpPr>
       <p:sp>
         <p:nvSpPr>
-          <p:cNvPr id="1719072883" name="Title 1"/>
+          <p:cNvPr id="1134284622" name="Title 1"/>
           <p:cNvSpPr>
             <a:spLocks noGrp="1"/>
           </p:cNvSpPr>
@@ -912,7 +1003,7 @@
       </p:sp>
       <p:sp>
         <p:nvSpPr>
-          <p:cNvPr id="222863275" name="Marcador de Posição de Texto Vertical 2"/>
+          <p:cNvPr id="384662171" name="Marcador de Posição de Texto Vertical 2"/>
           <p:cNvSpPr>
             <a:spLocks noGrp="1"/>
           </p:cNvSpPr>
@@ -978,7 +1069,7 @@
       </p:sp>
       <p:sp>
         <p:nvSpPr>
-          <p:cNvPr id="278188720" name="Marcador de Posição da Data 3"/>
+          <p:cNvPr id="1546666870" name="Marcador de Posição da Data 3"/>
           <p:cNvSpPr>
             <a:spLocks noGrp="1"/>
           </p:cNvSpPr>
@@ -1004,7 +1095,7 @@
       </p:sp>
       <p:sp>
         <p:nvSpPr>
-          <p:cNvPr id="364541185" name="Marcador de Posição do Rodapé 4"/>
+          <p:cNvPr id="189249633" name="Marcador de Posição do Rodapé 4"/>
           <p:cNvSpPr>
             <a:spLocks noGrp="1"/>
           </p:cNvSpPr>
@@ -1026,7 +1117,7 @@
       </p:sp>
       <p:sp>
         <p:nvSpPr>
-          <p:cNvPr id="1599963443" name="Marcador de Posição do Número do Diapositivo 5"/>
+          <p:cNvPr id="536093347" name="Marcador de Posição do Número do Diapositivo 5"/>
           <p:cNvSpPr>
             <a:spLocks noGrp="1"/>
           </p:cNvSpPr>
@@ -1077,7 +1168,7 @@
       </p:grpSpPr>
       <p:sp>
         <p:nvSpPr>
-          <p:cNvPr id="367976084" name="Título Vertical 1"/>
+          <p:cNvPr id="733622069" name="Título Vertical 1"/>
           <p:cNvSpPr>
             <a:spLocks noGrp="1"/>
           </p:cNvSpPr>
@@ -1108,7 +1199,7 @@
       </p:sp>
       <p:sp>
         <p:nvSpPr>
-          <p:cNvPr id="402752496" name="Marcador de Posição de Texto Vertical 2"/>
+          <p:cNvPr id="118500105" name="Marcador de Posição de Texto Vertical 2"/>
           <p:cNvSpPr>
             <a:spLocks noGrp="1"/>
           </p:cNvSpPr>
@@ -1179,7 +1270,7 @@
       </p:sp>
       <p:sp>
         <p:nvSpPr>
-          <p:cNvPr id="1395970493" name="Marcador de Posição da Data 3"/>
+          <p:cNvPr id="1184486019" name="Marcador de Posição da Data 3"/>
           <p:cNvSpPr>
             <a:spLocks noGrp="1"/>
           </p:cNvSpPr>
@@ -1205,7 +1296,7 @@
       </p:sp>
       <p:sp>
         <p:nvSpPr>
-          <p:cNvPr id="158029848" name="Marcador de Posição do Rodapé 4"/>
+          <p:cNvPr id="1345228547" name="Marcador de Posição do Rodapé 4"/>
           <p:cNvSpPr>
             <a:spLocks noGrp="1"/>
           </p:cNvSpPr>
@@ -1227,7 +1318,7 @@
       </p:sp>
       <p:sp>
         <p:nvSpPr>
-          <p:cNvPr id="1583370139" name="Marcador de Posição do Número do Diapositivo 5"/>
+          <p:cNvPr id="2112574320" name="Marcador de Posição do Número do Diapositivo 5"/>
           <p:cNvSpPr>
             <a:spLocks noGrp="1"/>
           </p:cNvSpPr>
@@ -1278,7 +1369,7 @@
       </p:grpSpPr>
       <p:sp>
         <p:nvSpPr>
-          <p:cNvPr id="1300552665" name="Título 1"/>
+          <p:cNvPr id="1849514956" name="Título 1"/>
           <p:cNvSpPr>
             <a:spLocks noGrp="1"/>
           </p:cNvSpPr>
@@ -1304,7 +1395,7 @@
       </p:sp>
       <p:sp>
         <p:nvSpPr>
-          <p:cNvPr id="755475116" name="Marcador de Posição de Conteúdo 2"/>
+          <p:cNvPr id="172809680" name="Marcador de Posição de Conteúdo 2"/>
           <p:cNvSpPr>
             <a:spLocks noGrp="1"/>
           </p:cNvSpPr>
@@ -1370,7 +1461,7 @@
       </p:sp>
       <p:sp>
         <p:nvSpPr>
-          <p:cNvPr id="163192628" name="Marcador de Posição da Data 3"/>
+          <p:cNvPr id="894143494" name="Marcador de Posição da Data 3"/>
           <p:cNvSpPr>
             <a:spLocks noGrp="1"/>
           </p:cNvSpPr>
@@ -1396,7 +1487,7 @@
       </p:sp>
       <p:sp>
         <p:nvSpPr>
-          <p:cNvPr id="1889011633" name="Marcador de Posição do Rodapé 4"/>
+          <p:cNvPr id="524749250" name="Marcador de Posição do Rodapé 4"/>
           <p:cNvSpPr>
             <a:spLocks noGrp="1"/>
           </p:cNvSpPr>
@@ -1418,7 +1509,7 @@
       </p:sp>
       <p:sp>
         <p:nvSpPr>
-          <p:cNvPr id="1022790179" name="Marcador de Posição do Número do Diapositivo 5"/>
+          <p:cNvPr id="1299775227" name="Marcador de Posição do Número do Diapositivo 5"/>
           <p:cNvSpPr>
             <a:spLocks noGrp="1"/>
           </p:cNvSpPr>
@@ -1469,7 +1560,7 @@
       </p:grpSpPr>
       <p:sp>
         <p:nvSpPr>
-          <p:cNvPr id="328574924" name="Título 1"/>
+          <p:cNvPr id="267730012" name="Título 1"/>
           <p:cNvSpPr>
             <a:spLocks noGrp="1"/>
           </p:cNvSpPr>
@@ -1504,7 +1595,7 @@
       </p:sp>
       <p:sp>
         <p:nvSpPr>
-          <p:cNvPr id="1613899851" name="Marcador de Posição do Texto 2"/>
+          <p:cNvPr id="1279853762" name="Marcador de Posição do Texto 2"/>
           <p:cNvSpPr>
             <a:spLocks noGrp="1"/>
           </p:cNvSpPr>
@@ -1626,7 +1717,7 @@
       </p:sp>
       <p:sp>
         <p:nvSpPr>
-          <p:cNvPr id="88359763" name="Marcador de Posição da Data 3"/>
+          <p:cNvPr id="1227724556" name="Marcador de Posição da Data 3"/>
           <p:cNvSpPr>
             <a:spLocks noGrp="1"/>
           </p:cNvSpPr>
@@ -1652,7 +1743,7 @@
       </p:sp>
       <p:sp>
         <p:nvSpPr>
-          <p:cNvPr id="382927312" name="Marcador de Posição do Rodapé 4"/>
+          <p:cNvPr id="378421969" name="Marcador de Posição do Rodapé 4"/>
           <p:cNvSpPr>
             <a:spLocks noGrp="1"/>
           </p:cNvSpPr>
@@ -1674,7 +1765,7 @@
       </p:sp>
       <p:sp>
         <p:nvSpPr>
-          <p:cNvPr id="563081424" name="Marcador de Posição do Número do Diapositivo 5"/>
+          <p:cNvPr id="1070171724" name="Marcador de Posição do Número do Diapositivo 5"/>
           <p:cNvSpPr>
             <a:spLocks noGrp="1"/>
           </p:cNvSpPr>
@@ -1725,7 +1816,7 @@
       </p:grpSpPr>
       <p:sp>
         <p:nvSpPr>
-          <p:cNvPr id="1785202949" name="Título 1"/>
+          <p:cNvPr id="1857363525" name="Título 1"/>
           <p:cNvSpPr>
             <a:spLocks noGrp="1"/>
           </p:cNvSpPr>
@@ -1751,7 +1842,7 @@
       </p:sp>
       <p:sp>
         <p:nvSpPr>
-          <p:cNvPr id="1734330135" name="Marcador de Posição de Conteúdo 2"/>
+          <p:cNvPr id="1640931498" name="Marcador de Posição de Conteúdo 2"/>
           <p:cNvSpPr>
             <a:spLocks noGrp="1"/>
           </p:cNvSpPr>
@@ -1822,7 +1913,7 @@
       </p:sp>
       <p:sp>
         <p:nvSpPr>
-          <p:cNvPr id="544206605" name="Marcador de Posição de Conteúdo 3"/>
+          <p:cNvPr id="1713660888" name="Marcador de Posição de Conteúdo 3"/>
           <p:cNvSpPr>
             <a:spLocks noGrp="1"/>
           </p:cNvSpPr>
@@ -1893,7 +1984,7 @@
       </p:sp>
       <p:sp>
         <p:nvSpPr>
-          <p:cNvPr id="764445213" name="Marcador de Posição da Data 4"/>
+          <p:cNvPr id="1394579242" name="Marcador de Posição da Data 4"/>
           <p:cNvSpPr>
             <a:spLocks noGrp="1"/>
           </p:cNvSpPr>
@@ -1919,7 +2010,7 @@
       </p:sp>
       <p:sp>
         <p:nvSpPr>
-          <p:cNvPr id="213981844" name="Marcador de Posição do Rodapé 5"/>
+          <p:cNvPr id="2030112027" name="Marcador de Posição do Rodapé 5"/>
           <p:cNvSpPr>
             <a:spLocks noGrp="1"/>
           </p:cNvSpPr>
@@ -1941,7 +2032,7 @@
       </p:sp>
       <p:sp>
         <p:nvSpPr>
-          <p:cNvPr id="341426231" name="Marcador de Posição do Número do Diapositivo 6"/>
+          <p:cNvPr id="1738401057" name="Marcador de Posição do Número do Diapositivo 6"/>
           <p:cNvSpPr>
             <a:spLocks noGrp="1"/>
           </p:cNvSpPr>
@@ -1992,7 +2083,7 @@
       </p:grpSpPr>
       <p:sp>
         <p:nvSpPr>
-          <p:cNvPr id="1022144864" name="Título 1"/>
+          <p:cNvPr id="1900571875" name="Título 1"/>
           <p:cNvSpPr>
             <a:spLocks noGrp="1"/>
           </p:cNvSpPr>
@@ -2023,7 +2114,7 @@
       </p:sp>
       <p:sp>
         <p:nvSpPr>
-          <p:cNvPr id="1391121573" name="Marcador de Posição do Texto 2"/>
+          <p:cNvPr id="1012103939" name="Marcador de Posição do Texto 2"/>
           <p:cNvSpPr>
             <a:spLocks noGrp="1"/>
           </p:cNvSpPr>
@@ -2091,7 +2182,7 @@
       </p:sp>
       <p:sp>
         <p:nvSpPr>
-          <p:cNvPr id="155068633" name="Marcador de Posição de Conteúdo 3"/>
+          <p:cNvPr id="1823306562" name="Marcador de Posição de Conteúdo 3"/>
           <p:cNvSpPr>
             <a:spLocks noGrp="1"/>
           </p:cNvSpPr>
@@ -2162,7 +2253,7 @@
       </p:sp>
       <p:sp>
         <p:nvSpPr>
-          <p:cNvPr id="1595177727" name="Marcador de Posição do Texto 4"/>
+          <p:cNvPr id="1623247209" name="Marcador de Posição do Texto 4"/>
           <p:cNvSpPr>
             <a:spLocks noGrp="1"/>
           </p:cNvSpPr>
@@ -2230,7 +2321,7 @@
       </p:sp>
       <p:sp>
         <p:nvSpPr>
-          <p:cNvPr id="1751657457" name="Marcador de Posição de Conteúdo 5"/>
+          <p:cNvPr id="1402930752" name="Marcador de Posição de Conteúdo 5"/>
           <p:cNvSpPr>
             <a:spLocks noGrp="1"/>
           </p:cNvSpPr>
@@ -2301,7 +2392,7 @@
       </p:sp>
       <p:sp>
         <p:nvSpPr>
-          <p:cNvPr id="178302714" name="Marcador de Posição da Data 6"/>
+          <p:cNvPr id="1848337527" name="Marcador de Posição da Data 6"/>
           <p:cNvSpPr>
             <a:spLocks noGrp="1"/>
           </p:cNvSpPr>
@@ -2327,7 +2418,7 @@
       </p:sp>
       <p:sp>
         <p:nvSpPr>
-          <p:cNvPr id="1957184635" name="Marcador de Posição do Rodapé 7"/>
+          <p:cNvPr id="2099782444" name="Marcador de Posição do Rodapé 7"/>
           <p:cNvSpPr>
             <a:spLocks noGrp="1"/>
           </p:cNvSpPr>
@@ -2349,7 +2440,7 @@
       </p:sp>
       <p:sp>
         <p:nvSpPr>
-          <p:cNvPr id="174760646" name="Marcador de Posição do Número do Diapositivo 8"/>
+          <p:cNvPr id="336416171" name="Marcador de Posição do Número do Diapositivo 8"/>
           <p:cNvSpPr>
             <a:spLocks noGrp="1"/>
           </p:cNvSpPr>
@@ -2400,7 +2491,7 @@
       </p:grpSpPr>
       <p:sp>
         <p:nvSpPr>
-          <p:cNvPr id="865177602" name="Título 1"/>
+          <p:cNvPr id="1300980861" name="Título 1"/>
           <p:cNvSpPr>
             <a:spLocks noGrp="1"/>
           </p:cNvSpPr>
@@ -2426,7 +2517,7 @@
       </p:sp>
       <p:sp>
         <p:nvSpPr>
-          <p:cNvPr id="546471976" name="Marcador de Posição da Data 2"/>
+          <p:cNvPr id="293435235" name="Marcador de Posição da Data 2"/>
           <p:cNvSpPr>
             <a:spLocks noGrp="1"/>
           </p:cNvSpPr>
@@ -2452,7 +2543,7 @@
       </p:sp>
       <p:sp>
         <p:nvSpPr>
-          <p:cNvPr id="1057791436" name="Marcador de Posição do Rodapé 3"/>
+          <p:cNvPr id="1345731481" name="Marcador de Posição do Rodapé 3"/>
           <p:cNvSpPr>
             <a:spLocks noGrp="1"/>
           </p:cNvSpPr>
@@ -2474,7 +2565,7 @@
       </p:sp>
       <p:sp>
         <p:nvSpPr>
-          <p:cNvPr id="2045824942" name="Marcador de Posição do Número do Diapositivo 4"/>
+          <p:cNvPr id="501476208" name="Marcador de Posição do Número do Diapositivo 4"/>
           <p:cNvSpPr>
             <a:spLocks noGrp="1"/>
           </p:cNvSpPr>
@@ -2525,7 +2616,7 @@
       </p:grpSpPr>
       <p:sp>
         <p:nvSpPr>
-          <p:cNvPr id="1281761901" name="Marcador de Posição da Data 1"/>
+          <p:cNvPr id="115393199" name="Marcador de Posição da Data 1"/>
           <p:cNvSpPr>
             <a:spLocks noGrp="1"/>
           </p:cNvSpPr>
@@ -2551,7 +2642,7 @@
       </p:sp>
       <p:sp>
         <p:nvSpPr>
-          <p:cNvPr id="1473081844" name="Marcador de Posição do Rodapé 2"/>
+          <p:cNvPr id="1493547701" name="Marcador de Posição do Rodapé 2"/>
           <p:cNvSpPr>
             <a:spLocks noGrp="1"/>
           </p:cNvSpPr>
@@ -2573,7 +2664,7 @@
       </p:sp>
       <p:sp>
         <p:nvSpPr>
-          <p:cNvPr id="316044375" name="Marcador de Posição do Número do Diapositivo 3"/>
+          <p:cNvPr id="1229446148" name="Marcador de Posição do Número do Diapositivo 3"/>
           <p:cNvSpPr>
             <a:spLocks noGrp="1"/>
           </p:cNvSpPr>
@@ -2624,7 +2715,7 @@
       </p:grpSpPr>
       <p:sp>
         <p:nvSpPr>
-          <p:cNvPr id="1347664880" name="Título 1"/>
+          <p:cNvPr id="1778663250" name="Título 1"/>
           <p:cNvSpPr>
             <a:spLocks noGrp="1"/>
           </p:cNvSpPr>
@@ -2659,7 +2750,7 @@
       </p:sp>
       <p:sp>
         <p:nvSpPr>
-          <p:cNvPr id="1475136109" name="Marcador de Posição de Conteúdo 2"/>
+          <p:cNvPr id="1281907499" name="Marcador de Posição de Conteúdo 2"/>
           <p:cNvSpPr>
             <a:spLocks noGrp="1"/>
           </p:cNvSpPr>
@@ -2758,7 +2849,7 @@
       </p:sp>
       <p:sp>
         <p:nvSpPr>
-          <p:cNvPr id="601825048" name="Marcador de Posição do Texto 3"/>
+          <p:cNvPr id="604625251" name="Marcador de Posição do Texto 3"/>
           <p:cNvSpPr>
             <a:spLocks noGrp="1"/>
           </p:cNvSpPr>
@@ -2826,7 +2917,7 @@
       </p:sp>
       <p:sp>
         <p:nvSpPr>
-          <p:cNvPr id="996976719" name="Marcador de Posição da Data 4"/>
+          <p:cNvPr id="1552788633" name="Marcador de Posição da Data 4"/>
           <p:cNvSpPr>
             <a:spLocks noGrp="1"/>
           </p:cNvSpPr>
@@ -2852,7 +2943,7 @@
       </p:sp>
       <p:sp>
         <p:nvSpPr>
-          <p:cNvPr id="1212623389" name="Footer Placeholder 5"/>
+          <p:cNvPr id="743683634" name="Footer Placeholder 5"/>
           <p:cNvSpPr>
             <a:spLocks noGrp="1"/>
           </p:cNvSpPr>
@@ -2874,7 +2965,7 @@
       </p:sp>
       <p:sp>
         <p:nvSpPr>
-          <p:cNvPr id="2140422811" name="Marcador de Posição do Número do Diapositivo 6"/>
+          <p:cNvPr id="1581161254" name="Marcador de Posição do Número do Diapositivo 6"/>
           <p:cNvSpPr>
             <a:spLocks noGrp="1"/>
           </p:cNvSpPr>
@@ -2925,7 +3016,7 @@
       </p:grpSpPr>
       <p:sp>
         <p:nvSpPr>
-          <p:cNvPr id="26094498" name="Título 1"/>
+          <p:cNvPr id="1854268046" name="Título 1"/>
           <p:cNvSpPr>
             <a:spLocks noGrp="1"/>
           </p:cNvSpPr>
@@ -2960,7 +3051,7 @@
       </p:sp>
       <p:sp>
         <p:nvSpPr>
-          <p:cNvPr id="1917982975" name="Marcador de Posição da Imagem 2"/>
+          <p:cNvPr id="2075415653" name="Marcador de Posição da Imagem 2"/>
           <p:cNvSpPr>
             <a:spLocks noChangeAspect="1" noGrp="1"/>
           </p:cNvSpPr>
@@ -3028,7 +3119,7 @@
       </p:sp>
       <p:sp>
         <p:nvSpPr>
-          <p:cNvPr id="1929865541" name="Marcador de Posição do Texto 3"/>
+          <p:cNvPr id="213699661" name="Marcador de Posição do Texto 3"/>
           <p:cNvSpPr>
             <a:spLocks noGrp="1"/>
           </p:cNvSpPr>
@@ -3096,7 +3187,7 @@
       </p:sp>
       <p:sp>
         <p:nvSpPr>
-          <p:cNvPr id="377249767" name="Marcador de Posição da Data 4"/>
+          <p:cNvPr id="2028266704" name="Marcador de Posição da Data 4"/>
           <p:cNvSpPr>
             <a:spLocks noGrp="1"/>
           </p:cNvSpPr>
@@ -3122,7 +3213,7 @@
       </p:sp>
       <p:sp>
         <p:nvSpPr>
-          <p:cNvPr id="423125082" name="Marcador de Posição do Rodapé 5"/>
+          <p:cNvPr id="930871861" name="Marcador de Posição do Rodapé 5"/>
           <p:cNvSpPr>
             <a:spLocks noGrp="1"/>
           </p:cNvSpPr>
@@ -3144,7 +3235,7 @@
       </p:sp>
       <p:sp>
         <p:nvSpPr>
-          <p:cNvPr id="404581559" name="Marcador de Posição do Número do Diapositivo 6"/>
+          <p:cNvPr id="653546149" name="Marcador de Posição do Número do Diapositivo 6"/>
           <p:cNvSpPr>
             <a:spLocks noGrp="1"/>
           </p:cNvSpPr>
@@ -3200,7 +3291,7 @@
       </p:grpSpPr>
       <p:sp>
         <p:nvSpPr>
-          <p:cNvPr id="639854216" name="Marcador de Posição do Título 1"/>
+          <p:cNvPr id="130025292" name="Marcador de Posição do Título 1"/>
           <p:cNvSpPr>
             <a:spLocks noGrp="1"/>
           </p:cNvSpPr>
@@ -3236,7 +3327,7 @@
       </p:sp>
       <p:sp>
         <p:nvSpPr>
-          <p:cNvPr id="1883275267" name="Marcador de Posição do Texto 2"/>
+          <p:cNvPr id="1087705209" name="Marcador de Posição do Texto 2"/>
           <p:cNvSpPr>
             <a:spLocks noGrp="1"/>
           </p:cNvSpPr>
@@ -3312,7 +3403,7 @@
       </p:sp>
       <p:sp>
         <p:nvSpPr>
-          <p:cNvPr id="511864268" name="Marcador de Posição da Data 3"/>
+          <p:cNvPr id="772226953" name="Marcador de Posição da Data 3"/>
           <p:cNvSpPr>
             <a:spLocks noGrp="1"/>
           </p:cNvSpPr>
@@ -3356,7 +3447,7 @@
       </p:sp>
       <p:sp>
         <p:nvSpPr>
-          <p:cNvPr id="2047014542" name="Marcador de Posição do Rodapé 4"/>
+          <p:cNvPr id="654514633" name="Marcador de Posição do Rodapé 4"/>
           <p:cNvSpPr>
             <a:spLocks noGrp="1"/>
           </p:cNvSpPr>
@@ -3396,7 +3487,7 @@
       </p:sp>
       <p:sp>
         <p:nvSpPr>
-          <p:cNvPr id="1839621672" name="Marcador de Posição do Número do Diapositivo 5"/>
+          <p:cNvPr id="1398175640" name="Marcador de Posição do Número do Diapositivo 5"/>
           <p:cNvSpPr>
             <a:spLocks noGrp="1"/>
           </p:cNvSpPr>
@@ -3756,14 +3847,14 @@
       </p:grpSpPr>
       <p:sp>
         <p:nvSpPr>
-          <p:cNvPr id="335111141" name=""/>
+          <p:cNvPr id="1796338101" name=""/>
           <p:cNvSpPr/>
           <p:nvPr/>
         </p:nvSpPr>
         <p:spPr bwMode="auto">
           <a:xfrm flipH="0" flipV="0">
-            <a:off x="-10583" y="-10583"/>
-            <a:ext cx="12213166" cy="6868582"/>
+            <a:off x="-10582" y="-10582"/>
+            <a:ext cx="12213165" cy="6868581"/>
           </a:xfrm>
           <a:prstGeom prst="rect">
             <a:avLst/>
@@ -3805,14 +3896,14 @@
       </p:sp>
       <p:sp>
         <p:nvSpPr>
-          <p:cNvPr id="1467138779" name=""/>
+          <p:cNvPr id="378414402" name=""/>
           <p:cNvSpPr/>
           <p:nvPr/>
         </p:nvSpPr>
         <p:spPr bwMode="auto">
           <a:xfrm flipH="0" flipV="0">
-            <a:off x="2052175" y="3851451"/>
-            <a:ext cx="1730907" cy="996575"/>
+            <a:off x="914800" y="3868320"/>
+            <a:ext cx="1730907" cy="996574"/>
           </a:xfrm>
           <a:prstGeom prst="rect">
             <a:avLst/>
@@ -3914,14 +4005,14 @@
       </p:sp>
       <p:sp>
         <p:nvSpPr>
-          <p:cNvPr id="1805230290" name=""/>
+          <p:cNvPr id="1922529935" name=""/>
           <p:cNvSpPr/>
           <p:nvPr/>
         </p:nvSpPr>
         <p:spPr bwMode="auto">
           <a:xfrm flipH="0" flipV="0">
-            <a:off x="4088876" y="3896852"/>
-            <a:ext cx="1724493" cy="905772"/>
+            <a:off x="3726397" y="5403969"/>
+            <a:ext cx="1724492" cy="905771"/>
           </a:xfrm>
           <a:prstGeom prst="rect">
             <a:avLst/>
@@ -3986,7 +4077,7 @@
             </a:endParaRPr>
           </a:p>
           <a:p>
-            <a:pPr marL="217792" indent="-217792">
+            <a:pPr marL="217791" indent="-217791">
               <a:buFont typeface="Arial"/>
               <a:buChar char="–"/>
               <a:defRPr/>
@@ -3997,42 +4088,60 @@
                   <a:schemeClr val="tx1"/>
                 </a:solidFill>
               </a:rPr>
-              <a:t>Login com Google/Facebook </a:t>
-            </a:r>
-            <a:endParaRPr sz="1200">
-              <a:solidFill>
-                <a:schemeClr val="tx1"/>
-              </a:solidFill>
-            </a:endParaRPr>
-          </a:p>
-        </p:txBody>
-      </p:sp>
-      <p:sp>
-        <p:nvSpPr>
-          <p:cNvPr id="162108778" name="Título 1"/>
+              <a:t>Login with Google </a:t>
+            </a:r>
+            <a:endParaRPr sz="1200">
+              <a:solidFill>
+                <a:schemeClr val="tx1"/>
+              </a:solidFill>
+            </a:endParaRPr>
+          </a:p>
+        </p:txBody>
+      </p:sp>
+      <p:sp>
+        <p:nvSpPr>
+          <p:cNvPr id="1869843734" name="Título 1"/>
           <p:cNvSpPr>
             <a:spLocks noGrp="1"/>
           </p:cNvSpPr>
-          <p:nvPr>
-            <p:ph type="title"/>
-          </p:nvPr>
+          <p:nvPr/>
         </p:nvSpPr>
         <p:spPr bwMode="auto">
           <a:xfrm flipH="0" flipV="0">
-            <a:off x="46953" y="10271"/>
-            <a:ext cx="10151034" cy="855070"/>
+            <a:off x="46952" y="10270"/>
+            <a:ext cx="10151033" cy="855069"/>
           </a:xfrm>
         </p:spPr>
         <p:txBody>
-          <a:bodyPr/>
-          <a:lstStyle/>
+          <a:bodyPr vert="horz" lIns="91440" tIns="45720" rIns="91440" bIns="45720" rtlCol="0" anchor="ctr">
+            <a:normAutofit/>
+          </a:bodyPr>
+          <a:lstStyle>
+            <a:lvl1pPr algn="l" defTabSz="914400">
+              <a:lnSpc>
+                <a:spcPct val="90000"/>
+              </a:lnSpc>
+              <a:spcBef>
+                <a:spcPts val="0"/>
+              </a:spcBef>
+              <a:buNone/>
+              <a:defRPr sz="4400">
+                <a:solidFill>
+                  <a:schemeClr val="tx1"/>
+                </a:solidFill>
+                <a:latin typeface="+mj-lt"/>
+                <a:ea typeface="+mj-ea"/>
+                <a:cs typeface="+mj-cs"/>
+              </a:defRPr>
+            </a:lvl1pPr>
+          </a:lstStyle>
           <a:p>
             <a:pPr>
               <a:defRPr/>
             </a:pPr>
             <a:r>
               <a:rPr sz="2800"/>
-              <a:t>Neo Training Server - </a:t>
+              <a:t>Neo Training Server – </a:t>
             </a:r>
             <a:r>
               <a:rPr lang="pt-PT" sz="2800" b="0" i="0" u="none" strike="noStrike" cap="none" spc="0">
@@ -4043,11 +4152,33 @@
                 <a:ea typeface="Arial"/>
                 <a:cs typeface="Arial"/>
               </a:rPr>
-              <a:t>MicroServices</a:t>
+              <a:t>The C# </a:t>
+            </a:r>
+            <a:r>
+              <a:rPr lang="pt-PT" sz="2800" b="0" i="0" u="none" strike="noStrike" cap="none" spc="0">
+                <a:solidFill>
+                  <a:schemeClr val="tx1"/>
+                </a:solidFill>
+                <a:latin typeface="Arial"/>
+                <a:ea typeface="Arial"/>
+                <a:cs typeface="Arial"/>
+              </a:rPr>
+              <a:t>Monolith</a:t>
+            </a:r>
+            <a:r>
+              <a:rPr lang="pt-PT" sz="2800" b="0" i="0" u="none" strike="noStrike" cap="none" spc="0">
+                <a:solidFill>
+                  <a:schemeClr val="tx1"/>
+                </a:solidFill>
+                <a:latin typeface="Arial"/>
+                <a:ea typeface="Arial"/>
+                <a:cs typeface="Arial"/>
+              </a:rPr>
+              <a:t> </a:t>
             </a:r>
             <a:r>
               <a:rPr sz="2800"/>
-              <a:t> Hell Tech Stack</a:t>
+              <a:t>Tech Stack</a:t>
             </a:r>
             <a:endParaRPr sz="2800"/>
           </a:p>
@@ -4055,14 +4186,14 @@
       </p:sp>
       <p:sp>
         <p:nvSpPr>
-          <p:cNvPr id="143777857" name=""/>
+          <p:cNvPr id="1911867400" name=""/>
           <p:cNvSpPr/>
           <p:nvPr/>
         </p:nvSpPr>
         <p:spPr bwMode="auto">
           <a:xfrm flipH="0" flipV="0">
-            <a:off x="189441" y="3854460"/>
-            <a:ext cx="1730907" cy="996575"/>
+            <a:off x="914800" y="1842637"/>
+            <a:ext cx="1730907" cy="996574"/>
           </a:xfrm>
           <a:prstGeom prst="rect">
             <a:avLst/>
@@ -4164,14 +4295,14 @@
       </p:sp>
       <p:sp>
         <p:nvSpPr>
-          <p:cNvPr id="833997612" name=""/>
+          <p:cNvPr id="1581222029" name=""/>
           <p:cNvSpPr/>
           <p:nvPr/>
         </p:nvSpPr>
         <p:spPr bwMode="auto">
           <a:xfrm flipH="0" flipV="0">
-            <a:off x="4000006" y="862333"/>
-            <a:ext cx="1902233" cy="2700966"/>
+            <a:off x="3637527" y="1842637"/>
+            <a:ext cx="1902232" cy="3084626"/>
           </a:xfrm>
           <a:prstGeom prst="rect">
             <a:avLst/>
@@ -4287,16 +4418,16 @@
                   <a:schemeClr val="tx1"/>
                 </a:solidFill>
               </a:rPr>
-              <a:t>Functions:</a:t>
-            </a:r>
-            <a:endParaRPr sz="1200">
-              <a:solidFill>
-                <a:schemeClr val="tx1"/>
-              </a:solidFill>
-            </a:endParaRPr>
-          </a:p>
-          <a:p>
-            <a:pPr marL="261849" indent="-261849">
+              <a:t>Login Controller:</a:t>
+            </a:r>
+            <a:endParaRPr sz="1200">
+              <a:solidFill>
+                <a:schemeClr val="tx1"/>
+              </a:solidFill>
+            </a:endParaRPr>
+          </a:p>
+          <a:p>
+            <a:pPr marL="261848" indent="-261848">
               <a:buFont typeface="Arial"/>
               <a:buChar char="–"/>
               <a:defRPr/>
@@ -4441,6 +4572,14 @@
               <a:buChar char="–"/>
               <a:defRPr/>
             </a:pPr>
+            <a:r>
+              <a:rPr sz="1200">
+                <a:solidFill>
+                  <a:schemeClr val="tx1"/>
+                </a:solidFill>
+              </a:rPr>
+              <a:t>Google / Facebook</a:t>
+            </a:r>
             <a:endParaRPr sz="1200">
               <a:solidFill>
                 <a:schemeClr val="tx1"/>
@@ -4453,32 +4592,65 @@
               <a:buChar char="–"/>
               <a:defRPr/>
             </a:pPr>
-            <a:r>
-              <a:rPr sz="1200">
-                <a:solidFill>
-                  <a:schemeClr val="tx1"/>
-                </a:solidFill>
-              </a:rPr>
-              <a:t>Google / Facebook</a:t>
-            </a:r>
-            <a:endParaRPr sz="1200">
-              <a:solidFill>
-                <a:schemeClr val="tx1"/>
-              </a:solidFill>
-            </a:endParaRPr>
-          </a:p>
-        </p:txBody>
-      </p:sp>
-      <p:sp>
-        <p:nvSpPr>
-          <p:cNvPr id="1737524108" name=""/>
+            <a:endParaRPr sz="1200">
+              <a:solidFill>
+                <a:schemeClr val="tx1"/>
+              </a:solidFill>
+            </a:endParaRPr>
+          </a:p>
+          <a:p>
+            <a:pPr>
+              <a:defRPr/>
+            </a:pPr>
+            <a:r>
+              <a:rPr sz="1200">
+                <a:solidFill>
+                  <a:schemeClr val="tx1"/>
+                </a:solidFill>
+              </a:rPr>
+              <a:t>DB Controller:</a:t>
+            </a:r>
+            <a:endParaRPr sz="1200">
+              <a:solidFill>
+                <a:schemeClr val="tx1"/>
+              </a:solidFill>
+            </a:endParaRPr>
+          </a:p>
+          <a:p>
+            <a:pPr marL="217792" indent="-217792">
+              <a:buFont typeface="Arial"/>
+              <a:buChar char="–"/>
+              <a:defRPr/>
+            </a:pPr>
+            <a:r>
+              <a:rPr lang="pt-PT" sz="1200" b="0" i="0" u="none" strike="noStrike" cap="none" spc="0">
+                <a:solidFill>
+                  <a:schemeClr val="tx1"/>
+                </a:solidFill>
+                <a:latin typeface="Arial"/>
+                <a:ea typeface="Arial"/>
+                <a:cs typeface="Arial"/>
+              </a:rPr>
+              <a:t>Handle DB</a:t>
+            </a:r>
+            <a:endParaRPr sz="1200">
+              <a:solidFill>
+                <a:schemeClr val="tx1"/>
+              </a:solidFill>
+            </a:endParaRPr>
+          </a:p>
+        </p:txBody>
+      </p:sp>
+      <p:sp>
+        <p:nvSpPr>
+          <p:cNvPr id="485539681" name=""/>
           <p:cNvSpPr/>
           <p:nvPr/>
         </p:nvSpPr>
         <p:spPr bwMode="auto">
           <a:xfrm flipH="0" flipV="0">
-            <a:off x="2917629" y="5840635"/>
-            <a:ext cx="1730907" cy="700741"/>
+            <a:off x="6751454" y="1305103"/>
+            <a:ext cx="1730907" cy="700740"/>
           </a:xfrm>
           <a:prstGeom prst="rect">
             <a:avLst/>
@@ -4543,7 +4715,7 @@
             </a:endParaRPr>
           </a:p>
           <a:p>
-            <a:pPr marL="217792" indent="-217792">
+            <a:pPr marL="217791" indent="-217791">
               <a:buFont typeface="Arial"/>
               <a:buChar char="–"/>
               <a:defRPr/>
@@ -4564,174 +4736,16 @@
           </a:p>
         </p:txBody>
       </p:sp>
-      <p:sp>
-        <p:nvSpPr>
-          <p:cNvPr id="147197208" name=""/>
-          <p:cNvSpPr/>
-          <p:nvPr/>
-        </p:nvSpPr>
-        <p:spPr bwMode="auto">
-          <a:xfrm flipH="0" flipV="0">
-            <a:off x="5868942" y="5171284"/>
-            <a:ext cx="1902233" cy="1450974"/>
-          </a:xfrm>
-          <a:prstGeom prst="rect">
-            <a:avLst/>
-          </a:prstGeom>
-          <a:solidFill>
-            <a:schemeClr val="bg1"/>
-          </a:solidFill>
-          <a:ln w="38099" cap="flat" cmpd="sng" algn="ctr">
-            <a:solidFill>
-              <a:srgbClr val="92D050"/>
-            </a:solidFill>
-            <a:prstDash val="solid"/>
-            <a:miter lim="800000"/>
-          </a:ln>
-        </p:spPr>
-        <p:style>
-          <a:lnRef idx="2">
-            <a:schemeClr val="accent1">
-              <a:shade val="50000"/>
-            </a:schemeClr>
-          </a:lnRef>
-          <a:fillRef idx="1">
-            <a:schemeClr val="accent1"/>
-          </a:fillRef>
-          <a:effectRef idx="0">
-            <a:schemeClr val="accent1"/>
-          </a:effectRef>
-          <a:fontRef idx="minor">
-            <a:schemeClr val="lt1"/>
-          </a:fontRef>
-        </p:style>
-        <p:txBody>
-          <a:bodyPr/>
-          <a:p>
-            <a:pPr>
-              <a:defRPr/>
-            </a:pPr>
-            <a:r>
-              <a:rPr sz="1200">
-                <a:solidFill>
-                  <a:schemeClr val="tx1"/>
-                </a:solidFill>
-              </a:rPr>
-              <a:t>RestAPI (BD &lt;=&gt; User)</a:t>
-            </a:r>
-            <a:endParaRPr sz="1200">
-              <a:solidFill>
-                <a:schemeClr val="tx1"/>
-              </a:solidFill>
-            </a:endParaRPr>
-          </a:p>
-          <a:p>
-            <a:pPr>
-              <a:defRPr/>
-            </a:pPr>
-            <a:endParaRPr sz="1200">
-              <a:solidFill>
-                <a:schemeClr val="tx1"/>
-              </a:solidFill>
-            </a:endParaRPr>
-          </a:p>
-          <a:p>
-            <a:pPr>
-              <a:defRPr/>
-            </a:pPr>
-            <a:r>
-              <a:rPr sz="1200">
-                <a:solidFill>
-                  <a:schemeClr val="tx1"/>
-                </a:solidFill>
-              </a:rPr>
-              <a:t>Tech:</a:t>
-            </a:r>
-            <a:r>
-              <a:rPr sz="1200">
-                <a:solidFill>
-                  <a:schemeClr val="tx1"/>
-                </a:solidFill>
-              </a:rPr>
-              <a:t> C# .NET</a:t>
-            </a:r>
-            <a:endParaRPr sz="1200">
-              <a:solidFill>
-                <a:schemeClr val="tx1"/>
-              </a:solidFill>
-            </a:endParaRPr>
-          </a:p>
-          <a:p>
-            <a:pPr>
-              <a:defRPr/>
-            </a:pPr>
-            <a:r>
-              <a:rPr sz="1200">
-                <a:solidFill>
-                  <a:schemeClr val="tx1"/>
-                </a:solidFill>
-              </a:rPr>
-              <a:t>Running on: PC</a:t>
-            </a:r>
-            <a:endParaRPr sz="1200">
-              <a:solidFill>
-                <a:schemeClr val="tx1"/>
-              </a:solidFill>
-            </a:endParaRPr>
-          </a:p>
-          <a:p>
-            <a:pPr>
-              <a:defRPr/>
-            </a:pPr>
-            <a:r>
-              <a:rPr sz="1200">
-                <a:solidFill>
-                  <a:schemeClr val="tx1"/>
-                </a:solidFill>
-              </a:rPr>
-              <a:t>Functions:</a:t>
-            </a:r>
-            <a:endParaRPr sz="1200">
-              <a:solidFill>
-                <a:schemeClr val="tx1"/>
-              </a:solidFill>
-            </a:endParaRPr>
-          </a:p>
-          <a:p>
-            <a:pPr marL="283878" indent="-283878">
-              <a:buFont typeface="Arial"/>
-              <a:buChar char="–"/>
-              <a:defRPr/>
-            </a:pPr>
-            <a:r>
-              <a:rPr sz="1200">
-                <a:solidFill>
-                  <a:schemeClr val="tx1"/>
-                </a:solidFill>
-              </a:rPr>
-              <a:t>Handle DB</a:t>
-            </a:r>
-            <a:endParaRPr sz="1200">
-              <a:solidFill>
-                <a:schemeClr val="tx1"/>
-              </a:solidFill>
-            </a:endParaRPr>
-          </a:p>
-        </p:txBody>
-      </p:sp>
       <p:cxnSp>
         <p:nvCxnSpPr>
-          <p:cNvPr id="1822045311" name=""/>
-          <p:cNvCxnSpPr>
-            <a:stCxn id="143777857" idx="0"/>
-            <a:endCxn id="833997612" idx="1"/>
-          </p:cNvCxnSpPr>
+          <p:cNvPr id="1056316094" name=""/>
+          <p:cNvCxnSpPr/>
           <p:nvPr/>
         </p:nvCxnSpPr>
         <p:spPr bwMode="auto">
-          <a:xfrm rot="16199969" flipH="0" flipV="0">
-            <a:off x="1706629" y="1561083"/>
-            <a:ext cx="1641642" cy="2945110"/>
+          <a:xfrm rot="0" flipH="0" flipV="0">
+            <a:off x="2645707" y="2340924"/>
+            <a:ext cx="991819" cy="1044025"/>
           </a:xfrm>
           <a:prstGeom prst="line">
             <a:avLst/>
@@ -4768,17 +4782,14 @@
       </p:cxnSp>
       <p:cxnSp>
         <p:nvCxnSpPr>
-          <p:cNvPr id="1212879741" name=""/>
-          <p:cNvCxnSpPr>
-            <a:stCxn id="147197208" idx="0"/>
-            <a:endCxn id="833997612" idx="3"/>
-          </p:cNvCxnSpPr>
+          <p:cNvPr id="1534285399" name=""/>
+          <p:cNvCxnSpPr/>
           <p:nvPr/>
         </p:nvCxnSpPr>
         <p:spPr bwMode="auto">
-          <a:xfrm rot="16199969" flipH="0" flipV="1">
-            <a:off x="4881916" y="3233139"/>
-            <a:ext cx="2958467" cy="917819"/>
+          <a:xfrm rot="16199969" flipH="0" flipV="0">
+            <a:off x="4350291" y="5165617"/>
+            <a:ext cx="476703" cy="0"/>
           </a:xfrm>
           <a:prstGeom prst="line">
             <a:avLst/>
@@ -4813,19 +4824,139 @@
           </a:fontRef>
         </p:style>
       </p:cxnSp>
+      <p:sp>
+        <p:nvSpPr>
+          <p:cNvPr id="1635421841" name=""/>
+          <p:cNvSpPr/>
+          <p:nvPr/>
+        </p:nvSpPr>
+        <p:spPr bwMode="auto">
+          <a:xfrm flipH="0" flipV="0">
+            <a:off x="7380435" y="2951781"/>
+            <a:ext cx="1020420" cy="866338"/>
+          </a:xfrm>
+          <a:prstGeom prst="rect">
+            <a:avLst/>
+          </a:prstGeom>
+          <a:solidFill>
+            <a:schemeClr val="bg1"/>
+          </a:solidFill>
+          <a:ln w="38099" cap="flat" cmpd="sng" algn="ctr">
+            <a:solidFill>
+              <a:srgbClr val="C00000"/>
+            </a:solidFill>
+            <a:prstDash val="solid"/>
+            <a:miter lim="800000"/>
+          </a:ln>
+        </p:spPr>
+        <p:style>
+          <a:lnRef idx="2">
+            <a:schemeClr val="accent1">
+              <a:shade val="50000"/>
+            </a:schemeClr>
+          </a:lnRef>
+          <a:fillRef idx="1">
+            <a:schemeClr val="accent1"/>
+          </a:fillRef>
+          <a:effectRef idx="0">
+            <a:schemeClr val="accent1"/>
+          </a:effectRef>
+          <a:fontRef idx="minor">
+            <a:schemeClr val="lt1"/>
+          </a:fontRef>
+        </p:style>
+        <p:txBody>
+          <a:bodyPr/>
+          <a:p>
+            <a:pPr>
+              <a:defRPr/>
+            </a:pPr>
+            <a:r>
+              <a:rPr sz="1200">
+                <a:solidFill>
+                  <a:schemeClr val="tx1"/>
+                </a:solidFill>
+              </a:rPr>
+              <a:t>FrontEnd</a:t>
+            </a:r>
+            <a:endParaRPr sz="1200">
+              <a:solidFill>
+                <a:schemeClr val="tx1"/>
+              </a:solidFill>
+            </a:endParaRPr>
+          </a:p>
+          <a:p>
+            <a:pPr>
+              <a:defRPr/>
+            </a:pPr>
+            <a:endParaRPr sz="1200">
+              <a:solidFill>
+                <a:schemeClr val="tx1"/>
+              </a:solidFill>
+            </a:endParaRPr>
+          </a:p>
+          <a:p>
+            <a:pPr>
+              <a:defRPr/>
+            </a:pPr>
+            <a:r>
+              <a:rPr sz="1200">
+                <a:solidFill>
+                  <a:schemeClr val="tx1"/>
+                </a:solidFill>
+              </a:rPr>
+              <a:t>Functions:</a:t>
+            </a:r>
+            <a:endParaRPr sz="1200">
+              <a:solidFill>
+                <a:schemeClr val="tx1"/>
+              </a:solidFill>
+            </a:endParaRPr>
+          </a:p>
+          <a:p>
+            <a:pPr marL="283878" indent="-283878">
+              <a:buFont typeface="Arial"/>
+              <a:buChar char="–"/>
+              <a:defRPr/>
+            </a:pPr>
+            <a:r>
+              <a:rPr sz="1200">
+                <a:solidFill>
+                  <a:schemeClr val="tx1"/>
+                </a:solidFill>
+              </a:rPr>
+              <a:t>UI / UX</a:t>
+            </a:r>
+            <a:endParaRPr sz="1200">
+              <a:solidFill>
+                <a:schemeClr val="tx1"/>
+              </a:solidFill>
+            </a:endParaRPr>
+          </a:p>
+          <a:p>
+            <a:pPr marL="283878" indent="-283878">
+              <a:buFont typeface="Arial"/>
+              <a:buChar char="–"/>
+              <a:defRPr/>
+            </a:pPr>
+            <a:endParaRPr sz="1200">
+              <a:solidFill>
+                <a:schemeClr val="tx1"/>
+              </a:solidFill>
+            </a:endParaRPr>
+          </a:p>
+        </p:txBody>
+      </p:sp>
       <p:cxnSp>
         <p:nvCxnSpPr>
-          <p:cNvPr id="1788005965" name=""/>
-          <p:cNvCxnSpPr>
-            <a:stCxn id="1805230290" idx="0"/>
-            <a:endCxn id="833997612" idx="2"/>
-          </p:cNvCxnSpPr>
+          <p:cNvPr id="2073718704" name=""/>
+          <p:cNvCxnSpPr/>
           <p:nvPr/>
         </p:nvCxnSpPr>
         <p:spPr bwMode="auto">
-          <a:xfrm rot="16199969" flipH="0" flipV="1">
-            <a:off x="4784347" y="3730076"/>
-            <a:ext cx="333551" cy="0"/>
+          <a:xfrm rot="10799990" flipH="0" flipV="1">
+            <a:off x="5539761" y="3384951"/>
+            <a:ext cx="1840673" cy="0"/>
           </a:xfrm>
           <a:prstGeom prst="line">
             <a:avLst/>
@@ -4862,316 +4993,46 @@
       </p:cxnSp>
       <p:sp>
         <p:nvSpPr>
-          <p:cNvPr id="1862025083" name=""/>
-          <p:cNvSpPr/>
+          <p:cNvPr id="1107761049" name=""/>
+          <p:cNvSpPr txBox="1"/>
           <p:nvPr/>
         </p:nvSpPr>
         <p:spPr bwMode="auto">
-          <a:xfrm flipH="0" flipV="0">
-            <a:off x="8442961" y="3821235"/>
-            <a:ext cx="1020420" cy="866339"/>
+          <a:xfrm rot="0" flipH="0" flipV="0">
+            <a:off x="5762800" y="2951781"/>
+            <a:ext cx="1429286" cy="366119"/>
           </a:xfrm>
           <a:prstGeom prst="rect">
             <a:avLst/>
           </a:prstGeom>
-          <a:solidFill>
-            <a:schemeClr val="bg1"/>
-          </a:solidFill>
-          <a:ln w="38099" cap="flat" cmpd="sng" algn="ctr">
-            <a:solidFill>
-              <a:srgbClr val="C00000"/>
-            </a:solidFill>
-            <a:prstDash val="solid"/>
-            <a:miter lim="800000"/>
-          </a:ln>
+          <a:noFill/>
         </p:spPr>
-        <p:style>
-          <a:lnRef idx="2">
-            <a:schemeClr val="accent1">
-              <a:shade val="50000"/>
-            </a:schemeClr>
-          </a:lnRef>
-          <a:fillRef idx="1">
-            <a:schemeClr val="accent1"/>
-          </a:fillRef>
-          <a:effectRef idx="0">
-            <a:schemeClr val="accent1"/>
-          </a:effectRef>
-          <a:fontRef idx="minor">
-            <a:schemeClr val="lt1"/>
-          </a:fontRef>
-        </p:style>
-        <p:txBody>
-          <a:bodyPr/>
-          <a:p>
-            <a:pPr>
-              <a:defRPr/>
-            </a:pPr>
-            <a:r>
-              <a:rPr sz="1200">
-                <a:solidFill>
-                  <a:schemeClr val="tx1"/>
-                </a:solidFill>
-              </a:rPr>
-              <a:t>FrontEnd</a:t>
-            </a:r>
-            <a:endParaRPr sz="1200">
-              <a:solidFill>
-                <a:schemeClr val="tx1"/>
-              </a:solidFill>
-            </a:endParaRPr>
-          </a:p>
-          <a:p>
-            <a:pPr>
-              <a:defRPr/>
-            </a:pPr>
-            <a:endParaRPr sz="1200">
-              <a:solidFill>
-                <a:schemeClr val="tx1"/>
-              </a:solidFill>
-            </a:endParaRPr>
-          </a:p>
-          <a:p>
-            <a:pPr>
-              <a:defRPr/>
-            </a:pPr>
-            <a:r>
-              <a:rPr sz="1200">
-                <a:solidFill>
-                  <a:schemeClr val="tx1"/>
-                </a:solidFill>
-              </a:rPr>
-              <a:t>Functions:</a:t>
-            </a:r>
-            <a:endParaRPr sz="1200">
-              <a:solidFill>
-                <a:schemeClr val="tx1"/>
-              </a:solidFill>
-            </a:endParaRPr>
-          </a:p>
-          <a:p>
-            <a:pPr marL="283878" indent="-283878">
-              <a:buFont typeface="Arial"/>
-              <a:buChar char="–"/>
-              <a:defRPr/>
-            </a:pPr>
-            <a:r>
-              <a:rPr sz="1200">
-                <a:solidFill>
-                  <a:schemeClr val="tx1"/>
-                </a:solidFill>
-              </a:rPr>
-              <a:t>UI / UX</a:t>
-            </a:r>
-            <a:endParaRPr sz="1200">
-              <a:solidFill>
-                <a:schemeClr val="tx1"/>
-              </a:solidFill>
-            </a:endParaRPr>
-          </a:p>
-          <a:p>
-            <a:pPr marL="283878" indent="-283878">
-              <a:buFont typeface="Arial"/>
-              <a:buChar char="–"/>
-              <a:defRPr/>
-            </a:pPr>
-            <a:endParaRPr sz="1200">
-              <a:solidFill>
-                <a:schemeClr val="tx1"/>
-              </a:solidFill>
-            </a:endParaRPr>
+        <p:txBody>
+          <a:bodyPr vertOverflow="overflow" horzOverflow="overflow" vert="horz" wrap="none" lIns="91440" tIns="45720" rIns="91440" bIns="45720" numCol="1" spcCol="0" rtlCol="0" fromWordArt="0" anchor="t" anchorCtr="0" forceAA="0" upright="0" compatLnSpc="0">
+            <a:spAutoFit/>
+          </a:bodyPr>
+          <a:p>
+            <a:pPr>
+              <a:defRPr/>
+            </a:pPr>
+            <a:r>
+              <a:rPr/>
+              <a:t>Login/logout</a:t>
+            </a:r>
+            <a:endParaRPr/>
           </a:p>
         </p:txBody>
       </p:sp>
       <p:cxnSp>
         <p:nvCxnSpPr>
-          <p:cNvPr id="433327076" name=""/>
-          <p:cNvCxnSpPr>
-            <a:stCxn id="147197208" idx="3"/>
-            <a:endCxn id="1862025083" idx="1"/>
-          </p:cNvCxnSpPr>
+          <p:cNvPr id="903762901" name=""/>
+          <p:cNvCxnSpPr/>
           <p:nvPr/>
         </p:nvCxnSpPr>
         <p:spPr bwMode="auto">
-          <a:xfrm rot="0" flipH="0" flipV="1">
-            <a:off x="7771176" y="4254405"/>
-            <a:ext cx="671785" cy="1642366"/>
-          </a:xfrm>
-          <a:prstGeom prst="line">
-            <a:avLst/>
-          </a:prstGeom>
-          <a:ln w="28575" cap="flat" cmpd="sng" algn="ctr">
-            <a:solidFill>
-              <a:srgbClr val="FFC000"/>
-            </a:solidFill>
-            <a:prstDash val="sysDash"/>
-            <a:miter lim="800000"/>
-            <a:headEnd type="arrow" len="med"/>
-            <a:tailEnd type="arrow" len="med"/>
-          </a:ln>
-        </p:spPr>
-        <p:style>
-          <a:lnRef idx="1">
-            <a:schemeClr val="accent1">
-              <a:shade val="50000"/>
-            </a:schemeClr>
-          </a:lnRef>
-          <a:fillRef idx="0">
-            <a:schemeClr val="accent1"/>
-          </a:fillRef>
-          <a:effectRef idx="0">
-            <a:schemeClr val="accent1"/>
-          </a:effectRef>
-          <a:fontRef idx="minor">
-            <a:schemeClr val="tx1"/>
-          </a:fontRef>
-        </p:style>
-      </p:cxnSp>
-      <p:cxnSp>
-        <p:nvCxnSpPr>
-          <p:cNvPr id="567919703" name=""/>
-          <p:cNvCxnSpPr>
-            <a:stCxn id="147197208" idx="1"/>
-            <a:endCxn id="1467138779" idx="2"/>
-          </p:cNvCxnSpPr>
-          <p:nvPr/>
-        </p:nvCxnSpPr>
-        <p:spPr bwMode="auto">
-          <a:xfrm rot="10799989" flipH="0" flipV="0">
-            <a:off x="2917629" y="4848026"/>
-            <a:ext cx="2951312" cy="1048744"/>
-          </a:xfrm>
-          <a:prstGeom prst="line">
-            <a:avLst/>
-          </a:prstGeom>
-          <a:ln w="28575" cap="flat" cmpd="sng" algn="ctr">
-            <a:solidFill>
-              <a:srgbClr val="FFC000"/>
-            </a:solidFill>
-            <a:prstDash val="sysDash"/>
-            <a:miter lim="800000"/>
-            <a:headEnd type="arrow" len="med"/>
-            <a:tailEnd type="arrow" len="med"/>
-          </a:ln>
-        </p:spPr>
-        <p:style>
-          <a:lnRef idx="1">
-            <a:schemeClr val="accent1">
-              <a:shade val="50000"/>
-            </a:schemeClr>
-          </a:lnRef>
-          <a:fillRef idx="0">
-            <a:schemeClr val="accent1"/>
-          </a:fillRef>
-          <a:effectRef idx="0">
-            <a:schemeClr val="accent1"/>
-          </a:effectRef>
-          <a:fontRef idx="minor">
-            <a:schemeClr val="tx1"/>
-          </a:fontRef>
-        </p:style>
-      </p:cxnSp>
-      <p:cxnSp>
-        <p:nvCxnSpPr>
-          <p:cNvPr id="459115637" name=""/>
-          <p:cNvCxnSpPr>
-            <a:stCxn id="1737524108" idx="3"/>
-            <a:endCxn id="147197208" idx="1"/>
-          </p:cNvCxnSpPr>
-          <p:nvPr/>
-        </p:nvCxnSpPr>
-        <p:spPr bwMode="auto">
-          <a:xfrm rot="0" flipH="0" flipV="1">
-            <a:off x="4648537" y="5896771"/>
-            <a:ext cx="1220405" cy="294234"/>
-          </a:xfrm>
-          <a:prstGeom prst="line">
-            <a:avLst/>
-          </a:prstGeom>
-          <a:ln w="28575" cap="flat" cmpd="sng" algn="ctr">
-            <a:solidFill>
-              <a:srgbClr val="FFC000"/>
-            </a:solidFill>
-            <a:prstDash val="sysDash"/>
-            <a:miter lim="800000"/>
-            <a:headEnd type="arrow" len="med"/>
-            <a:tailEnd type="arrow" len="med"/>
-          </a:ln>
-        </p:spPr>
-        <p:style>
-          <a:lnRef idx="1">
-            <a:schemeClr val="accent1">
-              <a:shade val="50000"/>
-            </a:schemeClr>
-          </a:lnRef>
-          <a:fillRef idx="0">
-            <a:schemeClr val="accent1"/>
-          </a:fillRef>
-          <a:effectRef idx="0">
-            <a:schemeClr val="accent1"/>
-          </a:effectRef>
-          <a:fontRef idx="minor">
-            <a:schemeClr val="tx1"/>
-          </a:fontRef>
-        </p:style>
-      </p:cxnSp>
-      <p:cxnSp>
-        <p:nvCxnSpPr>
-          <p:cNvPr id="660171854" name=""/>
-          <p:cNvCxnSpPr>
-            <a:stCxn id="143777857" idx="2"/>
-            <a:endCxn id="147197208" idx="1"/>
-          </p:cNvCxnSpPr>
-          <p:nvPr/>
-        </p:nvCxnSpPr>
-        <p:spPr bwMode="auto">
-          <a:xfrm rot="5399976" flipH="0" flipV="1">
-            <a:off x="2939051" y="2966880"/>
-            <a:ext cx="1045735" cy="4814046"/>
-          </a:xfrm>
-          <a:prstGeom prst="line">
-            <a:avLst/>
-          </a:prstGeom>
-          <a:ln w="28575" cap="flat" cmpd="sng" algn="ctr">
-            <a:solidFill>
-              <a:srgbClr val="FFC000"/>
-            </a:solidFill>
-            <a:prstDash val="sysDash"/>
-            <a:miter lim="800000"/>
-            <a:headEnd type="arrow" len="med"/>
-            <a:tailEnd type="arrow" len="med"/>
-          </a:ln>
-        </p:spPr>
-        <p:style>
-          <a:lnRef idx="1">
-            <a:schemeClr val="accent1">
-              <a:shade val="50000"/>
-            </a:schemeClr>
-          </a:lnRef>
-          <a:fillRef idx="0">
-            <a:schemeClr val="accent1"/>
-          </a:fillRef>
-          <a:effectRef idx="0">
-            <a:schemeClr val="accent1"/>
-          </a:effectRef>
-          <a:fontRef idx="minor">
-            <a:schemeClr val="tx1"/>
-          </a:fontRef>
-        </p:style>
-      </p:cxnSp>
-      <p:cxnSp>
-        <p:nvCxnSpPr>
-          <p:cNvPr id="1958507396" name=""/>
-          <p:cNvCxnSpPr>
-            <a:stCxn id="1862025083" idx="1"/>
-            <a:endCxn id="833997612" idx="3"/>
-          </p:cNvCxnSpPr>
-          <p:nvPr/>
-        </p:nvCxnSpPr>
-        <p:spPr bwMode="auto">
-          <a:xfrm rot="10799989" flipH="0" flipV="0">
-            <a:off x="5902239" y="2212817"/>
-            <a:ext cx="2540721" cy="2041588"/>
+          <a:xfrm rot="10799990" flipH="0" flipV="1">
+            <a:off x="2645707" y="3384951"/>
+            <a:ext cx="991819" cy="981655"/>
           </a:xfrm>
           <a:prstGeom prst="line">
             <a:avLst/>
@@ -5208,125 +5069,14 @@
       </p:cxnSp>
       <p:sp>
         <p:nvSpPr>
-          <p:cNvPr id="1773505518" name=""/>
-          <p:cNvSpPr txBox="1"/>
-          <p:nvPr/>
-        </p:nvSpPr>
-        <p:spPr bwMode="auto">
-          <a:xfrm rot="2294214" flipH="0" flipV="0">
-            <a:off x="6618534" y="2912112"/>
-            <a:ext cx="1429286" cy="366119"/>
-          </a:xfrm>
-          <a:prstGeom prst="rect">
-            <a:avLst/>
-          </a:prstGeom>
-          <a:noFill/>
-        </p:spPr>
-        <p:txBody>
-          <a:bodyPr vertOverflow="overflow" horzOverflow="overflow" vert="horz" wrap="none" lIns="91440" tIns="45720" rIns="91440" bIns="45720" numCol="1" spcCol="0" rtlCol="0" fromWordArt="0" anchor="t" anchorCtr="0" forceAA="0" upright="0" compatLnSpc="0">
-            <a:spAutoFit/>
-          </a:bodyPr>
-          <a:p>
-            <a:pPr>
-              <a:defRPr/>
-            </a:pPr>
-            <a:r>
-              <a:rPr/>
-              <a:t>Login/logout</a:t>
-            </a:r>
-            <a:endParaRPr/>
-          </a:p>
-        </p:txBody>
-      </p:sp>
-      <p:cxnSp>
-        <p:nvCxnSpPr>
-          <p:cNvPr id="707094121" name=""/>
-          <p:cNvCxnSpPr>
-            <a:stCxn id="833997612" idx="1"/>
-            <a:endCxn id="1467138779" idx="0"/>
-          </p:cNvCxnSpPr>
-          <p:nvPr/>
-        </p:nvCxnSpPr>
-        <p:spPr bwMode="auto">
-          <a:xfrm rot="10799989" flipH="0" flipV="1">
-            <a:off x="2917629" y="2212817"/>
-            <a:ext cx="1082376" cy="1638633"/>
-          </a:xfrm>
-          <a:prstGeom prst="line">
-            <a:avLst/>
-          </a:prstGeom>
-          <a:ln w="28575" cap="flat" cmpd="sng" algn="ctr">
-            <a:solidFill>
-              <a:schemeClr val="accent2">
-                <a:lumMod val="40000"/>
-                <a:lumOff val="60000"/>
-              </a:schemeClr>
-            </a:solidFill>
-            <a:prstDash val="sysDash"/>
-            <a:miter lim="800000"/>
-            <a:headEnd type="arrow" len="med"/>
-            <a:tailEnd type="arrow" len="med"/>
-          </a:ln>
-        </p:spPr>
-        <p:style>
-          <a:lnRef idx="1">
-            <a:schemeClr val="accent1">
-              <a:shade val="50000"/>
-            </a:schemeClr>
-          </a:lnRef>
-          <a:fillRef idx="0">
-            <a:schemeClr val="accent1"/>
-          </a:fillRef>
-          <a:effectRef idx="0">
-            <a:schemeClr val="accent1"/>
-          </a:effectRef>
-          <a:fontRef idx="minor">
-            <a:schemeClr val="tx1"/>
-          </a:fontRef>
-        </p:style>
-      </p:cxnSp>
-      <p:sp>
-        <p:nvSpPr>
-          <p:cNvPr id="605799058" name=""/>
-          <p:cNvSpPr txBox="1"/>
-          <p:nvPr/>
-        </p:nvSpPr>
-        <p:spPr bwMode="auto">
-          <a:xfrm rot="4379311" flipH="0" flipV="0">
-            <a:off x="5852770" y="3714341"/>
-            <a:ext cx="1555252" cy="365759"/>
-          </a:xfrm>
-          <a:prstGeom prst="rect">
-            <a:avLst/>
-          </a:prstGeom>
-          <a:noFill/>
-        </p:spPr>
-        <p:txBody>
-          <a:bodyPr vertOverflow="overflow" horzOverflow="overflow" vert="horz" wrap="square" lIns="91440" tIns="45720" rIns="91440" bIns="45720" numCol="1" spcCol="0" rtlCol="0" fromWordArt="0" anchor="t" anchorCtr="0" forceAA="0" upright="0" compatLnSpc="0">
-            <a:spAutoFit/>
-          </a:bodyPr>
-          <a:p>
-            <a:pPr algn="l">
-              <a:defRPr/>
-            </a:pPr>
-            <a:r>
-              <a:rPr/>
-              <a:t>Auth/Autorize</a:t>
-            </a:r>
-            <a:endParaRPr/>
-          </a:p>
-        </p:txBody>
-      </p:sp>
-      <p:sp>
-        <p:nvSpPr>
-          <p:cNvPr id="751681082" name=""/>
+          <p:cNvPr id="1377032195" name=""/>
           <p:cNvSpPr/>
           <p:nvPr/>
         </p:nvSpPr>
         <p:spPr bwMode="auto">
           <a:xfrm flipH="0" flipV="0">
-            <a:off x="10062490" y="4226274"/>
-            <a:ext cx="1902233" cy="1277244"/>
+            <a:off x="9352783" y="4226274"/>
+            <a:ext cx="1902232" cy="1277244"/>
           </a:xfrm>
           <a:prstGeom prst="rect">
             <a:avLst/>
@@ -5486,14 +5236,14 @@
       </p:sp>
       <p:sp>
         <p:nvSpPr>
-          <p:cNvPr id="318127563" name=""/>
+          <p:cNvPr id="286094230" name=""/>
           <p:cNvSpPr/>
           <p:nvPr/>
         </p:nvSpPr>
         <p:spPr bwMode="auto">
           <a:xfrm flipH="0" flipV="0">
-            <a:off x="10062490" y="2746330"/>
-            <a:ext cx="1902233" cy="1277244"/>
+            <a:off x="9352783" y="2746329"/>
+            <a:ext cx="1902232" cy="1277244"/>
           </a:xfrm>
           <a:prstGeom prst="rect">
             <a:avLst/>
@@ -5653,17 +5403,14 @@
       </p:sp>
       <p:cxnSp>
         <p:nvCxnSpPr>
-          <p:cNvPr id="1074836186" name=""/>
-          <p:cNvCxnSpPr>
-            <a:stCxn id="1862025083" idx="3"/>
-            <a:endCxn id="318127563" idx="1"/>
-          </p:cNvCxnSpPr>
+          <p:cNvPr id="1131868406" name=""/>
+          <p:cNvCxnSpPr/>
           <p:nvPr/>
         </p:nvCxnSpPr>
         <p:spPr bwMode="auto">
-          <a:xfrm rot="0" flipH="0" flipV="1">
-            <a:off x="9463382" y="3384952"/>
-            <a:ext cx="599108" cy="869452"/>
+          <a:xfrm rot="0" flipH="0" flipV="0">
+            <a:off x="8400855" y="3384951"/>
+            <a:ext cx="951926" cy="0"/>
           </a:xfrm>
           <a:prstGeom prst="line">
             <a:avLst/>
@@ -5697,17 +5444,14 @@
       </p:cxnSp>
       <p:cxnSp>
         <p:nvCxnSpPr>
-          <p:cNvPr id="1780024515" name=""/>
-          <p:cNvCxnSpPr>
-            <a:stCxn id="1862025083" idx="3"/>
-            <a:endCxn id="751681082" idx="1"/>
-          </p:cNvCxnSpPr>
+          <p:cNvPr id="719009707" name=""/>
+          <p:cNvCxnSpPr/>
           <p:nvPr/>
         </p:nvCxnSpPr>
         <p:spPr bwMode="auto">
           <a:xfrm rot="0" flipH="0" flipV="0">
-            <a:off x="9463382" y="4254405"/>
-            <a:ext cx="599108" cy="610490"/>
+            <a:off x="8400855" y="3384951"/>
+            <a:ext cx="951926" cy="1479942"/>
           </a:xfrm>
           <a:prstGeom prst="line">
             <a:avLst/>
@@ -5720,6 +5464,47 @@
             </a:solidFill>
             <a:prstDash val="sysDot"/>
             <a:miter lim="800000"/>
+          </a:ln>
+        </p:spPr>
+        <p:style>
+          <a:lnRef idx="1">
+            <a:schemeClr val="accent1">
+              <a:shade val="50000"/>
+            </a:schemeClr>
+          </a:lnRef>
+          <a:fillRef idx="0">
+            <a:schemeClr val="accent1"/>
+          </a:fillRef>
+          <a:effectRef idx="0">
+            <a:schemeClr val="accent1"/>
+          </a:effectRef>
+          <a:fontRef idx="minor">
+            <a:schemeClr val="tx1"/>
+          </a:fontRef>
+        </p:style>
+      </p:cxnSp>
+      <p:cxnSp>
+        <p:nvCxnSpPr>
+          <p:cNvPr id="1047910390" name=""/>
+          <p:cNvCxnSpPr/>
+          <p:nvPr/>
+        </p:nvCxnSpPr>
+        <p:spPr bwMode="auto">
+          <a:xfrm rot="0" flipH="0" flipV="0">
+            <a:off x="8482361" y="1655473"/>
+            <a:ext cx="1821537" cy="1090854"/>
+          </a:xfrm>
+          <a:prstGeom prst="line">
+            <a:avLst/>
+          </a:prstGeom>
+          <a:ln w="28575" cap="flat" cmpd="sng" algn="ctr">
+            <a:solidFill>
+              <a:srgbClr val="FFC000"/>
+            </a:solidFill>
+            <a:prstDash val="sysDash"/>
+            <a:miter lim="800000"/>
+            <a:headEnd type="arrow" len="med"/>
+            <a:tailEnd type="arrow" len="med"/>
           </a:ln>
         </p:spPr>
         <p:style>
@@ -5774,7 +5559,2025 @@
       </p:grpSpPr>
       <p:sp>
         <p:nvSpPr>
-          <p:cNvPr id="510921233" name=""/>
+          <p:cNvPr id="1989326985" name=""/>
+          <p:cNvSpPr/>
+          <p:nvPr/>
+        </p:nvSpPr>
+        <p:spPr bwMode="auto">
+          <a:xfrm flipH="0" flipV="0">
+            <a:off x="-10582" y="-10582"/>
+            <a:ext cx="12213165" cy="6868581"/>
+          </a:xfrm>
+          <a:prstGeom prst="rect">
+            <a:avLst/>
+          </a:prstGeom>
+          <a:noFill/>
+          <a:ln w="12699" cap="flat" cmpd="sng" algn="ctr">
+            <a:solidFill>
+              <a:schemeClr val="tx1"/>
+            </a:solidFill>
+            <a:prstDash val="solid"/>
+            <a:miter lim="800000"/>
+          </a:ln>
+        </p:spPr>
+        <p:style>
+          <a:lnRef idx="2">
+            <a:schemeClr val="accent1">
+              <a:shade val="50000"/>
+            </a:schemeClr>
+          </a:lnRef>
+          <a:fillRef idx="1">
+            <a:schemeClr val="accent1"/>
+          </a:fillRef>
+          <a:effectRef idx="0">
+            <a:schemeClr val="accent1"/>
+          </a:effectRef>
+          <a:fontRef idx="minor">
+            <a:schemeClr val="lt1"/>
+          </a:fontRef>
+        </p:style>
+        <p:txBody>
+          <a:bodyPr/>
+          <a:p>
+            <a:pPr>
+              <a:defRPr/>
+            </a:pPr>
+            <a:endParaRPr/>
+          </a:p>
+        </p:txBody>
+      </p:sp>
+      <p:sp>
+        <p:nvSpPr>
+          <p:cNvPr id="1938131776" name=""/>
+          <p:cNvSpPr/>
+          <p:nvPr/>
+        </p:nvSpPr>
+        <p:spPr bwMode="auto">
+          <a:xfrm flipH="0" flipV="0">
+            <a:off x="2052174" y="3851451"/>
+            <a:ext cx="1730907" cy="996574"/>
+          </a:xfrm>
+          <a:prstGeom prst="rect">
+            <a:avLst/>
+          </a:prstGeom>
+          <a:solidFill>
+            <a:schemeClr val="bg1"/>
+          </a:solidFill>
+          <a:ln w="38099" cap="flat" cmpd="sng" algn="ctr">
+            <a:solidFill>
+              <a:srgbClr val="FF0000"/>
+            </a:solidFill>
+            <a:prstDash val="solid"/>
+            <a:miter lim="800000"/>
+          </a:ln>
+        </p:spPr>
+        <p:style>
+          <a:lnRef idx="2">
+            <a:schemeClr val="accent1">
+              <a:shade val="50000"/>
+            </a:schemeClr>
+          </a:lnRef>
+          <a:fillRef idx="1">
+            <a:schemeClr val="accent1"/>
+          </a:fillRef>
+          <a:effectRef idx="0">
+            <a:schemeClr val="accent1"/>
+          </a:effectRef>
+          <a:fontRef idx="minor">
+            <a:schemeClr val="lt1"/>
+          </a:fontRef>
+        </p:style>
+        <p:txBody>
+          <a:bodyPr/>
+          <a:p>
+            <a:pPr>
+              <a:defRPr/>
+            </a:pPr>
+            <a:r>
+              <a:rPr sz="1200">
+                <a:solidFill>
+                  <a:schemeClr val="tx1"/>
+                </a:solidFill>
+              </a:rPr>
+              <a:t>Redis DB</a:t>
+            </a:r>
+            <a:endParaRPr sz="1200">
+              <a:solidFill>
+                <a:schemeClr val="tx1"/>
+              </a:solidFill>
+            </a:endParaRPr>
+          </a:p>
+          <a:p>
+            <a:pPr>
+              <a:defRPr/>
+            </a:pPr>
+            <a:endParaRPr sz="1200">
+              <a:solidFill>
+                <a:schemeClr val="tx1"/>
+              </a:solidFill>
+            </a:endParaRPr>
+          </a:p>
+          <a:p>
+            <a:pPr>
+              <a:defRPr/>
+            </a:pPr>
+            <a:r>
+              <a:rPr sz="1200">
+                <a:solidFill>
+                  <a:schemeClr val="tx1"/>
+                </a:solidFill>
+              </a:rPr>
+              <a:t>Tech: DB</a:t>
+            </a:r>
+            <a:endParaRPr sz="1200">
+              <a:solidFill>
+                <a:schemeClr val="tx1"/>
+              </a:solidFill>
+            </a:endParaRPr>
+          </a:p>
+          <a:p>
+            <a:pPr>
+              <a:defRPr/>
+            </a:pPr>
+            <a:r>
+              <a:rPr sz="1200">
+                <a:solidFill>
+                  <a:schemeClr val="tx1"/>
+                </a:solidFill>
+              </a:rPr>
+              <a:t>Running on: Docker</a:t>
+            </a:r>
+            <a:endParaRPr sz="1200">
+              <a:solidFill>
+                <a:schemeClr val="tx1"/>
+              </a:solidFill>
+            </a:endParaRPr>
+          </a:p>
+        </p:txBody>
+      </p:sp>
+      <p:sp>
+        <p:nvSpPr>
+          <p:cNvPr id="814003918" name=""/>
+          <p:cNvSpPr/>
+          <p:nvPr/>
+        </p:nvSpPr>
+        <p:spPr bwMode="auto">
+          <a:xfrm flipH="0" flipV="0">
+            <a:off x="4088876" y="3896851"/>
+            <a:ext cx="1724492" cy="905771"/>
+          </a:xfrm>
+          <a:prstGeom prst="rect">
+            <a:avLst/>
+          </a:prstGeom>
+          <a:solidFill>
+            <a:schemeClr val="bg1"/>
+          </a:solidFill>
+          <a:ln w="38099" cap="flat" cmpd="sng" algn="ctr">
+            <a:solidFill>
+              <a:schemeClr val="bg1">
+                <a:lumMod val="65098"/>
+              </a:schemeClr>
+            </a:solidFill>
+            <a:prstDash val="solid"/>
+            <a:miter lim="800000"/>
+          </a:ln>
+        </p:spPr>
+        <p:style>
+          <a:lnRef idx="2">
+            <a:schemeClr val="accent1">
+              <a:shade val="50000"/>
+            </a:schemeClr>
+          </a:lnRef>
+          <a:fillRef idx="1">
+            <a:schemeClr val="accent1"/>
+          </a:fillRef>
+          <a:effectRef idx="0">
+            <a:schemeClr val="accent1"/>
+          </a:effectRef>
+          <a:fontRef idx="minor">
+            <a:schemeClr val="lt1"/>
+          </a:fontRef>
+        </p:style>
+        <p:txBody>
+          <a:bodyPr/>
+          <a:p>
+            <a:pPr>
+              <a:defRPr/>
+            </a:pPr>
+            <a:r>
+              <a:rPr sz="1200">
+                <a:solidFill>
+                  <a:schemeClr val="tx1"/>
+                </a:solidFill>
+              </a:rPr>
+              <a:t>External API</a:t>
+            </a:r>
+            <a:endParaRPr sz="1200">
+              <a:solidFill>
+                <a:schemeClr val="tx1"/>
+              </a:solidFill>
+            </a:endParaRPr>
+          </a:p>
+          <a:p>
+            <a:pPr>
+              <a:defRPr/>
+            </a:pPr>
+            <a:endParaRPr sz="1200">
+              <a:solidFill>
+                <a:schemeClr val="tx1"/>
+              </a:solidFill>
+            </a:endParaRPr>
+          </a:p>
+          <a:p>
+            <a:pPr marL="217791" indent="-217791">
+              <a:buFont typeface="Arial"/>
+              <a:buChar char="–"/>
+              <a:defRPr/>
+            </a:pPr>
+            <a:r>
+              <a:rPr sz="1200">
+                <a:solidFill>
+                  <a:schemeClr val="tx1"/>
+                </a:solidFill>
+              </a:rPr>
+              <a:t>Login com Google/Facebook </a:t>
+            </a:r>
+            <a:endParaRPr sz="1200">
+              <a:solidFill>
+                <a:schemeClr val="tx1"/>
+              </a:solidFill>
+            </a:endParaRPr>
+          </a:p>
+        </p:txBody>
+      </p:sp>
+      <p:sp>
+        <p:nvSpPr>
+          <p:cNvPr id="55169821" name="Título 1"/>
+          <p:cNvSpPr>
+            <a:spLocks noGrp="1"/>
+          </p:cNvSpPr>
+          <p:nvPr>
+            <p:ph type="title"/>
+          </p:nvPr>
+        </p:nvSpPr>
+        <p:spPr bwMode="auto">
+          <a:xfrm flipH="0" flipV="0">
+            <a:off x="46953" y="10270"/>
+            <a:ext cx="10151034" cy="855069"/>
+          </a:xfrm>
+        </p:spPr>
+        <p:txBody>
+          <a:bodyPr/>
+          <a:lstStyle/>
+          <a:p>
+            <a:pPr>
+              <a:defRPr/>
+            </a:pPr>
+            <a:r>
+              <a:rPr sz="2800"/>
+              <a:t>Neo Training Server - </a:t>
+            </a:r>
+            <a:r>
+              <a:rPr lang="pt-PT" sz="2800" b="0" i="0" u="none" strike="noStrike" cap="none" spc="0">
+                <a:solidFill>
+                  <a:schemeClr val="tx1"/>
+                </a:solidFill>
+                <a:latin typeface="Arial"/>
+                <a:ea typeface="Arial"/>
+                <a:cs typeface="Arial"/>
+              </a:rPr>
+              <a:t>MicroServices</a:t>
+            </a:r>
+            <a:r>
+              <a:rPr sz="2800"/>
+              <a:t> Hell Tech Stack</a:t>
+            </a:r>
+            <a:endParaRPr sz="2800"/>
+          </a:p>
+        </p:txBody>
+      </p:sp>
+      <p:sp>
+        <p:nvSpPr>
+          <p:cNvPr id="2031861097" name=""/>
+          <p:cNvSpPr/>
+          <p:nvPr/>
+        </p:nvSpPr>
+        <p:spPr bwMode="auto">
+          <a:xfrm flipH="0" flipV="0">
+            <a:off x="189441" y="3854459"/>
+            <a:ext cx="1730907" cy="996574"/>
+          </a:xfrm>
+          <a:prstGeom prst="rect">
+            <a:avLst/>
+          </a:prstGeom>
+          <a:solidFill>
+            <a:schemeClr val="bg1"/>
+          </a:solidFill>
+          <a:ln w="38099" cap="flat" cmpd="sng" algn="ctr">
+            <a:solidFill>
+              <a:srgbClr val="002060"/>
+            </a:solidFill>
+            <a:prstDash val="solid"/>
+            <a:miter lim="800000"/>
+          </a:ln>
+        </p:spPr>
+        <p:style>
+          <a:lnRef idx="2">
+            <a:schemeClr val="accent1">
+              <a:shade val="50000"/>
+            </a:schemeClr>
+          </a:lnRef>
+          <a:fillRef idx="1">
+            <a:schemeClr val="accent1"/>
+          </a:fillRef>
+          <a:effectRef idx="0">
+            <a:schemeClr val="accent1"/>
+          </a:effectRef>
+          <a:fontRef idx="minor">
+            <a:schemeClr val="lt1"/>
+          </a:fontRef>
+        </p:style>
+        <p:txBody>
+          <a:bodyPr/>
+          <a:p>
+            <a:pPr>
+              <a:defRPr/>
+            </a:pPr>
+            <a:r>
+              <a:rPr sz="1200">
+                <a:solidFill>
+                  <a:schemeClr val="tx1"/>
+                </a:solidFill>
+              </a:rPr>
+              <a:t>DataBase</a:t>
+            </a:r>
+            <a:endParaRPr sz="1200">
+              <a:solidFill>
+                <a:schemeClr val="tx1"/>
+              </a:solidFill>
+            </a:endParaRPr>
+          </a:p>
+          <a:p>
+            <a:pPr>
+              <a:defRPr/>
+            </a:pPr>
+            <a:endParaRPr sz="1200">
+              <a:solidFill>
+                <a:schemeClr val="tx1"/>
+              </a:solidFill>
+            </a:endParaRPr>
+          </a:p>
+          <a:p>
+            <a:pPr>
+              <a:defRPr/>
+            </a:pPr>
+            <a:r>
+              <a:rPr sz="1200">
+                <a:solidFill>
+                  <a:schemeClr val="tx1"/>
+                </a:solidFill>
+              </a:rPr>
+              <a:t>Tech: DB MySQL</a:t>
+            </a:r>
+            <a:endParaRPr sz="1200">
+              <a:solidFill>
+                <a:schemeClr val="tx1"/>
+              </a:solidFill>
+            </a:endParaRPr>
+          </a:p>
+          <a:p>
+            <a:pPr>
+              <a:defRPr/>
+            </a:pPr>
+            <a:r>
+              <a:rPr sz="1200">
+                <a:solidFill>
+                  <a:schemeClr val="tx1"/>
+                </a:solidFill>
+              </a:rPr>
+              <a:t>Running on: Docker</a:t>
+            </a:r>
+            <a:endParaRPr sz="1200">
+              <a:solidFill>
+                <a:schemeClr val="tx1"/>
+              </a:solidFill>
+            </a:endParaRPr>
+          </a:p>
+        </p:txBody>
+      </p:sp>
+      <p:sp>
+        <p:nvSpPr>
+          <p:cNvPr id="520749008" name=""/>
+          <p:cNvSpPr/>
+          <p:nvPr/>
+        </p:nvSpPr>
+        <p:spPr bwMode="auto">
+          <a:xfrm flipH="0" flipV="0">
+            <a:off x="4000005" y="862332"/>
+            <a:ext cx="1902232" cy="2700965"/>
+          </a:xfrm>
+          <a:prstGeom prst="rect">
+            <a:avLst/>
+          </a:prstGeom>
+          <a:solidFill>
+            <a:schemeClr val="bg1"/>
+          </a:solidFill>
+          <a:ln w="38099" cap="flat" cmpd="sng" algn="ctr">
+            <a:solidFill>
+              <a:srgbClr val="00B0F0"/>
+            </a:solidFill>
+            <a:prstDash val="solid"/>
+            <a:miter lim="800000"/>
+          </a:ln>
+        </p:spPr>
+        <p:style>
+          <a:lnRef idx="2">
+            <a:schemeClr val="accent1">
+              <a:shade val="50000"/>
+            </a:schemeClr>
+          </a:lnRef>
+          <a:fillRef idx="1">
+            <a:schemeClr val="accent1"/>
+          </a:fillRef>
+          <a:effectRef idx="0">
+            <a:schemeClr val="accent1"/>
+          </a:effectRef>
+          <a:fontRef idx="minor">
+            <a:schemeClr val="lt1"/>
+          </a:fontRef>
+        </p:style>
+        <p:txBody>
+          <a:bodyPr/>
+          <a:p>
+            <a:pPr>
+              <a:defRPr/>
+            </a:pPr>
+            <a:r>
+              <a:rPr sz="1200">
+                <a:solidFill>
+                  <a:schemeClr val="tx1"/>
+                </a:solidFill>
+              </a:rPr>
+              <a:t>Auth Service</a:t>
+            </a:r>
+            <a:endParaRPr sz="1200">
+              <a:solidFill>
+                <a:schemeClr val="tx1"/>
+              </a:solidFill>
+            </a:endParaRPr>
+          </a:p>
+          <a:p>
+            <a:pPr>
+              <a:defRPr/>
+            </a:pPr>
+            <a:endParaRPr sz="1200">
+              <a:solidFill>
+                <a:schemeClr val="tx1"/>
+              </a:solidFill>
+            </a:endParaRPr>
+          </a:p>
+          <a:p>
+            <a:pPr>
+              <a:defRPr/>
+            </a:pPr>
+            <a:r>
+              <a:rPr sz="1200">
+                <a:solidFill>
+                  <a:schemeClr val="tx1"/>
+                </a:solidFill>
+              </a:rPr>
+              <a:t>Tech:</a:t>
+            </a:r>
+            <a:r>
+              <a:rPr sz="1200">
+                <a:solidFill>
+                  <a:schemeClr val="tx1"/>
+                </a:solidFill>
+              </a:rPr>
+              <a:t> C# .NET Service</a:t>
+            </a:r>
+            <a:endParaRPr sz="1200">
+              <a:solidFill>
+                <a:schemeClr val="tx1"/>
+              </a:solidFill>
+            </a:endParaRPr>
+          </a:p>
+          <a:p>
+            <a:pPr>
+              <a:defRPr/>
+            </a:pPr>
+            <a:r>
+              <a:rPr sz="1200">
+                <a:solidFill>
+                  <a:schemeClr val="tx1"/>
+                </a:solidFill>
+              </a:rPr>
+              <a:t>Running on: PC</a:t>
+            </a:r>
+            <a:endParaRPr sz="1200">
+              <a:solidFill>
+                <a:schemeClr val="tx1"/>
+              </a:solidFill>
+            </a:endParaRPr>
+          </a:p>
+          <a:p>
+            <a:pPr>
+              <a:defRPr/>
+            </a:pPr>
+            <a:r>
+              <a:rPr sz="1200">
+                <a:solidFill>
+                  <a:schemeClr val="tx1"/>
+                </a:solidFill>
+              </a:rPr>
+              <a:t>Functions:</a:t>
+            </a:r>
+            <a:endParaRPr sz="1200">
+              <a:solidFill>
+                <a:schemeClr val="tx1"/>
+              </a:solidFill>
+            </a:endParaRPr>
+          </a:p>
+          <a:p>
+            <a:pPr marL="261848" indent="-261848">
+              <a:buFont typeface="Arial"/>
+              <a:buChar char="–"/>
+              <a:defRPr/>
+            </a:pPr>
+            <a:r>
+              <a:rPr sz="1200">
+                <a:solidFill>
+                  <a:schemeClr val="tx1"/>
+                </a:solidFill>
+              </a:rPr>
+              <a:t>Create Acount</a:t>
+            </a:r>
+            <a:endParaRPr sz="1200">
+              <a:solidFill>
+                <a:schemeClr val="tx1"/>
+              </a:solidFill>
+            </a:endParaRPr>
+          </a:p>
+          <a:p>
+            <a:pPr marL="283878" indent="-283878">
+              <a:buFont typeface="Arial"/>
+              <a:buChar char="–"/>
+              <a:defRPr/>
+            </a:pPr>
+            <a:r>
+              <a:rPr sz="1200">
+                <a:solidFill>
+                  <a:schemeClr val="tx1"/>
+                </a:solidFill>
+              </a:rPr>
+              <a:t>Login (2FA)</a:t>
+            </a:r>
+            <a:endParaRPr sz="1200">
+              <a:solidFill>
+                <a:schemeClr val="tx1"/>
+              </a:solidFill>
+            </a:endParaRPr>
+          </a:p>
+          <a:p>
+            <a:pPr marL="283878" indent="-283878">
+              <a:buFont typeface="Arial"/>
+              <a:buChar char="–"/>
+              <a:defRPr/>
+            </a:pPr>
+            <a:r>
+              <a:rPr sz="1200">
+                <a:solidFill>
+                  <a:schemeClr val="tx1"/>
+                </a:solidFill>
+              </a:rPr>
+              <a:t>Logout</a:t>
+            </a:r>
+            <a:endParaRPr sz="1200">
+              <a:solidFill>
+                <a:schemeClr val="tx1"/>
+              </a:solidFill>
+            </a:endParaRPr>
+          </a:p>
+          <a:p>
+            <a:pPr marL="283878" indent="-283878">
+              <a:buFont typeface="Arial"/>
+              <a:buChar char="–"/>
+              <a:defRPr/>
+            </a:pPr>
+            <a:r>
+              <a:rPr sz="1200">
+                <a:solidFill>
+                  <a:schemeClr val="tx1"/>
+                </a:solidFill>
+              </a:rPr>
+              <a:t>Auth User</a:t>
+            </a:r>
+            <a:endParaRPr sz="1200">
+              <a:solidFill>
+                <a:schemeClr val="tx1"/>
+              </a:solidFill>
+            </a:endParaRPr>
+          </a:p>
+          <a:p>
+            <a:pPr marL="283878" indent="-283878">
+              <a:buFont typeface="Arial"/>
+              <a:buChar char="–"/>
+              <a:defRPr/>
+            </a:pPr>
+            <a:r>
+              <a:rPr sz="1200">
+                <a:solidFill>
+                  <a:schemeClr val="tx1"/>
+                </a:solidFill>
+              </a:rPr>
+              <a:t>Autorize User</a:t>
+            </a:r>
+            <a:endParaRPr sz="1200">
+              <a:solidFill>
+                <a:schemeClr val="tx1"/>
+              </a:solidFill>
+            </a:endParaRPr>
+          </a:p>
+          <a:p>
+            <a:pPr marL="283878" indent="-283878">
+              <a:buFont typeface="Arial"/>
+              <a:buChar char="–"/>
+              <a:defRPr/>
+            </a:pPr>
+            <a:r>
+              <a:rPr sz="1200">
+                <a:solidFill>
+                  <a:schemeClr val="tx1"/>
+                </a:solidFill>
+              </a:rPr>
+              <a:t>Expire Tokens</a:t>
+            </a:r>
+            <a:endParaRPr sz="1200">
+              <a:solidFill>
+                <a:schemeClr val="tx1"/>
+              </a:solidFill>
+            </a:endParaRPr>
+          </a:p>
+          <a:p>
+            <a:pPr marL="283878" indent="-283878">
+              <a:buFont typeface="Arial"/>
+              <a:buChar char="–"/>
+              <a:defRPr/>
+            </a:pPr>
+            <a:r>
+              <a:rPr sz="1200">
+                <a:solidFill>
+                  <a:schemeClr val="tx1"/>
+                </a:solidFill>
+              </a:rPr>
+              <a:t>Rotate Tokens</a:t>
+            </a:r>
+            <a:endParaRPr sz="1200">
+              <a:solidFill>
+                <a:schemeClr val="tx1"/>
+              </a:solidFill>
+            </a:endParaRPr>
+          </a:p>
+          <a:p>
+            <a:pPr marL="283878" indent="-283878">
+              <a:buFont typeface="Arial"/>
+              <a:buChar char="–"/>
+              <a:defRPr/>
+            </a:pPr>
+            <a:endParaRPr sz="1200">
+              <a:solidFill>
+                <a:schemeClr val="tx1"/>
+              </a:solidFill>
+            </a:endParaRPr>
+          </a:p>
+          <a:p>
+            <a:pPr marL="283878" indent="-283878">
+              <a:buFont typeface="Arial"/>
+              <a:buChar char="–"/>
+              <a:defRPr/>
+            </a:pPr>
+            <a:r>
+              <a:rPr sz="1200">
+                <a:solidFill>
+                  <a:schemeClr val="tx1"/>
+                </a:solidFill>
+              </a:rPr>
+              <a:t>Google / Facebook</a:t>
+            </a:r>
+            <a:endParaRPr sz="1200">
+              <a:solidFill>
+                <a:schemeClr val="tx1"/>
+              </a:solidFill>
+            </a:endParaRPr>
+          </a:p>
+        </p:txBody>
+      </p:sp>
+      <p:sp>
+        <p:nvSpPr>
+          <p:cNvPr id="652237755" name=""/>
+          <p:cNvSpPr/>
+          <p:nvPr/>
+        </p:nvSpPr>
+        <p:spPr bwMode="auto">
+          <a:xfrm flipH="0" flipV="0">
+            <a:off x="2917629" y="5840634"/>
+            <a:ext cx="1730907" cy="700740"/>
+          </a:xfrm>
+          <a:prstGeom prst="rect">
+            <a:avLst/>
+          </a:prstGeom>
+          <a:solidFill>
+            <a:schemeClr val="bg1"/>
+          </a:solidFill>
+          <a:ln w="38099" cap="flat" cmpd="sng" algn="ctr">
+            <a:solidFill>
+              <a:schemeClr val="bg1">
+                <a:lumMod val="65098"/>
+              </a:schemeClr>
+            </a:solidFill>
+            <a:prstDash val="solid"/>
+            <a:miter lim="800000"/>
+          </a:ln>
+        </p:spPr>
+        <p:style>
+          <a:lnRef idx="2">
+            <a:schemeClr val="accent1">
+              <a:shade val="50000"/>
+            </a:schemeClr>
+          </a:lnRef>
+          <a:fillRef idx="1">
+            <a:schemeClr val="accent1"/>
+          </a:fillRef>
+          <a:effectRef idx="0">
+            <a:schemeClr val="accent1"/>
+          </a:effectRef>
+          <a:fontRef idx="minor">
+            <a:schemeClr val="lt1"/>
+          </a:fontRef>
+        </p:style>
+        <p:txBody>
+          <a:bodyPr/>
+          <a:p>
+            <a:pPr>
+              <a:defRPr/>
+            </a:pPr>
+            <a:r>
+              <a:rPr sz="1200">
+                <a:solidFill>
+                  <a:schemeClr val="tx1"/>
+                </a:solidFill>
+              </a:rPr>
+              <a:t>External API</a:t>
+            </a:r>
+            <a:endParaRPr sz="1200">
+              <a:solidFill>
+                <a:schemeClr val="tx1"/>
+              </a:solidFill>
+            </a:endParaRPr>
+          </a:p>
+          <a:p>
+            <a:pPr>
+              <a:defRPr/>
+            </a:pPr>
+            <a:endParaRPr sz="1200">
+              <a:solidFill>
+                <a:schemeClr val="tx1"/>
+              </a:solidFill>
+            </a:endParaRPr>
+          </a:p>
+          <a:p>
+            <a:pPr marL="217791" indent="-217791">
+              <a:buFont typeface="Arial"/>
+              <a:buChar char="–"/>
+              <a:defRPr/>
+            </a:pPr>
+            <a:r>
+              <a:rPr sz="1200">
+                <a:solidFill>
+                  <a:schemeClr val="tx1"/>
+                </a:solidFill>
+              </a:rPr>
+              <a:t>ChatBot</a:t>
+            </a:r>
+            <a:endParaRPr sz="1200">
+              <a:solidFill>
+                <a:schemeClr val="tx1"/>
+              </a:solidFill>
+            </a:endParaRPr>
+          </a:p>
+        </p:txBody>
+      </p:sp>
+      <p:sp>
+        <p:nvSpPr>
+          <p:cNvPr id="1279569497" name=""/>
+          <p:cNvSpPr/>
+          <p:nvPr/>
+        </p:nvSpPr>
+        <p:spPr bwMode="auto">
+          <a:xfrm flipH="0" flipV="0">
+            <a:off x="5868941" y="5171283"/>
+            <a:ext cx="1902232" cy="1450973"/>
+          </a:xfrm>
+          <a:prstGeom prst="rect">
+            <a:avLst/>
+          </a:prstGeom>
+          <a:solidFill>
+            <a:schemeClr val="bg1"/>
+          </a:solidFill>
+          <a:ln w="38099" cap="flat" cmpd="sng" algn="ctr">
+            <a:solidFill>
+              <a:srgbClr val="92D050"/>
+            </a:solidFill>
+            <a:prstDash val="solid"/>
+            <a:miter lim="800000"/>
+          </a:ln>
+        </p:spPr>
+        <p:style>
+          <a:lnRef idx="2">
+            <a:schemeClr val="accent1">
+              <a:shade val="50000"/>
+            </a:schemeClr>
+          </a:lnRef>
+          <a:fillRef idx="1">
+            <a:schemeClr val="accent1"/>
+          </a:fillRef>
+          <a:effectRef idx="0">
+            <a:schemeClr val="accent1"/>
+          </a:effectRef>
+          <a:fontRef idx="minor">
+            <a:schemeClr val="lt1"/>
+          </a:fontRef>
+        </p:style>
+        <p:txBody>
+          <a:bodyPr/>
+          <a:p>
+            <a:pPr>
+              <a:defRPr/>
+            </a:pPr>
+            <a:r>
+              <a:rPr sz="1200">
+                <a:solidFill>
+                  <a:schemeClr val="tx1"/>
+                </a:solidFill>
+              </a:rPr>
+              <a:t>RestAPI (BD &lt;=&gt; User)</a:t>
+            </a:r>
+            <a:endParaRPr sz="1200">
+              <a:solidFill>
+                <a:schemeClr val="tx1"/>
+              </a:solidFill>
+            </a:endParaRPr>
+          </a:p>
+          <a:p>
+            <a:pPr>
+              <a:defRPr/>
+            </a:pPr>
+            <a:endParaRPr sz="1200">
+              <a:solidFill>
+                <a:schemeClr val="tx1"/>
+              </a:solidFill>
+            </a:endParaRPr>
+          </a:p>
+          <a:p>
+            <a:pPr>
+              <a:defRPr/>
+            </a:pPr>
+            <a:r>
+              <a:rPr sz="1200">
+                <a:solidFill>
+                  <a:schemeClr val="tx1"/>
+                </a:solidFill>
+              </a:rPr>
+              <a:t>Tech:</a:t>
+            </a:r>
+            <a:r>
+              <a:rPr sz="1200">
+                <a:solidFill>
+                  <a:schemeClr val="tx1"/>
+                </a:solidFill>
+              </a:rPr>
+              <a:t> C# .NET</a:t>
+            </a:r>
+            <a:endParaRPr sz="1200">
+              <a:solidFill>
+                <a:schemeClr val="tx1"/>
+              </a:solidFill>
+            </a:endParaRPr>
+          </a:p>
+          <a:p>
+            <a:pPr>
+              <a:defRPr/>
+            </a:pPr>
+            <a:r>
+              <a:rPr sz="1200">
+                <a:solidFill>
+                  <a:schemeClr val="tx1"/>
+                </a:solidFill>
+              </a:rPr>
+              <a:t>Running on: PC</a:t>
+            </a:r>
+            <a:endParaRPr sz="1200">
+              <a:solidFill>
+                <a:schemeClr val="tx1"/>
+              </a:solidFill>
+            </a:endParaRPr>
+          </a:p>
+          <a:p>
+            <a:pPr>
+              <a:defRPr/>
+            </a:pPr>
+            <a:r>
+              <a:rPr sz="1200">
+                <a:solidFill>
+                  <a:schemeClr val="tx1"/>
+                </a:solidFill>
+              </a:rPr>
+              <a:t>Functions:</a:t>
+            </a:r>
+            <a:endParaRPr sz="1200">
+              <a:solidFill>
+                <a:schemeClr val="tx1"/>
+              </a:solidFill>
+            </a:endParaRPr>
+          </a:p>
+          <a:p>
+            <a:pPr marL="283878" indent="-283878">
+              <a:buFont typeface="Arial"/>
+              <a:buChar char="–"/>
+              <a:defRPr/>
+            </a:pPr>
+            <a:r>
+              <a:rPr sz="1200">
+                <a:solidFill>
+                  <a:schemeClr val="tx1"/>
+                </a:solidFill>
+              </a:rPr>
+              <a:t>Handle DB</a:t>
+            </a:r>
+            <a:endParaRPr sz="1200">
+              <a:solidFill>
+                <a:schemeClr val="tx1"/>
+              </a:solidFill>
+            </a:endParaRPr>
+          </a:p>
+        </p:txBody>
+      </p:sp>
+      <p:cxnSp>
+        <p:nvCxnSpPr>
+          <p:cNvPr id="1932786060" name=""/>
+          <p:cNvCxnSpPr>
+            <a:stCxn id="2031861097" idx="0"/>
+            <a:endCxn id="520749008" idx="1"/>
+          </p:cNvCxnSpPr>
+          <p:nvPr/>
+        </p:nvCxnSpPr>
+        <p:spPr bwMode="auto">
+          <a:xfrm rot="16199934" flipH="0" flipV="0">
+            <a:off x="1706628" y="1561082"/>
+            <a:ext cx="1641641" cy="2945109"/>
+          </a:xfrm>
+          <a:prstGeom prst="line">
+            <a:avLst/>
+          </a:prstGeom>
+          <a:ln w="28575" cap="flat" cmpd="sng" algn="ctr">
+            <a:solidFill>
+              <a:schemeClr val="accent2">
+                <a:lumMod val="40000"/>
+                <a:lumOff val="60000"/>
+              </a:schemeClr>
+            </a:solidFill>
+            <a:prstDash val="sysDash"/>
+            <a:miter lim="800000"/>
+            <a:headEnd type="arrow" len="med"/>
+            <a:tailEnd type="arrow" len="med"/>
+          </a:ln>
+        </p:spPr>
+        <p:style>
+          <a:lnRef idx="1">
+            <a:schemeClr val="accent1">
+              <a:shade val="50000"/>
+            </a:schemeClr>
+          </a:lnRef>
+          <a:fillRef idx="0">
+            <a:schemeClr val="accent1"/>
+          </a:fillRef>
+          <a:effectRef idx="0">
+            <a:schemeClr val="accent1"/>
+          </a:effectRef>
+          <a:fontRef idx="minor">
+            <a:schemeClr val="tx1"/>
+          </a:fontRef>
+        </p:style>
+      </p:cxnSp>
+      <p:cxnSp>
+        <p:nvCxnSpPr>
+          <p:cNvPr id="2003768593" name=""/>
+          <p:cNvCxnSpPr>
+            <a:stCxn id="1279569497" idx="0"/>
+            <a:endCxn id="520749008" idx="3"/>
+          </p:cNvCxnSpPr>
+          <p:nvPr/>
+        </p:nvCxnSpPr>
+        <p:spPr bwMode="auto">
+          <a:xfrm rot="16199934" flipH="0" flipV="1">
+            <a:off x="4881916" y="3233138"/>
+            <a:ext cx="2958467" cy="917818"/>
+          </a:xfrm>
+          <a:prstGeom prst="line">
+            <a:avLst/>
+          </a:prstGeom>
+          <a:ln w="28575" cap="flat" cmpd="sng" algn="ctr">
+            <a:solidFill>
+              <a:schemeClr val="accent2">
+                <a:lumMod val="40000"/>
+                <a:lumOff val="60000"/>
+              </a:schemeClr>
+            </a:solidFill>
+            <a:prstDash val="sysDash"/>
+            <a:miter lim="800000"/>
+            <a:headEnd type="arrow" len="med"/>
+            <a:tailEnd type="arrow" len="med"/>
+          </a:ln>
+        </p:spPr>
+        <p:style>
+          <a:lnRef idx="1">
+            <a:schemeClr val="accent1">
+              <a:shade val="50000"/>
+            </a:schemeClr>
+          </a:lnRef>
+          <a:fillRef idx="0">
+            <a:schemeClr val="accent1"/>
+          </a:fillRef>
+          <a:effectRef idx="0">
+            <a:schemeClr val="accent1"/>
+          </a:effectRef>
+          <a:fontRef idx="minor">
+            <a:schemeClr val="tx1"/>
+          </a:fontRef>
+        </p:style>
+      </p:cxnSp>
+      <p:cxnSp>
+        <p:nvCxnSpPr>
+          <p:cNvPr id="1032353446" name=""/>
+          <p:cNvCxnSpPr>
+            <a:stCxn id="814003918" idx="0"/>
+            <a:endCxn id="520749008" idx="2"/>
+          </p:cNvCxnSpPr>
+          <p:nvPr/>
+        </p:nvCxnSpPr>
+        <p:spPr bwMode="auto">
+          <a:xfrm rot="16199934" flipH="0" flipV="1">
+            <a:off x="4784347" y="3730075"/>
+            <a:ext cx="333550" cy="0"/>
+          </a:xfrm>
+          <a:prstGeom prst="line">
+            <a:avLst/>
+          </a:prstGeom>
+          <a:ln w="28575" cap="flat" cmpd="sng" algn="ctr">
+            <a:solidFill>
+              <a:schemeClr val="accent2">
+                <a:lumMod val="40000"/>
+                <a:lumOff val="60000"/>
+              </a:schemeClr>
+            </a:solidFill>
+            <a:prstDash val="sysDash"/>
+            <a:miter lim="800000"/>
+            <a:headEnd type="arrow" len="med"/>
+            <a:tailEnd type="arrow" len="med"/>
+          </a:ln>
+        </p:spPr>
+        <p:style>
+          <a:lnRef idx="1">
+            <a:schemeClr val="accent1">
+              <a:shade val="50000"/>
+            </a:schemeClr>
+          </a:lnRef>
+          <a:fillRef idx="0">
+            <a:schemeClr val="accent1"/>
+          </a:fillRef>
+          <a:effectRef idx="0">
+            <a:schemeClr val="accent1"/>
+          </a:effectRef>
+          <a:fontRef idx="minor">
+            <a:schemeClr val="tx1"/>
+          </a:fontRef>
+        </p:style>
+      </p:cxnSp>
+      <p:sp>
+        <p:nvSpPr>
+          <p:cNvPr id="1113766570" name=""/>
+          <p:cNvSpPr/>
+          <p:nvPr/>
+        </p:nvSpPr>
+        <p:spPr bwMode="auto">
+          <a:xfrm flipH="0" flipV="0">
+            <a:off x="8442960" y="3821234"/>
+            <a:ext cx="1020420" cy="866338"/>
+          </a:xfrm>
+          <a:prstGeom prst="rect">
+            <a:avLst/>
+          </a:prstGeom>
+          <a:solidFill>
+            <a:schemeClr val="bg1"/>
+          </a:solidFill>
+          <a:ln w="38099" cap="flat" cmpd="sng" algn="ctr">
+            <a:solidFill>
+              <a:srgbClr val="C00000"/>
+            </a:solidFill>
+            <a:prstDash val="solid"/>
+            <a:miter lim="800000"/>
+          </a:ln>
+        </p:spPr>
+        <p:style>
+          <a:lnRef idx="2">
+            <a:schemeClr val="accent1">
+              <a:shade val="50000"/>
+            </a:schemeClr>
+          </a:lnRef>
+          <a:fillRef idx="1">
+            <a:schemeClr val="accent1"/>
+          </a:fillRef>
+          <a:effectRef idx="0">
+            <a:schemeClr val="accent1"/>
+          </a:effectRef>
+          <a:fontRef idx="minor">
+            <a:schemeClr val="lt1"/>
+          </a:fontRef>
+        </p:style>
+        <p:txBody>
+          <a:bodyPr/>
+          <a:p>
+            <a:pPr>
+              <a:defRPr/>
+            </a:pPr>
+            <a:r>
+              <a:rPr sz="1200">
+                <a:solidFill>
+                  <a:schemeClr val="tx1"/>
+                </a:solidFill>
+              </a:rPr>
+              <a:t>FrontEnd</a:t>
+            </a:r>
+            <a:endParaRPr sz="1200">
+              <a:solidFill>
+                <a:schemeClr val="tx1"/>
+              </a:solidFill>
+            </a:endParaRPr>
+          </a:p>
+          <a:p>
+            <a:pPr>
+              <a:defRPr/>
+            </a:pPr>
+            <a:endParaRPr sz="1200">
+              <a:solidFill>
+                <a:schemeClr val="tx1"/>
+              </a:solidFill>
+            </a:endParaRPr>
+          </a:p>
+          <a:p>
+            <a:pPr>
+              <a:defRPr/>
+            </a:pPr>
+            <a:r>
+              <a:rPr sz="1200">
+                <a:solidFill>
+                  <a:schemeClr val="tx1"/>
+                </a:solidFill>
+              </a:rPr>
+              <a:t>Functions:</a:t>
+            </a:r>
+            <a:endParaRPr sz="1200">
+              <a:solidFill>
+                <a:schemeClr val="tx1"/>
+              </a:solidFill>
+            </a:endParaRPr>
+          </a:p>
+          <a:p>
+            <a:pPr marL="283878" indent="-283878">
+              <a:buFont typeface="Arial"/>
+              <a:buChar char="–"/>
+              <a:defRPr/>
+            </a:pPr>
+            <a:r>
+              <a:rPr sz="1200">
+                <a:solidFill>
+                  <a:schemeClr val="tx1"/>
+                </a:solidFill>
+              </a:rPr>
+              <a:t>UI / UX</a:t>
+            </a:r>
+            <a:endParaRPr sz="1200">
+              <a:solidFill>
+                <a:schemeClr val="tx1"/>
+              </a:solidFill>
+            </a:endParaRPr>
+          </a:p>
+          <a:p>
+            <a:pPr marL="283878" indent="-283878">
+              <a:buFont typeface="Arial"/>
+              <a:buChar char="–"/>
+              <a:defRPr/>
+            </a:pPr>
+            <a:endParaRPr sz="1200">
+              <a:solidFill>
+                <a:schemeClr val="tx1"/>
+              </a:solidFill>
+            </a:endParaRPr>
+          </a:p>
+        </p:txBody>
+      </p:sp>
+      <p:cxnSp>
+        <p:nvCxnSpPr>
+          <p:cNvPr id="1733568832" name=""/>
+          <p:cNvCxnSpPr>
+            <a:stCxn id="1279569497" idx="3"/>
+            <a:endCxn id="1113766570" idx="1"/>
+          </p:cNvCxnSpPr>
+          <p:nvPr/>
+        </p:nvCxnSpPr>
+        <p:spPr bwMode="auto">
+          <a:xfrm rot="0" flipH="0" flipV="1">
+            <a:off x="7771176" y="4254404"/>
+            <a:ext cx="671784" cy="1642365"/>
+          </a:xfrm>
+          <a:prstGeom prst="line">
+            <a:avLst/>
+          </a:prstGeom>
+          <a:ln w="28575" cap="flat" cmpd="sng" algn="ctr">
+            <a:solidFill>
+              <a:srgbClr val="FFC000"/>
+            </a:solidFill>
+            <a:prstDash val="sysDash"/>
+            <a:miter lim="800000"/>
+            <a:headEnd type="arrow" len="med"/>
+            <a:tailEnd type="arrow" len="med"/>
+          </a:ln>
+        </p:spPr>
+        <p:style>
+          <a:lnRef idx="1">
+            <a:schemeClr val="accent1">
+              <a:shade val="50000"/>
+            </a:schemeClr>
+          </a:lnRef>
+          <a:fillRef idx="0">
+            <a:schemeClr val="accent1"/>
+          </a:fillRef>
+          <a:effectRef idx="0">
+            <a:schemeClr val="accent1"/>
+          </a:effectRef>
+          <a:fontRef idx="minor">
+            <a:schemeClr val="tx1"/>
+          </a:fontRef>
+        </p:style>
+      </p:cxnSp>
+      <p:cxnSp>
+        <p:nvCxnSpPr>
+          <p:cNvPr id="179806570" name=""/>
+          <p:cNvCxnSpPr>
+            <a:stCxn id="1279569497" idx="1"/>
+            <a:endCxn id="1938131776" idx="2"/>
+          </p:cNvCxnSpPr>
+          <p:nvPr/>
+        </p:nvCxnSpPr>
+        <p:spPr bwMode="auto">
+          <a:xfrm rot="10799956" flipH="0" flipV="0">
+            <a:off x="2917629" y="4848025"/>
+            <a:ext cx="2951312" cy="1048743"/>
+          </a:xfrm>
+          <a:prstGeom prst="line">
+            <a:avLst/>
+          </a:prstGeom>
+          <a:ln w="28575" cap="flat" cmpd="sng" algn="ctr">
+            <a:solidFill>
+              <a:srgbClr val="FFC000"/>
+            </a:solidFill>
+            <a:prstDash val="sysDash"/>
+            <a:miter lim="800000"/>
+            <a:headEnd type="arrow" len="med"/>
+            <a:tailEnd type="arrow" len="med"/>
+          </a:ln>
+        </p:spPr>
+        <p:style>
+          <a:lnRef idx="1">
+            <a:schemeClr val="accent1">
+              <a:shade val="50000"/>
+            </a:schemeClr>
+          </a:lnRef>
+          <a:fillRef idx="0">
+            <a:schemeClr val="accent1"/>
+          </a:fillRef>
+          <a:effectRef idx="0">
+            <a:schemeClr val="accent1"/>
+          </a:effectRef>
+          <a:fontRef idx="minor">
+            <a:schemeClr val="tx1"/>
+          </a:fontRef>
+        </p:style>
+      </p:cxnSp>
+      <p:cxnSp>
+        <p:nvCxnSpPr>
+          <p:cNvPr id="1699561991" name=""/>
+          <p:cNvCxnSpPr>
+            <a:stCxn id="652237755" idx="3"/>
+            <a:endCxn id="1279569497" idx="1"/>
+          </p:cNvCxnSpPr>
+          <p:nvPr/>
+        </p:nvCxnSpPr>
+        <p:spPr bwMode="auto">
+          <a:xfrm rot="0" flipH="0" flipV="1">
+            <a:off x="4648537" y="5896770"/>
+            <a:ext cx="1220404" cy="294233"/>
+          </a:xfrm>
+          <a:prstGeom prst="line">
+            <a:avLst/>
+          </a:prstGeom>
+          <a:ln w="28575" cap="flat" cmpd="sng" algn="ctr">
+            <a:solidFill>
+              <a:srgbClr val="FFC000"/>
+            </a:solidFill>
+            <a:prstDash val="sysDash"/>
+            <a:miter lim="800000"/>
+            <a:headEnd type="arrow" len="med"/>
+            <a:tailEnd type="arrow" len="med"/>
+          </a:ln>
+        </p:spPr>
+        <p:style>
+          <a:lnRef idx="1">
+            <a:schemeClr val="accent1">
+              <a:shade val="50000"/>
+            </a:schemeClr>
+          </a:lnRef>
+          <a:fillRef idx="0">
+            <a:schemeClr val="accent1"/>
+          </a:fillRef>
+          <a:effectRef idx="0">
+            <a:schemeClr val="accent1"/>
+          </a:effectRef>
+          <a:fontRef idx="minor">
+            <a:schemeClr val="tx1"/>
+          </a:fontRef>
+        </p:style>
+      </p:cxnSp>
+      <p:cxnSp>
+        <p:nvCxnSpPr>
+          <p:cNvPr id="1898413396" name=""/>
+          <p:cNvCxnSpPr>
+            <a:stCxn id="2031861097" idx="2"/>
+            <a:endCxn id="1279569497" idx="1"/>
+          </p:cNvCxnSpPr>
+          <p:nvPr/>
+        </p:nvCxnSpPr>
+        <p:spPr bwMode="auto">
+          <a:xfrm rot="5399943" flipH="0" flipV="1">
+            <a:off x="2939050" y="2966879"/>
+            <a:ext cx="1045734" cy="4814046"/>
+          </a:xfrm>
+          <a:prstGeom prst="line">
+            <a:avLst/>
+          </a:prstGeom>
+          <a:ln w="28575" cap="flat" cmpd="sng" algn="ctr">
+            <a:solidFill>
+              <a:srgbClr val="FFC000"/>
+            </a:solidFill>
+            <a:prstDash val="sysDash"/>
+            <a:miter lim="800000"/>
+            <a:headEnd type="arrow" len="med"/>
+            <a:tailEnd type="arrow" len="med"/>
+          </a:ln>
+        </p:spPr>
+        <p:style>
+          <a:lnRef idx="1">
+            <a:schemeClr val="accent1">
+              <a:shade val="50000"/>
+            </a:schemeClr>
+          </a:lnRef>
+          <a:fillRef idx="0">
+            <a:schemeClr val="accent1"/>
+          </a:fillRef>
+          <a:effectRef idx="0">
+            <a:schemeClr val="accent1"/>
+          </a:effectRef>
+          <a:fontRef idx="minor">
+            <a:schemeClr val="tx1"/>
+          </a:fontRef>
+        </p:style>
+      </p:cxnSp>
+      <p:cxnSp>
+        <p:nvCxnSpPr>
+          <p:cNvPr id="611472172" name=""/>
+          <p:cNvCxnSpPr>
+            <a:stCxn id="1113766570" idx="1"/>
+            <a:endCxn id="520749008" idx="3"/>
+          </p:cNvCxnSpPr>
+          <p:nvPr/>
+        </p:nvCxnSpPr>
+        <p:spPr bwMode="auto">
+          <a:xfrm rot="10799956" flipH="0" flipV="0">
+            <a:off x="5902238" y="2212816"/>
+            <a:ext cx="2540720" cy="2041587"/>
+          </a:xfrm>
+          <a:prstGeom prst="line">
+            <a:avLst/>
+          </a:prstGeom>
+          <a:ln w="28575" cap="flat" cmpd="sng" algn="ctr">
+            <a:solidFill>
+              <a:schemeClr val="accent2">
+                <a:lumMod val="40000"/>
+                <a:lumOff val="60000"/>
+              </a:schemeClr>
+            </a:solidFill>
+            <a:prstDash val="sysDash"/>
+            <a:miter lim="800000"/>
+            <a:headEnd type="arrow" len="med"/>
+            <a:tailEnd type="arrow" len="med"/>
+          </a:ln>
+        </p:spPr>
+        <p:style>
+          <a:lnRef idx="1">
+            <a:schemeClr val="accent1">
+              <a:shade val="50000"/>
+            </a:schemeClr>
+          </a:lnRef>
+          <a:fillRef idx="0">
+            <a:schemeClr val="accent1"/>
+          </a:fillRef>
+          <a:effectRef idx="0">
+            <a:schemeClr val="accent1"/>
+          </a:effectRef>
+          <a:fontRef idx="minor">
+            <a:schemeClr val="tx1"/>
+          </a:fontRef>
+        </p:style>
+      </p:cxnSp>
+      <p:sp>
+        <p:nvSpPr>
+          <p:cNvPr id="1161018128" name=""/>
+          <p:cNvSpPr txBox="1"/>
+          <p:nvPr/>
+        </p:nvSpPr>
+        <p:spPr bwMode="auto">
+          <a:xfrm rot="2294180" flipH="0" flipV="0">
+            <a:off x="6618534" y="2912112"/>
+            <a:ext cx="1429285" cy="366118"/>
+          </a:xfrm>
+          <a:prstGeom prst="rect">
+            <a:avLst/>
+          </a:prstGeom>
+          <a:noFill/>
+        </p:spPr>
+        <p:txBody>
+          <a:bodyPr vertOverflow="overflow" horzOverflow="overflow" vert="horz" wrap="none" lIns="91440" tIns="45720" rIns="91440" bIns="45720" numCol="1" spcCol="0" rtlCol="0" fromWordArt="0" anchor="t" anchorCtr="0" forceAA="0" upright="0" compatLnSpc="0">
+            <a:spAutoFit/>
+          </a:bodyPr>
+          <a:p>
+            <a:pPr>
+              <a:defRPr/>
+            </a:pPr>
+            <a:r>
+              <a:rPr/>
+              <a:t>Login/logout</a:t>
+            </a:r>
+            <a:endParaRPr/>
+          </a:p>
+        </p:txBody>
+      </p:sp>
+      <p:cxnSp>
+        <p:nvCxnSpPr>
+          <p:cNvPr id="1287973462" name=""/>
+          <p:cNvCxnSpPr>
+            <a:stCxn id="520749008" idx="1"/>
+            <a:endCxn id="1938131776" idx="0"/>
+          </p:cNvCxnSpPr>
+          <p:nvPr/>
+        </p:nvCxnSpPr>
+        <p:spPr bwMode="auto">
+          <a:xfrm rot="10799956" flipH="0" flipV="1">
+            <a:off x="2917629" y="2212816"/>
+            <a:ext cx="1082376" cy="1638632"/>
+          </a:xfrm>
+          <a:prstGeom prst="line">
+            <a:avLst/>
+          </a:prstGeom>
+          <a:ln w="28575" cap="flat" cmpd="sng" algn="ctr">
+            <a:solidFill>
+              <a:schemeClr val="accent2">
+                <a:lumMod val="40000"/>
+                <a:lumOff val="60000"/>
+              </a:schemeClr>
+            </a:solidFill>
+            <a:prstDash val="sysDash"/>
+            <a:miter lim="800000"/>
+            <a:headEnd type="arrow" len="med"/>
+            <a:tailEnd type="arrow" len="med"/>
+          </a:ln>
+        </p:spPr>
+        <p:style>
+          <a:lnRef idx="1">
+            <a:schemeClr val="accent1">
+              <a:shade val="50000"/>
+            </a:schemeClr>
+          </a:lnRef>
+          <a:fillRef idx="0">
+            <a:schemeClr val="accent1"/>
+          </a:fillRef>
+          <a:effectRef idx="0">
+            <a:schemeClr val="accent1"/>
+          </a:effectRef>
+          <a:fontRef idx="minor">
+            <a:schemeClr val="tx1"/>
+          </a:fontRef>
+        </p:style>
+      </p:cxnSp>
+      <p:sp>
+        <p:nvSpPr>
+          <p:cNvPr id="967619984" name=""/>
+          <p:cNvSpPr txBox="1"/>
+          <p:nvPr/>
+        </p:nvSpPr>
+        <p:spPr bwMode="auto">
+          <a:xfrm rot="4379276" flipH="0" flipV="0">
+            <a:off x="5852769" y="3714340"/>
+            <a:ext cx="1555251" cy="365758"/>
+          </a:xfrm>
+          <a:prstGeom prst="rect">
+            <a:avLst/>
+          </a:prstGeom>
+          <a:noFill/>
+        </p:spPr>
+        <p:txBody>
+          <a:bodyPr vertOverflow="overflow" horzOverflow="overflow" vert="horz" wrap="square" lIns="91440" tIns="45720" rIns="91440" bIns="45720" numCol="1" spcCol="0" rtlCol="0" fromWordArt="0" anchor="t" anchorCtr="0" forceAA="0" upright="0" compatLnSpc="0">
+            <a:spAutoFit/>
+          </a:bodyPr>
+          <a:p>
+            <a:pPr algn="l">
+              <a:defRPr/>
+            </a:pPr>
+            <a:r>
+              <a:rPr/>
+              <a:t>Auth/Autorize</a:t>
+            </a:r>
+            <a:endParaRPr/>
+          </a:p>
+        </p:txBody>
+      </p:sp>
+      <p:sp>
+        <p:nvSpPr>
+          <p:cNvPr id="528219502" name=""/>
+          <p:cNvSpPr/>
+          <p:nvPr/>
+        </p:nvSpPr>
+        <p:spPr bwMode="auto">
+          <a:xfrm flipH="0" flipV="0">
+            <a:off x="10062489" y="4226274"/>
+            <a:ext cx="1902232" cy="1277244"/>
+          </a:xfrm>
+          <a:prstGeom prst="rect">
+            <a:avLst/>
+          </a:prstGeom>
+          <a:solidFill>
+            <a:schemeClr val="bg1"/>
+          </a:solidFill>
+          <a:ln w="38099" cap="flat" cmpd="sng" algn="ctr">
+            <a:solidFill>
+              <a:srgbClr val="7030A0"/>
+            </a:solidFill>
+            <a:prstDash val="solid"/>
+            <a:miter lim="800000"/>
+          </a:ln>
+        </p:spPr>
+        <p:style>
+          <a:lnRef idx="2">
+            <a:schemeClr val="accent1">
+              <a:shade val="50000"/>
+            </a:schemeClr>
+          </a:lnRef>
+          <a:fillRef idx="1">
+            <a:schemeClr val="accent1"/>
+          </a:fillRef>
+          <a:effectRef idx="0">
+            <a:schemeClr val="accent1"/>
+          </a:effectRef>
+          <a:fontRef idx="minor">
+            <a:schemeClr val="lt1"/>
+          </a:fontRef>
+        </p:style>
+        <p:txBody>
+          <a:bodyPr/>
+          <a:p>
+            <a:pPr>
+              <a:defRPr/>
+            </a:pPr>
+            <a:r>
+              <a:rPr sz="1200">
+                <a:solidFill>
+                  <a:schemeClr val="tx1"/>
+                </a:solidFill>
+              </a:rPr>
+              <a:t>Mobile APP</a:t>
+            </a:r>
+            <a:endParaRPr sz="1200">
+              <a:solidFill>
+                <a:schemeClr val="tx1"/>
+              </a:solidFill>
+            </a:endParaRPr>
+          </a:p>
+          <a:p>
+            <a:pPr>
+              <a:defRPr/>
+            </a:pPr>
+            <a:endParaRPr sz="1200">
+              <a:solidFill>
+                <a:schemeClr val="tx1"/>
+              </a:solidFill>
+            </a:endParaRPr>
+          </a:p>
+          <a:p>
+            <a:pPr>
+              <a:defRPr/>
+            </a:pPr>
+            <a:r>
+              <a:rPr sz="1200">
+                <a:solidFill>
+                  <a:schemeClr val="tx1"/>
+                </a:solidFill>
+              </a:rPr>
+              <a:t>Tech:</a:t>
+            </a:r>
+            <a:r>
+              <a:rPr sz="1200">
+                <a:solidFill>
+                  <a:schemeClr val="tx1"/>
+                </a:solidFill>
+              </a:rPr>
+              <a:t> Kotlin</a:t>
+            </a:r>
+            <a:endParaRPr sz="1200">
+              <a:solidFill>
+                <a:schemeClr val="tx1"/>
+              </a:solidFill>
+            </a:endParaRPr>
+          </a:p>
+          <a:p>
+            <a:pPr>
+              <a:defRPr/>
+            </a:pPr>
+            <a:r>
+              <a:rPr sz="1200">
+                <a:solidFill>
+                  <a:schemeClr val="tx1"/>
+                </a:solidFill>
+              </a:rPr>
+              <a:t>Running on: Android</a:t>
+            </a:r>
+            <a:endParaRPr sz="1200">
+              <a:solidFill>
+                <a:schemeClr val="tx1"/>
+              </a:solidFill>
+            </a:endParaRPr>
+          </a:p>
+          <a:p>
+            <a:pPr>
+              <a:defRPr/>
+            </a:pPr>
+            <a:r>
+              <a:rPr sz="1200">
+                <a:solidFill>
+                  <a:schemeClr val="tx1"/>
+                </a:solidFill>
+              </a:rPr>
+              <a:t>Functions:</a:t>
+            </a:r>
+            <a:endParaRPr sz="1200">
+              <a:solidFill>
+                <a:schemeClr val="tx1"/>
+              </a:solidFill>
+            </a:endParaRPr>
+          </a:p>
+          <a:p>
+            <a:pPr marL="283878" indent="-283878">
+              <a:buFont typeface="Arial"/>
+              <a:buChar char="–"/>
+              <a:defRPr/>
+            </a:pPr>
+            <a:r>
+              <a:rPr sz="1200">
+                <a:solidFill>
+                  <a:schemeClr val="tx1"/>
+                </a:solidFill>
+              </a:rPr>
+              <a:t>UI / UX</a:t>
+            </a:r>
+            <a:endParaRPr sz="1200">
+              <a:solidFill>
+                <a:schemeClr val="tx1"/>
+              </a:solidFill>
+            </a:endParaRPr>
+          </a:p>
+          <a:p>
+            <a:pPr marL="283878" indent="-283878">
+              <a:buFont typeface="Arial"/>
+              <a:buChar char="–"/>
+              <a:defRPr/>
+            </a:pPr>
+            <a:endParaRPr sz="1200">
+              <a:solidFill>
+                <a:schemeClr val="tx1"/>
+              </a:solidFill>
+            </a:endParaRPr>
+          </a:p>
+        </p:txBody>
+      </p:sp>
+      <p:sp>
+        <p:nvSpPr>
+          <p:cNvPr id="666911365" name=""/>
+          <p:cNvSpPr/>
+          <p:nvPr/>
+        </p:nvSpPr>
+        <p:spPr bwMode="auto">
+          <a:xfrm flipH="0" flipV="0">
+            <a:off x="10062489" y="2746329"/>
+            <a:ext cx="1902232" cy="1277244"/>
+          </a:xfrm>
+          <a:prstGeom prst="rect">
+            <a:avLst/>
+          </a:prstGeom>
+          <a:solidFill>
+            <a:schemeClr val="bg1"/>
+          </a:solidFill>
+          <a:ln w="38099" cap="flat" cmpd="sng" algn="ctr">
+            <a:solidFill>
+              <a:srgbClr val="00B050"/>
+            </a:solidFill>
+            <a:prstDash val="solid"/>
+            <a:miter lim="800000"/>
+          </a:ln>
+        </p:spPr>
+        <p:style>
+          <a:lnRef idx="2">
+            <a:schemeClr val="accent1">
+              <a:shade val="50000"/>
+            </a:schemeClr>
+          </a:lnRef>
+          <a:fillRef idx="1">
+            <a:schemeClr val="accent1"/>
+          </a:fillRef>
+          <a:effectRef idx="0">
+            <a:schemeClr val="accent1"/>
+          </a:effectRef>
+          <a:fontRef idx="minor">
+            <a:schemeClr val="lt1"/>
+          </a:fontRef>
+        </p:style>
+        <p:txBody>
+          <a:bodyPr/>
+          <a:p>
+            <a:pPr>
+              <a:defRPr/>
+            </a:pPr>
+            <a:r>
+              <a:rPr sz="1200">
+                <a:solidFill>
+                  <a:schemeClr val="tx1"/>
+                </a:solidFill>
+              </a:rPr>
+              <a:t>WebSite</a:t>
+            </a:r>
+            <a:endParaRPr sz="1200">
+              <a:solidFill>
+                <a:schemeClr val="tx1"/>
+              </a:solidFill>
+            </a:endParaRPr>
+          </a:p>
+          <a:p>
+            <a:pPr>
+              <a:defRPr/>
+            </a:pPr>
+            <a:endParaRPr sz="1200">
+              <a:solidFill>
+                <a:schemeClr val="tx1"/>
+              </a:solidFill>
+            </a:endParaRPr>
+          </a:p>
+          <a:p>
+            <a:pPr>
+              <a:defRPr/>
+            </a:pPr>
+            <a:r>
+              <a:rPr sz="1200">
+                <a:solidFill>
+                  <a:schemeClr val="tx1"/>
+                </a:solidFill>
+              </a:rPr>
+              <a:t>Tech:</a:t>
+            </a:r>
+            <a:r>
+              <a:rPr sz="1200">
+                <a:solidFill>
+                  <a:schemeClr val="tx1"/>
+                </a:solidFill>
+              </a:rPr>
+              <a:t> React</a:t>
+            </a:r>
+            <a:endParaRPr sz="1200">
+              <a:solidFill>
+                <a:schemeClr val="tx1"/>
+              </a:solidFill>
+            </a:endParaRPr>
+          </a:p>
+          <a:p>
+            <a:pPr>
+              <a:defRPr/>
+            </a:pPr>
+            <a:r>
+              <a:rPr sz="1200">
+                <a:solidFill>
+                  <a:schemeClr val="tx1"/>
+                </a:solidFill>
+              </a:rPr>
+              <a:t>Running on: PC</a:t>
+            </a:r>
+            <a:endParaRPr sz="1200">
+              <a:solidFill>
+                <a:schemeClr val="tx1"/>
+              </a:solidFill>
+            </a:endParaRPr>
+          </a:p>
+          <a:p>
+            <a:pPr>
+              <a:defRPr/>
+            </a:pPr>
+            <a:r>
+              <a:rPr sz="1200">
+                <a:solidFill>
+                  <a:schemeClr val="tx1"/>
+                </a:solidFill>
+              </a:rPr>
+              <a:t>Functions:</a:t>
+            </a:r>
+            <a:endParaRPr sz="1200">
+              <a:solidFill>
+                <a:schemeClr val="tx1"/>
+              </a:solidFill>
+            </a:endParaRPr>
+          </a:p>
+          <a:p>
+            <a:pPr marL="283878" indent="-283878">
+              <a:buFont typeface="Arial"/>
+              <a:buChar char="–"/>
+              <a:defRPr/>
+            </a:pPr>
+            <a:r>
+              <a:rPr sz="1200">
+                <a:solidFill>
+                  <a:schemeClr val="tx1"/>
+                </a:solidFill>
+              </a:rPr>
+              <a:t>UI / UX</a:t>
+            </a:r>
+            <a:endParaRPr sz="1200">
+              <a:solidFill>
+                <a:schemeClr val="tx1"/>
+              </a:solidFill>
+            </a:endParaRPr>
+          </a:p>
+          <a:p>
+            <a:pPr marL="283878" indent="-283878">
+              <a:buFont typeface="Arial"/>
+              <a:buChar char="–"/>
+              <a:defRPr/>
+            </a:pPr>
+            <a:endParaRPr sz="1200">
+              <a:solidFill>
+                <a:schemeClr val="tx1"/>
+              </a:solidFill>
+            </a:endParaRPr>
+          </a:p>
+        </p:txBody>
+      </p:sp>
+      <p:cxnSp>
+        <p:nvCxnSpPr>
+          <p:cNvPr id="265269556" name=""/>
+          <p:cNvCxnSpPr>
+            <a:stCxn id="1113766570" idx="3"/>
+            <a:endCxn id="666911365" idx="1"/>
+          </p:cNvCxnSpPr>
+          <p:nvPr/>
+        </p:nvCxnSpPr>
+        <p:spPr bwMode="auto">
+          <a:xfrm rot="0" flipH="0" flipV="1">
+            <a:off x="9463381" y="3384951"/>
+            <a:ext cx="599107" cy="869451"/>
+          </a:xfrm>
+          <a:prstGeom prst="line">
+            <a:avLst/>
+          </a:prstGeom>
+          <a:ln w="28575" cap="flat" cmpd="sng" algn="ctr">
+            <a:solidFill>
+              <a:schemeClr val="accent1">
+                <a:lumMod val="74901"/>
+              </a:schemeClr>
+            </a:solidFill>
+            <a:prstDash val="sysDot"/>
+            <a:miter lim="800000"/>
+          </a:ln>
+        </p:spPr>
+        <p:style>
+          <a:lnRef idx="1">
+            <a:schemeClr val="accent1">
+              <a:shade val="50000"/>
+            </a:schemeClr>
+          </a:lnRef>
+          <a:fillRef idx="0">
+            <a:schemeClr val="accent1"/>
+          </a:fillRef>
+          <a:effectRef idx="0">
+            <a:schemeClr val="accent1"/>
+          </a:effectRef>
+          <a:fontRef idx="minor">
+            <a:schemeClr val="tx1"/>
+          </a:fontRef>
+        </p:style>
+      </p:cxnSp>
+      <p:cxnSp>
+        <p:nvCxnSpPr>
+          <p:cNvPr id="1769903166" name=""/>
+          <p:cNvCxnSpPr>
+            <a:stCxn id="1113766570" idx="3"/>
+            <a:endCxn id="528219502" idx="1"/>
+          </p:cNvCxnSpPr>
+          <p:nvPr/>
+        </p:nvCxnSpPr>
+        <p:spPr bwMode="auto">
+          <a:xfrm rot="0" flipH="0" flipV="0">
+            <a:off x="9463381" y="4254404"/>
+            <a:ext cx="599107" cy="610489"/>
+          </a:xfrm>
+          <a:prstGeom prst="line">
+            <a:avLst/>
+          </a:prstGeom>
+          <a:ln w="28575" cap="flat" cmpd="sng" algn="ctr">
+            <a:solidFill>
+              <a:schemeClr val="accent1">
+                <a:lumMod val="74901"/>
+              </a:schemeClr>
+            </a:solidFill>
+            <a:prstDash val="sysDot"/>
+            <a:miter lim="800000"/>
+          </a:ln>
+        </p:spPr>
+        <p:style>
+          <a:lnRef idx="1">
+            <a:schemeClr val="accent1">
+              <a:shade val="50000"/>
+            </a:schemeClr>
+          </a:lnRef>
+          <a:fillRef idx="0">
+            <a:schemeClr val="accent1"/>
+          </a:fillRef>
+          <a:effectRef idx="0">
+            <a:schemeClr val="accent1"/>
+          </a:effectRef>
+          <a:fontRef idx="minor">
+            <a:schemeClr val="tx1"/>
+          </a:fontRef>
+        </p:style>
+      </p:cxnSp>
+    </p:spTree>
+  </p:cSld>
+  <p:clrMapOvr>
+    <a:masterClrMapping/>
+  </p:clrMapOvr>
+  <mc:AlternateContent xmlns:mc="http://schemas.openxmlformats.org/markup-compatibility/2006">
+    <mc:Choice xmlns:p159="http://schemas.microsoft.com/office/powerpoint/2015/09/main" xmlns:p14="http://schemas.microsoft.com/office/powerpoint/2010/main" Requires="p159">
+      <p:transition p14:dur="2000" advClick="1"/>
+    </mc:Choice>
+    <mc:Fallback>
+      <p:transition advClick="1"/>
+    </mc:Fallback>
+  </mc:AlternateContent>
+</p:sld>
+</file>
+
+<file path=ppt/slides/slide3.xml><?xml version="1.0" encoding="utf-8"?>
+<p:sld xmlns:a="http://schemas.openxmlformats.org/drawingml/2006/main" xmlns:r="http://schemas.openxmlformats.org/officeDocument/2006/relationships" xmlns:p="http://schemas.openxmlformats.org/presentationml/2006/main" xmlns:m="http://schemas.openxmlformats.org/officeDocument/2006/math" xmlns:w="http://schemas.openxmlformats.org/wordprocessingml/2006/main" xmlns:mc="http://schemas.openxmlformats.org/markup-compatibility/2006" showMasterPhAnim="0" showMasterSp="1" show="1">
+  <p:cSld name="">
+    <p:spTree>
+      <p:nvGrpSpPr>
+        <p:cNvPr id="1" name=""/>
+        <p:cNvGrpSpPr/>
+        <p:nvPr/>
+      </p:nvGrpSpPr>
+      <p:grpSpPr bwMode="auto">
+        <a:xfrm>
+          <a:off x="0" y="0"/>
+          <a:ext cx="0" cy="0"/>
+          <a:chOff x="0" y="0"/>
+          <a:chExt cx="0" cy="0"/>
+        </a:xfrm>
+      </p:grpSpPr>
+      <p:sp>
+        <p:nvSpPr>
+          <p:cNvPr id="972270815" name=""/>
           <p:cNvSpPr/>
           <p:nvPr/>
         </p:nvSpPr>
@@ -5869,7 +7672,7 @@
       </p:sp>
       <p:sp>
         <p:nvSpPr>
-          <p:cNvPr id="1083387556" name="Título 1"/>
+          <p:cNvPr id="699313828" name="Título 1"/>
           <p:cNvSpPr>
             <a:spLocks noGrp="1"/>
           </p:cNvSpPr>
@@ -5915,7 +7718,7 @@
       </p:sp>
       <p:sp>
         <p:nvSpPr>
-          <p:cNvPr id="178397043" name=""/>
+          <p:cNvPr id="150304252" name=""/>
           <p:cNvSpPr/>
           <p:nvPr/>
         </p:nvSpPr>
@@ -6024,7 +7827,7 @@
       </p:sp>
       <p:sp>
         <p:nvSpPr>
-          <p:cNvPr id="1987764188" name=""/>
+          <p:cNvPr id="1755451110" name=""/>
           <p:cNvSpPr/>
           <p:nvPr/>
         </p:nvSpPr>
@@ -6303,7 +8106,7 @@
       </p:sp>
       <p:sp>
         <p:nvSpPr>
-          <p:cNvPr id="421181730" name=""/>
+          <p:cNvPr id="993119708" name=""/>
           <p:cNvSpPr/>
           <p:nvPr/>
         </p:nvSpPr>
@@ -6398,7 +8201,7 @@
       </p:sp>
       <p:sp>
         <p:nvSpPr>
-          <p:cNvPr id="1358357827" name=""/>
+          <p:cNvPr id="231327988" name=""/>
           <p:cNvSpPr/>
           <p:nvPr/>
         </p:nvSpPr>
@@ -6593,10 +8396,10 @@
       </p:sp>
       <p:cxnSp>
         <p:nvCxnSpPr>
-          <p:cNvPr id="538077583" name=""/>
+          <p:cNvPr id="495691564" name=""/>
           <p:cNvCxnSpPr>
-            <a:stCxn id="178397043" idx="3"/>
-            <a:endCxn id="1987764188" idx="1"/>
+            <a:stCxn id="150304252" idx="3"/>
+            <a:endCxn id="1755451110" idx="1"/>
           </p:cNvCxnSpPr>
           <p:nvPr/>
         </p:nvCxnSpPr>
@@ -6640,10 +8443,10 @@
       </p:cxnSp>
       <p:cxnSp>
         <p:nvCxnSpPr>
-          <p:cNvPr id="1799622452" name=""/>
+          <p:cNvPr id="2097128085" name=""/>
           <p:cNvCxnSpPr>
-            <a:stCxn id="1358357827" idx="0"/>
-            <a:endCxn id="1987764188" idx="3"/>
+            <a:stCxn id="231327988" idx="0"/>
+            <a:endCxn id="1755451110" idx="3"/>
           </p:cNvCxnSpPr>
           <p:nvPr/>
         </p:nvCxnSpPr>
@@ -6687,10 +8490,10 @@
       </p:cxnSp>
       <p:cxnSp>
         <p:nvCxnSpPr>
-          <p:cNvPr id="1391586506" name=""/>
+          <p:cNvPr id="193217881" name=""/>
           <p:cNvCxnSpPr>
-            <a:stCxn id="510921233" idx="0"/>
-            <a:endCxn id="1987764188" idx="2"/>
+            <a:stCxn id="972270815" idx="0"/>
+            <a:endCxn id="1755451110" idx="2"/>
           </p:cNvCxnSpPr>
           <p:nvPr/>
         </p:nvCxnSpPr>
@@ -6734,7 +8537,7 @@
       </p:cxnSp>
       <p:sp>
         <p:nvSpPr>
-          <p:cNvPr id="687611605" name=""/>
+          <p:cNvPr id="1461932743" name=""/>
           <p:cNvSpPr/>
           <p:nvPr/>
         </p:nvSpPr>
@@ -6901,10 +8704,10 @@
       </p:sp>
       <p:cxnSp>
         <p:nvCxnSpPr>
-          <p:cNvPr id="1539823803" name=""/>
+          <p:cNvPr id="1541545770" name=""/>
           <p:cNvCxnSpPr>
-            <a:stCxn id="1358357827" idx="3"/>
-            <a:endCxn id="687611605" idx="1"/>
+            <a:stCxn id="231327988" idx="3"/>
+            <a:endCxn id="1461932743" idx="1"/>
           </p:cNvCxnSpPr>
           <p:nvPr/>
         </p:nvCxnSpPr>
@@ -6945,10 +8748,10 @@
       </p:cxnSp>
       <p:cxnSp>
         <p:nvCxnSpPr>
-          <p:cNvPr id="1765447375" name=""/>
+          <p:cNvPr id="1884605674" name=""/>
           <p:cNvCxnSpPr>
-            <a:stCxn id="1358357827" idx="1"/>
-            <a:endCxn id="839135678" idx="3"/>
+            <a:stCxn id="231327988" idx="1"/>
+            <a:endCxn id="201668146" idx="3"/>
           </p:cNvCxnSpPr>
           <p:nvPr/>
         </p:nvCxnSpPr>
@@ -6989,10 +8792,10 @@
       </p:cxnSp>
       <p:cxnSp>
         <p:nvCxnSpPr>
-          <p:cNvPr id="807977855" name=""/>
+          <p:cNvPr id="937375480" name=""/>
           <p:cNvCxnSpPr>
-            <a:stCxn id="421181730" idx="3"/>
-            <a:endCxn id="1358357827" idx="1"/>
+            <a:stCxn id="993119708" idx="3"/>
+            <a:endCxn id="231327988" idx="1"/>
           </p:cNvCxnSpPr>
           <p:nvPr/>
         </p:nvCxnSpPr>
@@ -7033,7 +8836,7 @@
       </p:cxnSp>
       <p:sp>
         <p:nvSpPr>
-          <p:cNvPr id="839135678" name=""/>
+          <p:cNvPr id="201668146" name=""/>
           <p:cNvSpPr/>
           <p:nvPr/>
         </p:nvSpPr>
@@ -7142,10 +8945,10 @@
       </p:sp>
       <p:cxnSp>
         <p:nvCxnSpPr>
-          <p:cNvPr id="1561408206" name=""/>
+          <p:cNvPr id="292663514" name=""/>
           <p:cNvCxnSpPr>
-            <a:stCxn id="178397043" idx="2"/>
-            <a:endCxn id="1358357827" idx="1"/>
+            <a:stCxn id="150304252" idx="2"/>
+            <a:endCxn id="231327988" idx="1"/>
           </p:cNvCxnSpPr>
           <p:nvPr/>
         </p:nvCxnSpPr>

</xml_diff>

<commit_message>
Changes to Teck Stack  diagram to be more colofull and a better reprezentation of the final state of the project Added the images and link to their sources to the project
More work/organization of the Final Report
</commit_message>
<xml_diff>
--- a/Docs/Arquitetura_Sistema_de_Informação.pptx
+++ b/Docs/Arquitetura_Sistema_de_Informação.pptx
@@ -136,7 +136,7 @@
       </p:grpSpPr>
       <p:sp>
         <p:nvSpPr>
-          <p:cNvPr id="2102708833" name="Espaço reservado para o cabeçalho 1"/>
+          <p:cNvPr id="992938813" name="Espaço reservado para o cabeçalho 1"/>
           <p:cNvSpPr>
             <a:spLocks noGrp="1"/>
           </p:cNvSpPr>
@@ -170,7 +170,7 @@
       </p:sp>
       <p:sp>
         <p:nvSpPr>
-          <p:cNvPr id="952804024" name="Espaço reservado para a data 2"/>
+          <p:cNvPr id="1508524677" name="Espaço reservado para a data 2"/>
           <p:cNvSpPr>
             <a:spLocks noGrp="1"/>
           </p:cNvSpPr>
@@ -208,7 +208,7 @@
       </p:sp>
       <p:sp>
         <p:nvSpPr>
-          <p:cNvPr id="609643619" name="Espaço reservado para imagem de diapositivo 3"/>
+          <p:cNvPr id="581705310" name="Espaço reservado para imagem de diapositivo 3"/>
           <p:cNvSpPr>
             <a:spLocks noChangeAspect="1" noGrp="1" noRot="1"/>
           </p:cNvSpPr>
@@ -244,7 +244,7 @@
       </p:sp>
       <p:sp>
         <p:nvSpPr>
-          <p:cNvPr id="509105657" name="Espaço reservado às notas 4"/>
+          <p:cNvPr id="1817709543" name="Espaço reservado às notas 4"/>
           <p:cNvSpPr>
             <a:spLocks noGrp="1"/>
           </p:cNvSpPr>
@@ -318,7 +318,7 @@
       </p:sp>
       <p:sp>
         <p:nvSpPr>
-          <p:cNvPr id="1127370916" name="Espaço reservado ao rodapé 5"/>
+          <p:cNvPr id="1909338608" name="Espaço reservado ao rodapé 5"/>
           <p:cNvSpPr>
             <a:spLocks noGrp="1"/>
           </p:cNvSpPr>
@@ -352,7 +352,7 @@
       </p:sp>
       <p:sp>
         <p:nvSpPr>
-          <p:cNvPr id="929087290" name="Espaço reservado para o número do diapositivo 6"/>
+          <p:cNvPr id="1710234682" name="Espaço reservado para o número do diapositivo 6"/>
           <p:cNvSpPr>
             <a:spLocks noGrp="1"/>
           </p:cNvSpPr>
@@ -505,7 +505,7 @@
       </p:grpSpPr>
       <p:sp>
         <p:nvSpPr>
-          <p:cNvPr id="1786225275" name="Espaço reservado para imagem de diapositivo 1"/>
+          <p:cNvPr id="262020982" name="Espaço reservado para imagem de diapositivo 1"/>
           <p:cNvSpPr>
             <a:spLocks noChangeAspect="1" noGrp="1" noRot="1"/>
           </p:cNvSpPr>
@@ -522,7 +522,7 @@
       </p:sp>
       <p:sp>
         <p:nvSpPr>
-          <p:cNvPr id="1585715240" name="Notes Placeholder 2"/>
+          <p:cNvPr id="1859777326" name="Notes Placeholder 2"/>
           <p:cNvSpPr>
             <a:spLocks noGrp="1"/>
           </p:cNvSpPr>
@@ -547,7 +547,7 @@
       </p:sp>
       <p:sp>
         <p:nvSpPr>
-          <p:cNvPr id="869189810" name="Slide Number Placeholder 3"/>
+          <p:cNvPr id="759908297" name="Slide Number Placeholder 3"/>
           <p:cNvSpPr>
             <a:spLocks noGrp="1"/>
           </p:cNvSpPr>
@@ -595,7 +595,7 @@
       </p:grpSpPr>
       <p:sp>
         <p:nvSpPr>
-          <p:cNvPr id="1556723322" name="Espaço reservado para imagem de diapositivo 1"/>
+          <p:cNvPr id="626238154" name="Espaço reservado para imagem de diapositivo 1"/>
           <p:cNvSpPr>
             <a:spLocks noChangeAspect="1" noGrp="1" noRot="1"/>
           </p:cNvSpPr>
@@ -612,7 +612,7 @@
       </p:sp>
       <p:sp>
         <p:nvSpPr>
-          <p:cNvPr id="899137233" name="Notes Placeholder 2"/>
+          <p:cNvPr id="310065276" name="Notes Placeholder 2"/>
           <p:cNvSpPr>
             <a:spLocks noGrp="1"/>
           </p:cNvSpPr>
@@ -637,7 +637,7 @@
       </p:sp>
       <p:sp>
         <p:nvSpPr>
-          <p:cNvPr id="335647341" name="Slide Number Placeholder 3"/>
+          <p:cNvPr id="1122026438" name="Slide Number Placeholder 3"/>
           <p:cNvSpPr>
             <a:spLocks noGrp="1"/>
           </p:cNvSpPr>
@@ -685,7 +685,7 @@
       </p:grpSpPr>
       <p:sp>
         <p:nvSpPr>
-          <p:cNvPr id="1884855941" name="Espaço reservado para imagem de diapositivo 1"/>
+          <p:cNvPr id="700320508" name="Espaço reservado para imagem de diapositivo 1"/>
           <p:cNvSpPr>
             <a:spLocks noChangeAspect="1" noGrp="1" noRot="1"/>
           </p:cNvSpPr>
@@ -702,7 +702,7 @@
       </p:sp>
       <p:sp>
         <p:nvSpPr>
-          <p:cNvPr id="938990585" name="Notes Placeholder 2"/>
+          <p:cNvPr id="817565322" name="Notes Placeholder 2"/>
           <p:cNvSpPr>
             <a:spLocks noGrp="1"/>
           </p:cNvSpPr>
@@ -727,7 +727,7 @@
       </p:sp>
       <p:sp>
         <p:nvSpPr>
-          <p:cNvPr id="84552899" name="Slide Number Placeholder 3"/>
+          <p:cNvPr id="1926539592" name="Slide Number Placeholder 3"/>
           <p:cNvSpPr>
             <a:spLocks noGrp="1"/>
           </p:cNvSpPr>
@@ -775,7 +775,7 @@
       </p:grpSpPr>
       <p:sp>
         <p:nvSpPr>
-          <p:cNvPr id="582031555" name="Título 1"/>
+          <p:cNvPr id="1318508607" name="Título 1"/>
           <p:cNvSpPr>
             <a:spLocks noGrp="1"/>
           </p:cNvSpPr>
@@ -810,7 +810,7 @@
       </p:sp>
       <p:sp>
         <p:nvSpPr>
-          <p:cNvPr id="603012644" name="Subtítulo 2"/>
+          <p:cNvPr id="1036022371" name="Subtítulo 2"/>
           <p:cNvSpPr>
             <a:spLocks noGrp="1"/>
           </p:cNvSpPr>
@@ -878,7 +878,7 @@
       </p:sp>
       <p:sp>
         <p:nvSpPr>
-          <p:cNvPr id="1712452652" name="Date Placeholder 3"/>
+          <p:cNvPr id="1708437843" name="Date Placeholder 3"/>
           <p:cNvSpPr>
             <a:spLocks noGrp="1"/>
           </p:cNvSpPr>
@@ -904,7 +904,7 @@
       </p:sp>
       <p:sp>
         <p:nvSpPr>
-          <p:cNvPr id="949693722" name="Marcador de Posição do Rodapé 4"/>
+          <p:cNvPr id="1046997857" name="Marcador de Posição do Rodapé 4"/>
           <p:cNvSpPr>
             <a:spLocks noGrp="1"/>
           </p:cNvSpPr>
@@ -926,7 +926,7 @@
       </p:sp>
       <p:sp>
         <p:nvSpPr>
-          <p:cNvPr id="84287888" name="Marcador de Posição do Número do Diapositivo 5"/>
+          <p:cNvPr id="464676386" name="Marcador de Posição do Número do Diapositivo 5"/>
           <p:cNvSpPr>
             <a:spLocks noGrp="1"/>
           </p:cNvSpPr>
@@ -977,7 +977,7 @@
       </p:grpSpPr>
       <p:sp>
         <p:nvSpPr>
-          <p:cNvPr id="1134284622" name="Title 1"/>
+          <p:cNvPr id="702358502" name="Title 1"/>
           <p:cNvSpPr>
             <a:spLocks noGrp="1"/>
           </p:cNvSpPr>
@@ -1003,7 +1003,7 @@
       </p:sp>
       <p:sp>
         <p:nvSpPr>
-          <p:cNvPr id="384662171" name="Marcador de Posição de Texto Vertical 2"/>
+          <p:cNvPr id="1694531487" name="Marcador de Posição de Texto Vertical 2"/>
           <p:cNvSpPr>
             <a:spLocks noGrp="1"/>
           </p:cNvSpPr>
@@ -1069,7 +1069,7 @@
       </p:sp>
       <p:sp>
         <p:nvSpPr>
-          <p:cNvPr id="1546666870" name="Marcador de Posição da Data 3"/>
+          <p:cNvPr id="1980446198" name="Marcador de Posição da Data 3"/>
           <p:cNvSpPr>
             <a:spLocks noGrp="1"/>
           </p:cNvSpPr>
@@ -1095,7 +1095,7 @@
       </p:sp>
       <p:sp>
         <p:nvSpPr>
-          <p:cNvPr id="189249633" name="Marcador de Posição do Rodapé 4"/>
+          <p:cNvPr id="731923610" name="Marcador de Posição do Rodapé 4"/>
           <p:cNvSpPr>
             <a:spLocks noGrp="1"/>
           </p:cNvSpPr>
@@ -1117,7 +1117,7 @@
       </p:sp>
       <p:sp>
         <p:nvSpPr>
-          <p:cNvPr id="536093347" name="Marcador de Posição do Número do Diapositivo 5"/>
+          <p:cNvPr id="1296002964" name="Marcador de Posição do Número do Diapositivo 5"/>
           <p:cNvSpPr>
             <a:spLocks noGrp="1"/>
           </p:cNvSpPr>
@@ -1168,7 +1168,7 @@
       </p:grpSpPr>
       <p:sp>
         <p:nvSpPr>
-          <p:cNvPr id="733622069" name="Título Vertical 1"/>
+          <p:cNvPr id="117379617" name="Título Vertical 1"/>
           <p:cNvSpPr>
             <a:spLocks noGrp="1"/>
           </p:cNvSpPr>
@@ -1199,7 +1199,7 @@
       </p:sp>
       <p:sp>
         <p:nvSpPr>
-          <p:cNvPr id="118500105" name="Marcador de Posição de Texto Vertical 2"/>
+          <p:cNvPr id="1580394219" name="Marcador de Posição de Texto Vertical 2"/>
           <p:cNvSpPr>
             <a:spLocks noGrp="1"/>
           </p:cNvSpPr>
@@ -1270,7 +1270,7 @@
       </p:sp>
       <p:sp>
         <p:nvSpPr>
-          <p:cNvPr id="1184486019" name="Marcador de Posição da Data 3"/>
+          <p:cNvPr id="316293117" name="Marcador de Posição da Data 3"/>
           <p:cNvSpPr>
             <a:spLocks noGrp="1"/>
           </p:cNvSpPr>
@@ -1296,7 +1296,7 @@
       </p:sp>
       <p:sp>
         <p:nvSpPr>
-          <p:cNvPr id="1345228547" name="Marcador de Posição do Rodapé 4"/>
+          <p:cNvPr id="1138077347" name="Marcador de Posição do Rodapé 4"/>
           <p:cNvSpPr>
             <a:spLocks noGrp="1"/>
           </p:cNvSpPr>
@@ -1318,7 +1318,7 @@
       </p:sp>
       <p:sp>
         <p:nvSpPr>
-          <p:cNvPr id="2112574320" name="Marcador de Posição do Número do Diapositivo 5"/>
+          <p:cNvPr id="276696217" name="Marcador de Posição do Número do Diapositivo 5"/>
           <p:cNvSpPr>
             <a:spLocks noGrp="1"/>
           </p:cNvSpPr>
@@ -1369,7 +1369,7 @@
       </p:grpSpPr>
       <p:sp>
         <p:nvSpPr>
-          <p:cNvPr id="1849514956" name="Título 1"/>
+          <p:cNvPr id="428940218" name="Título 1"/>
           <p:cNvSpPr>
             <a:spLocks noGrp="1"/>
           </p:cNvSpPr>
@@ -1395,7 +1395,7 @@
       </p:sp>
       <p:sp>
         <p:nvSpPr>
-          <p:cNvPr id="172809680" name="Marcador de Posição de Conteúdo 2"/>
+          <p:cNvPr id="966745362" name="Marcador de Posição de Conteúdo 2"/>
           <p:cNvSpPr>
             <a:spLocks noGrp="1"/>
           </p:cNvSpPr>
@@ -1461,7 +1461,7 @@
       </p:sp>
       <p:sp>
         <p:nvSpPr>
-          <p:cNvPr id="894143494" name="Marcador de Posição da Data 3"/>
+          <p:cNvPr id="1954701443" name="Marcador de Posição da Data 3"/>
           <p:cNvSpPr>
             <a:spLocks noGrp="1"/>
           </p:cNvSpPr>
@@ -1487,7 +1487,7 @@
       </p:sp>
       <p:sp>
         <p:nvSpPr>
-          <p:cNvPr id="524749250" name="Marcador de Posição do Rodapé 4"/>
+          <p:cNvPr id="1993675089" name="Marcador de Posição do Rodapé 4"/>
           <p:cNvSpPr>
             <a:spLocks noGrp="1"/>
           </p:cNvSpPr>
@@ -1509,7 +1509,7 @@
       </p:sp>
       <p:sp>
         <p:nvSpPr>
-          <p:cNvPr id="1299775227" name="Marcador de Posição do Número do Diapositivo 5"/>
+          <p:cNvPr id="1147508462" name="Marcador de Posição do Número do Diapositivo 5"/>
           <p:cNvSpPr>
             <a:spLocks noGrp="1"/>
           </p:cNvSpPr>
@@ -1560,7 +1560,7 @@
       </p:grpSpPr>
       <p:sp>
         <p:nvSpPr>
-          <p:cNvPr id="267730012" name="Título 1"/>
+          <p:cNvPr id="704084027" name="Título 1"/>
           <p:cNvSpPr>
             <a:spLocks noGrp="1"/>
           </p:cNvSpPr>
@@ -1595,7 +1595,7 @@
       </p:sp>
       <p:sp>
         <p:nvSpPr>
-          <p:cNvPr id="1279853762" name="Marcador de Posição do Texto 2"/>
+          <p:cNvPr id="618085553" name="Marcador de Posição do Texto 2"/>
           <p:cNvSpPr>
             <a:spLocks noGrp="1"/>
           </p:cNvSpPr>
@@ -1717,7 +1717,7 @@
       </p:sp>
       <p:sp>
         <p:nvSpPr>
-          <p:cNvPr id="1227724556" name="Marcador de Posição da Data 3"/>
+          <p:cNvPr id="453968348" name="Marcador de Posição da Data 3"/>
           <p:cNvSpPr>
             <a:spLocks noGrp="1"/>
           </p:cNvSpPr>
@@ -1743,7 +1743,7 @@
       </p:sp>
       <p:sp>
         <p:nvSpPr>
-          <p:cNvPr id="378421969" name="Marcador de Posição do Rodapé 4"/>
+          <p:cNvPr id="1306132319" name="Marcador de Posição do Rodapé 4"/>
           <p:cNvSpPr>
             <a:spLocks noGrp="1"/>
           </p:cNvSpPr>
@@ -1765,7 +1765,7 @@
       </p:sp>
       <p:sp>
         <p:nvSpPr>
-          <p:cNvPr id="1070171724" name="Marcador de Posição do Número do Diapositivo 5"/>
+          <p:cNvPr id="681353583" name="Marcador de Posição do Número do Diapositivo 5"/>
           <p:cNvSpPr>
             <a:spLocks noGrp="1"/>
           </p:cNvSpPr>
@@ -1816,7 +1816,7 @@
       </p:grpSpPr>
       <p:sp>
         <p:nvSpPr>
-          <p:cNvPr id="1857363525" name="Título 1"/>
+          <p:cNvPr id="579769645" name="Título 1"/>
           <p:cNvSpPr>
             <a:spLocks noGrp="1"/>
           </p:cNvSpPr>
@@ -1842,7 +1842,7 @@
       </p:sp>
       <p:sp>
         <p:nvSpPr>
-          <p:cNvPr id="1640931498" name="Marcador de Posição de Conteúdo 2"/>
+          <p:cNvPr id="2023688444" name="Marcador de Posição de Conteúdo 2"/>
           <p:cNvSpPr>
             <a:spLocks noGrp="1"/>
           </p:cNvSpPr>
@@ -1913,7 +1913,7 @@
       </p:sp>
       <p:sp>
         <p:nvSpPr>
-          <p:cNvPr id="1713660888" name="Marcador de Posição de Conteúdo 3"/>
+          <p:cNvPr id="661555888" name="Marcador de Posição de Conteúdo 3"/>
           <p:cNvSpPr>
             <a:spLocks noGrp="1"/>
           </p:cNvSpPr>
@@ -1984,7 +1984,7 @@
       </p:sp>
       <p:sp>
         <p:nvSpPr>
-          <p:cNvPr id="1394579242" name="Marcador de Posição da Data 4"/>
+          <p:cNvPr id="1125834775" name="Marcador de Posição da Data 4"/>
           <p:cNvSpPr>
             <a:spLocks noGrp="1"/>
           </p:cNvSpPr>
@@ -2010,7 +2010,7 @@
       </p:sp>
       <p:sp>
         <p:nvSpPr>
-          <p:cNvPr id="2030112027" name="Marcador de Posição do Rodapé 5"/>
+          <p:cNvPr id="1330002229" name="Marcador de Posição do Rodapé 5"/>
           <p:cNvSpPr>
             <a:spLocks noGrp="1"/>
           </p:cNvSpPr>
@@ -2032,7 +2032,7 @@
       </p:sp>
       <p:sp>
         <p:nvSpPr>
-          <p:cNvPr id="1738401057" name="Marcador de Posição do Número do Diapositivo 6"/>
+          <p:cNvPr id="77984530" name="Marcador de Posição do Número do Diapositivo 6"/>
           <p:cNvSpPr>
             <a:spLocks noGrp="1"/>
           </p:cNvSpPr>
@@ -2083,7 +2083,7 @@
       </p:grpSpPr>
       <p:sp>
         <p:nvSpPr>
-          <p:cNvPr id="1900571875" name="Título 1"/>
+          <p:cNvPr id="2012877127" name="Título 1"/>
           <p:cNvSpPr>
             <a:spLocks noGrp="1"/>
           </p:cNvSpPr>
@@ -2114,7 +2114,7 @@
       </p:sp>
       <p:sp>
         <p:nvSpPr>
-          <p:cNvPr id="1012103939" name="Marcador de Posição do Texto 2"/>
+          <p:cNvPr id="582845715" name="Marcador de Posição do Texto 2"/>
           <p:cNvSpPr>
             <a:spLocks noGrp="1"/>
           </p:cNvSpPr>
@@ -2182,7 +2182,7 @@
       </p:sp>
       <p:sp>
         <p:nvSpPr>
-          <p:cNvPr id="1823306562" name="Marcador de Posição de Conteúdo 3"/>
+          <p:cNvPr id="1884899871" name="Marcador de Posição de Conteúdo 3"/>
           <p:cNvSpPr>
             <a:spLocks noGrp="1"/>
           </p:cNvSpPr>
@@ -2253,7 +2253,7 @@
       </p:sp>
       <p:sp>
         <p:nvSpPr>
-          <p:cNvPr id="1623247209" name="Marcador de Posição do Texto 4"/>
+          <p:cNvPr id="1641247426" name="Marcador de Posição do Texto 4"/>
           <p:cNvSpPr>
             <a:spLocks noGrp="1"/>
           </p:cNvSpPr>
@@ -2321,7 +2321,7 @@
       </p:sp>
       <p:sp>
         <p:nvSpPr>
-          <p:cNvPr id="1402930752" name="Marcador de Posição de Conteúdo 5"/>
+          <p:cNvPr id="551713026" name="Marcador de Posição de Conteúdo 5"/>
           <p:cNvSpPr>
             <a:spLocks noGrp="1"/>
           </p:cNvSpPr>
@@ -2392,7 +2392,7 @@
       </p:sp>
       <p:sp>
         <p:nvSpPr>
-          <p:cNvPr id="1848337527" name="Marcador de Posição da Data 6"/>
+          <p:cNvPr id="1163409132" name="Marcador de Posição da Data 6"/>
           <p:cNvSpPr>
             <a:spLocks noGrp="1"/>
           </p:cNvSpPr>
@@ -2418,7 +2418,7 @@
       </p:sp>
       <p:sp>
         <p:nvSpPr>
-          <p:cNvPr id="2099782444" name="Marcador de Posição do Rodapé 7"/>
+          <p:cNvPr id="1677451662" name="Marcador de Posição do Rodapé 7"/>
           <p:cNvSpPr>
             <a:spLocks noGrp="1"/>
           </p:cNvSpPr>
@@ -2440,7 +2440,7 @@
       </p:sp>
       <p:sp>
         <p:nvSpPr>
-          <p:cNvPr id="336416171" name="Marcador de Posição do Número do Diapositivo 8"/>
+          <p:cNvPr id="971455561" name="Marcador de Posição do Número do Diapositivo 8"/>
           <p:cNvSpPr>
             <a:spLocks noGrp="1"/>
           </p:cNvSpPr>
@@ -2491,7 +2491,7 @@
       </p:grpSpPr>
       <p:sp>
         <p:nvSpPr>
-          <p:cNvPr id="1300980861" name="Título 1"/>
+          <p:cNvPr id="1452998240" name="Título 1"/>
           <p:cNvSpPr>
             <a:spLocks noGrp="1"/>
           </p:cNvSpPr>
@@ -2517,7 +2517,7 @@
       </p:sp>
       <p:sp>
         <p:nvSpPr>
-          <p:cNvPr id="293435235" name="Marcador de Posição da Data 2"/>
+          <p:cNvPr id="1892951998" name="Marcador de Posição da Data 2"/>
           <p:cNvSpPr>
             <a:spLocks noGrp="1"/>
           </p:cNvSpPr>
@@ -2543,7 +2543,7 @@
       </p:sp>
       <p:sp>
         <p:nvSpPr>
-          <p:cNvPr id="1345731481" name="Marcador de Posição do Rodapé 3"/>
+          <p:cNvPr id="756234275" name="Marcador de Posição do Rodapé 3"/>
           <p:cNvSpPr>
             <a:spLocks noGrp="1"/>
           </p:cNvSpPr>
@@ -2565,7 +2565,7 @@
       </p:sp>
       <p:sp>
         <p:nvSpPr>
-          <p:cNvPr id="501476208" name="Marcador de Posição do Número do Diapositivo 4"/>
+          <p:cNvPr id="700085600" name="Marcador de Posição do Número do Diapositivo 4"/>
           <p:cNvSpPr>
             <a:spLocks noGrp="1"/>
           </p:cNvSpPr>
@@ -2616,7 +2616,7 @@
       </p:grpSpPr>
       <p:sp>
         <p:nvSpPr>
-          <p:cNvPr id="115393199" name="Marcador de Posição da Data 1"/>
+          <p:cNvPr id="1964470180" name="Marcador de Posição da Data 1"/>
           <p:cNvSpPr>
             <a:spLocks noGrp="1"/>
           </p:cNvSpPr>
@@ -2642,7 +2642,7 @@
       </p:sp>
       <p:sp>
         <p:nvSpPr>
-          <p:cNvPr id="1493547701" name="Marcador de Posição do Rodapé 2"/>
+          <p:cNvPr id="2065683802" name="Marcador de Posição do Rodapé 2"/>
           <p:cNvSpPr>
             <a:spLocks noGrp="1"/>
           </p:cNvSpPr>
@@ -2664,7 +2664,7 @@
       </p:sp>
       <p:sp>
         <p:nvSpPr>
-          <p:cNvPr id="1229446148" name="Marcador de Posição do Número do Diapositivo 3"/>
+          <p:cNvPr id="1982296436" name="Marcador de Posição do Número do Diapositivo 3"/>
           <p:cNvSpPr>
             <a:spLocks noGrp="1"/>
           </p:cNvSpPr>
@@ -2715,7 +2715,7 @@
       </p:grpSpPr>
       <p:sp>
         <p:nvSpPr>
-          <p:cNvPr id="1778663250" name="Título 1"/>
+          <p:cNvPr id="999306232" name="Título 1"/>
           <p:cNvSpPr>
             <a:spLocks noGrp="1"/>
           </p:cNvSpPr>
@@ -2750,7 +2750,7 @@
       </p:sp>
       <p:sp>
         <p:nvSpPr>
-          <p:cNvPr id="1281907499" name="Marcador de Posição de Conteúdo 2"/>
+          <p:cNvPr id="1803469469" name="Marcador de Posição de Conteúdo 2"/>
           <p:cNvSpPr>
             <a:spLocks noGrp="1"/>
           </p:cNvSpPr>
@@ -2849,7 +2849,7 @@
       </p:sp>
       <p:sp>
         <p:nvSpPr>
-          <p:cNvPr id="604625251" name="Marcador de Posição do Texto 3"/>
+          <p:cNvPr id="255079220" name="Marcador de Posição do Texto 3"/>
           <p:cNvSpPr>
             <a:spLocks noGrp="1"/>
           </p:cNvSpPr>
@@ -2917,7 +2917,7 @@
       </p:sp>
       <p:sp>
         <p:nvSpPr>
-          <p:cNvPr id="1552788633" name="Marcador de Posição da Data 4"/>
+          <p:cNvPr id="1879363129" name="Marcador de Posição da Data 4"/>
           <p:cNvSpPr>
             <a:spLocks noGrp="1"/>
           </p:cNvSpPr>
@@ -2943,7 +2943,7 @@
       </p:sp>
       <p:sp>
         <p:nvSpPr>
-          <p:cNvPr id="743683634" name="Footer Placeholder 5"/>
+          <p:cNvPr id="422531004" name="Footer Placeholder 5"/>
           <p:cNvSpPr>
             <a:spLocks noGrp="1"/>
           </p:cNvSpPr>
@@ -2965,7 +2965,7 @@
       </p:sp>
       <p:sp>
         <p:nvSpPr>
-          <p:cNvPr id="1581161254" name="Marcador de Posição do Número do Diapositivo 6"/>
+          <p:cNvPr id="1946227716" name="Marcador de Posição do Número do Diapositivo 6"/>
           <p:cNvSpPr>
             <a:spLocks noGrp="1"/>
           </p:cNvSpPr>
@@ -3016,7 +3016,7 @@
       </p:grpSpPr>
       <p:sp>
         <p:nvSpPr>
-          <p:cNvPr id="1854268046" name="Título 1"/>
+          <p:cNvPr id="1684961262" name="Título 1"/>
           <p:cNvSpPr>
             <a:spLocks noGrp="1"/>
           </p:cNvSpPr>
@@ -3051,7 +3051,7 @@
       </p:sp>
       <p:sp>
         <p:nvSpPr>
-          <p:cNvPr id="2075415653" name="Marcador de Posição da Imagem 2"/>
+          <p:cNvPr id="450554310" name="Marcador de Posição da Imagem 2"/>
           <p:cNvSpPr>
             <a:spLocks noChangeAspect="1" noGrp="1"/>
           </p:cNvSpPr>
@@ -3119,7 +3119,7 @@
       </p:sp>
       <p:sp>
         <p:nvSpPr>
-          <p:cNvPr id="213699661" name="Marcador de Posição do Texto 3"/>
+          <p:cNvPr id="681416228" name="Marcador de Posição do Texto 3"/>
           <p:cNvSpPr>
             <a:spLocks noGrp="1"/>
           </p:cNvSpPr>
@@ -3187,7 +3187,7 @@
       </p:sp>
       <p:sp>
         <p:nvSpPr>
-          <p:cNvPr id="2028266704" name="Marcador de Posição da Data 4"/>
+          <p:cNvPr id="118838677" name="Marcador de Posição da Data 4"/>
           <p:cNvSpPr>
             <a:spLocks noGrp="1"/>
           </p:cNvSpPr>
@@ -3213,7 +3213,7 @@
       </p:sp>
       <p:sp>
         <p:nvSpPr>
-          <p:cNvPr id="930871861" name="Marcador de Posição do Rodapé 5"/>
+          <p:cNvPr id="465490913" name="Marcador de Posição do Rodapé 5"/>
           <p:cNvSpPr>
             <a:spLocks noGrp="1"/>
           </p:cNvSpPr>
@@ -3235,7 +3235,7 @@
       </p:sp>
       <p:sp>
         <p:nvSpPr>
-          <p:cNvPr id="653546149" name="Marcador de Posição do Número do Diapositivo 6"/>
+          <p:cNvPr id="1434943905" name="Marcador de Posição do Número do Diapositivo 6"/>
           <p:cNvSpPr>
             <a:spLocks noGrp="1"/>
           </p:cNvSpPr>
@@ -3291,7 +3291,7 @@
       </p:grpSpPr>
       <p:sp>
         <p:nvSpPr>
-          <p:cNvPr id="130025292" name="Marcador de Posição do Título 1"/>
+          <p:cNvPr id="185744363" name="Marcador de Posição do Título 1"/>
           <p:cNvSpPr>
             <a:spLocks noGrp="1"/>
           </p:cNvSpPr>
@@ -3327,7 +3327,7 @@
       </p:sp>
       <p:sp>
         <p:nvSpPr>
-          <p:cNvPr id="1087705209" name="Marcador de Posição do Texto 2"/>
+          <p:cNvPr id="1750930060" name="Marcador de Posição do Texto 2"/>
           <p:cNvSpPr>
             <a:spLocks noGrp="1"/>
           </p:cNvSpPr>
@@ -3403,7 +3403,7 @@
       </p:sp>
       <p:sp>
         <p:nvSpPr>
-          <p:cNvPr id="772226953" name="Marcador de Posição da Data 3"/>
+          <p:cNvPr id="311410308" name="Marcador de Posição da Data 3"/>
           <p:cNvSpPr>
             <a:spLocks noGrp="1"/>
           </p:cNvSpPr>
@@ -3447,7 +3447,7 @@
       </p:sp>
       <p:sp>
         <p:nvSpPr>
-          <p:cNvPr id="654514633" name="Marcador de Posição do Rodapé 4"/>
+          <p:cNvPr id="453104110" name="Marcador de Posição do Rodapé 4"/>
           <p:cNvSpPr>
             <a:spLocks noGrp="1"/>
           </p:cNvSpPr>
@@ -3487,7 +3487,7 @@
       </p:sp>
       <p:sp>
         <p:nvSpPr>
-          <p:cNvPr id="1398175640" name="Marcador de Posição do Número do Diapositivo 5"/>
+          <p:cNvPr id="1666090886" name="Marcador de Posição do Número do Diapositivo 5"/>
           <p:cNvSpPr>
             <a:spLocks noGrp="1"/>
           </p:cNvSpPr>
@@ -3845,9 +3845,32 @@
           <a:chExt cx="0" cy="0"/>
         </a:xfrm>
       </p:grpSpPr>
-      <p:sp>
-        <p:nvSpPr>
-          <p:cNvPr id="1796338101" name=""/>
+      <p:pic>
+        <p:nvPicPr>
+          <p:cNvPr id="973742971" name=""/>
+          <p:cNvPicPr>
+            <a:picLocks noChangeAspect="1"/>
+          </p:cNvPicPr>
+          <p:nvPr/>
+        </p:nvPicPr>
+        <p:blipFill>
+          <a:blip r:embed="rId3"/>
+          <a:srcRect l="0" t="11484" r="0" b="11736"/>
+          <a:stretch/>
+        </p:blipFill>
+        <p:spPr bwMode="auto">
+          <a:xfrm flipH="0" flipV="0">
+            <a:off x="284621" y="5310586"/>
+            <a:ext cx="1748085" cy="1342162"/>
+          </a:xfrm>
+          <a:prstGeom prst="rect">
+            <a:avLst/>
+          </a:prstGeom>
+        </p:spPr>
+      </p:pic>
+      <p:sp>
+        <p:nvSpPr>
+          <p:cNvPr id="623149419" name=""/>
           <p:cNvSpPr/>
           <p:nvPr/>
         </p:nvSpPr>
@@ -3896,7 +3919,7 @@
       </p:sp>
       <p:sp>
         <p:nvSpPr>
-          <p:cNvPr id="378414402" name=""/>
+          <p:cNvPr id="61467405" name=""/>
           <p:cNvSpPr/>
           <p:nvPr/>
         </p:nvSpPr>
@@ -4005,14 +4028,14 @@
       </p:sp>
       <p:sp>
         <p:nvSpPr>
-          <p:cNvPr id="1922529935" name=""/>
+          <p:cNvPr id="1452224757" name=""/>
           <p:cNvSpPr/>
           <p:nvPr/>
         </p:nvSpPr>
         <p:spPr bwMode="auto">
           <a:xfrm flipH="0" flipV="0">
-            <a:off x="3726397" y="5403969"/>
-            <a:ext cx="1724492" cy="905771"/>
+            <a:off x="5539761" y="1037428"/>
+            <a:ext cx="1632130" cy="700740"/>
           </a:xfrm>
           <a:prstGeom prst="rect">
             <a:avLst/>
@@ -4100,7 +4123,7 @@
       </p:sp>
       <p:sp>
         <p:nvSpPr>
-          <p:cNvPr id="1869843734" name="Título 1"/>
+          <p:cNvPr id="1574944202" name="Título 1"/>
           <p:cNvSpPr>
             <a:spLocks noGrp="1"/>
           </p:cNvSpPr>
@@ -4140,53 +4163,95 @@
               <a:defRPr/>
             </a:pPr>
             <a:r>
-              <a:rPr sz="2800"/>
-              <a:t>Neo Training Server – </a:t>
-            </a:r>
-            <a:r>
-              <a:rPr lang="pt-PT" sz="2800" b="0" i="0" u="none" strike="noStrike" cap="none" spc="0">
-                <a:solidFill>
-                  <a:schemeClr val="tx1"/>
-                </a:solidFill>
-                <a:latin typeface="Arial"/>
-                <a:ea typeface="Arial"/>
-                <a:cs typeface="Arial"/>
-              </a:rPr>
-              <a:t>The C# </a:t>
-            </a:r>
-            <a:r>
-              <a:rPr lang="pt-PT" sz="2800" b="0" i="0" u="none" strike="noStrike" cap="none" spc="0">
-                <a:solidFill>
-                  <a:schemeClr val="tx1"/>
-                </a:solidFill>
-                <a:latin typeface="Arial"/>
-                <a:ea typeface="Arial"/>
-                <a:cs typeface="Arial"/>
-              </a:rPr>
-              <a:t>Monolith</a:t>
-            </a:r>
-            <a:r>
-              <a:rPr lang="pt-PT" sz="2800" b="0" i="0" u="none" strike="noStrike" cap="none" spc="0">
-                <a:solidFill>
-                  <a:schemeClr val="tx1"/>
-                </a:solidFill>
-                <a:latin typeface="Arial"/>
-                <a:ea typeface="Arial"/>
-                <a:cs typeface="Arial"/>
-              </a:rPr>
-              <a:t> </a:t>
-            </a:r>
-            <a:r>
-              <a:rPr sz="2800"/>
-              <a:t>Tech Stack</a:t>
-            </a:r>
-            <a:endParaRPr sz="2800"/>
-          </a:p>
-        </p:txBody>
-      </p:sp>
-      <p:sp>
-        <p:nvSpPr>
-          <p:cNvPr id="1911867400" name=""/>
+              <a:rPr sz="4800" b="1">
+                <a:latin typeface="Times New Roman"/>
+                <a:ea typeface="Times New Roman"/>
+                <a:cs typeface="Times New Roman"/>
+              </a:rPr>
+              <a:t>N</a:t>
+            </a:r>
+            <a:r>
+              <a:rPr sz="3600" b="1">
+                <a:latin typeface="Times New Roman"/>
+                <a:ea typeface="Times New Roman"/>
+                <a:cs typeface="Times New Roman"/>
+              </a:rPr>
+              <a:t>eo </a:t>
+            </a:r>
+            <a:r>
+              <a:rPr sz="4800" b="1">
+                <a:latin typeface="Times New Roman"/>
+                <a:ea typeface="Times New Roman"/>
+                <a:cs typeface="Times New Roman"/>
+              </a:rPr>
+              <a:t>T</a:t>
+            </a:r>
+            <a:r>
+              <a:rPr sz="3600" b="1">
+                <a:latin typeface="Times New Roman"/>
+                <a:ea typeface="Times New Roman"/>
+                <a:cs typeface="Times New Roman"/>
+              </a:rPr>
+              <a:t>raining </a:t>
+            </a:r>
+            <a:r>
+              <a:rPr sz="4800" b="1">
+                <a:latin typeface="Times New Roman"/>
+                <a:ea typeface="Times New Roman"/>
+                <a:cs typeface="Times New Roman"/>
+              </a:rPr>
+              <a:t>S</a:t>
+            </a:r>
+            <a:r>
+              <a:rPr sz="3600" b="1">
+                <a:latin typeface="Times New Roman"/>
+                <a:ea typeface="Times New Roman"/>
+                <a:cs typeface="Times New Roman"/>
+              </a:rPr>
+              <a:t>erver – </a:t>
+            </a:r>
+            <a:r>
+              <a:rPr sz="4800" b="1">
+                <a:latin typeface="Times New Roman"/>
+                <a:ea typeface="Times New Roman"/>
+                <a:cs typeface="Times New Roman"/>
+              </a:rPr>
+              <a:t>T</a:t>
+            </a:r>
+            <a:r>
+              <a:rPr sz="3600" b="1">
+                <a:latin typeface="Times New Roman"/>
+                <a:ea typeface="Times New Roman"/>
+                <a:cs typeface="Times New Roman"/>
+              </a:rPr>
+              <a:t>ech </a:t>
+            </a:r>
+            <a:r>
+              <a:rPr sz="4800" b="1">
+                <a:latin typeface="Times New Roman"/>
+                <a:ea typeface="Times New Roman"/>
+                <a:cs typeface="Times New Roman"/>
+              </a:rPr>
+              <a:t>S</a:t>
+            </a:r>
+            <a:r>
+              <a:rPr sz="3600" b="1">
+                <a:latin typeface="Times New Roman"/>
+                <a:ea typeface="Times New Roman"/>
+                <a:cs typeface="Times New Roman"/>
+              </a:rPr>
+              <a:t>tack</a:t>
+            </a:r>
+            <a:endParaRPr sz="3600" b="1">
+              <a:latin typeface="Times New Roman"/>
+              <a:cs typeface="Times New Roman"/>
+            </a:endParaRPr>
+          </a:p>
+        </p:txBody>
+      </p:sp>
+      <p:sp>
+        <p:nvSpPr>
+          <p:cNvPr id="435276045" name=""/>
           <p:cNvSpPr/>
           <p:nvPr/>
         </p:nvSpPr>
@@ -4295,7 +4360,7 @@
       </p:sp>
       <p:sp>
         <p:nvSpPr>
-          <p:cNvPr id="1581222029" name=""/>
+          <p:cNvPr id="713729558" name=""/>
           <p:cNvSpPr/>
           <p:nvPr/>
         </p:nvSpPr>
@@ -4643,14 +4708,14 @@
       </p:sp>
       <p:sp>
         <p:nvSpPr>
-          <p:cNvPr id="485539681" name=""/>
+          <p:cNvPr id="842753003" name=""/>
           <p:cNvSpPr/>
           <p:nvPr/>
         </p:nvSpPr>
         <p:spPr bwMode="auto">
           <a:xfrm flipH="0" flipV="0">
-            <a:off x="6751454" y="1305103"/>
-            <a:ext cx="1730907" cy="700740"/>
+            <a:off x="7508578" y="1037428"/>
+            <a:ext cx="1033616" cy="700740"/>
           </a:xfrm>
           <a:prstGeom prst="rect">
             <a:avLst/>
@@ -4738,7 +4803,7 @@
       </p:sp>
       <p:cxnSp>
         <p:nvCxnSpPr>
-          <p:cNvPr id="1056316094" name=""/>
+          <p:cNvPr id="30598548" name=""/>
           <p:cNvCxnSpPr/>
           <p:nvPr/>
         </p:nvCxnSpPr>
@@ -4782,14 +4847,183 @@
       </p:cxnSp>
       <p:cxnSp>
         <p:nvCxnSpPr>
-          <p:cNvPr id="1534285399" name=""/>
-          <p:cNvCxnSpPr/>
+          <p:cNvPr id="434161189" name=""/>
+          <p:cNvCxnSpPr>
+            <a:stCxn id="1452224757" idx="1"/>
+            <a:endCxn id="713729558" idx="0"/>
+          </p:cNvCxnSpPr>
           <p:nvPr/>
         </p:nvCxnSpPr>
         <p:spPr bwMode="auto">
-          <a:xfrm rot="16199969" flipH="0" flipV="0">
-            <a:off x="4350291" y="5165617"/>
-            <a:ext cx="476703" cy="0"/>
+          <a:xfrm rot="10799990" flipH="0" flipV="1">
+            <a:off x="4588642" y="1387798"/>
+            <a:ext cx="951117" cy="454837"/>
+          </a:xfrm>
+          <a:prstGeom prst="line">
+            <a:avLst/>
+          </a:prstGeom>
+          <a:ln w="28575" cap="flat" cmpd="sng" algn="ctr">
+            <a:solidFill>
+              <a:srgbClr val="FFC000"/>
+            </a:solidFill>
+            <a:prstDash val="sysDash"/>
+            <a:miter lim="800000"/>
+            <a:headEnd type="arrow" len="med"/>
+            <a:tailEnd type="arrow" len="med"/>
+          </a:ln>
+        </p:spPr>
+        <p:style>
+          <a:lnRef idx="1">
+            <a:schemeClr val="accent1">
+              <a:shade val="50000"/>
+            </a:schemeClr>
+          </a:lnRef>
+          <a:fillRef idx="0">
+            <a:schemeClr val="accent1"/>
+          </a:fillRef>
+          <a:effectRef idx="0">
+            <a:schemeClr val="accent1"/>
+          </a:effectRef>
+          <a:fontRef idx="minor">
+            <a:schemeClr val="tx1"/>
+          </a:fontRef>
+        </p:style>
+      </p:cxnSp>
+      <p:sp>
+        <p:nvSpPr>
+          <p:cNvPr id="1269980424" name=""/>
+          <p:cNvSpPr/>
+          <p:nvPr/>
+        </p:nvSpPr>
+        <p:spPr bwMode="auto">
+          <a:xfrm flipH="0" flipV="0">
+            <a:off x="6870224" y="2964287"/>
+            <a:ext cx="1020420" cy="866337"/>
+          </a:xfrm>
+          <a:prstGeom prst="rect">
+            <a:avLst/>
+          </a:prstGeom>
+          <a:solidFill>
+            <a:schemeClr val="bg1"/>
+          </a:solidFill>
+          <a:ln w="38099" cap="flat" cmpd="sng" algn="ctr">
+            <a:solidFill>
+              <a:srgbClr val="C00000"/>
+            </a:solidFill>
+            <a:prstDash val="solid"/>
+            <a:miter lim="800000"/>
+          </a:ln>
+        </p:spPr>
+        <p:style>
+          <a:lnRef idx="2">
+            <a:schemeClr val="accent1">
+              <a:shade val="50000"/>
+            </a:schemeClr>
+          </a:lnRef>
+          <a:fillRef idx="1">
+            <a:schemeClr val="accent1"/>
+          </a:fillRef>
+          <a:effectRef idx="0">
+            <a:schemeClr val="accent1"/>
+          </a:effectRef>
+          <a:fontRef idx="minor">
+            <a:schemeClr val="lt1"/>
+          </a:fontRef>
+        </p:style>
+        <p:txBody>
+          <a:bodyPr/>
+          <a:p>
+            <a:pPr>
+              <a:defRPr/>
+            </a:pPr>
+            <a:r>
+              <a:rPr sz="1200">
+                <a:solidFill>
+                  <a:schemeClr val="tx1"/>
+                </a:solidFill>
+              </a:rPr>
+              <a:t>FrontEnd</a:t>
+            </a:r>
+            <a:endParaRPr sz="1200">
+              <a:solidFill>
+                <a:schemeClr val="tx1"/>
+              </a:solidFill>
+            </a:endParaRPr>
+          </a:p>
+          <a:p>
+            <a:pPr>
+              <a:defRPr/>
+            </a:pPr>
+            <a:endParaRPr sz="1200">
+              <a:solidFill>
+                <a:schemeClr val="tx1"/>
+              </a:solidFill>
+            </a:endParaRPr>
+          </a:p>
+          <a:p>
+            <a:pPr>
+              <a:defRPr/>
+            </a:pPr>
+            <a:r>
+              <a:rPr sz="1200">
+                <a:solidFill>
+                  <a:schemeClr val="tx1"/>
+                </a:solidFill>
+              </a:rPr>
+              <a:t>Functions:</a:t>
+            </a:r>
+            <a:endParaRPr sz="1200">
+              <a:solidFill>
+                <a:schemeClr val="tx1"/>
+              </a:solidFill>
+            </a:endParaRPr>
+          </a:p>
+          <a:p>
+            <a:pPr marL="283878" indent="-283878">
+              <a:buFont typeface="Arial"/>
+              <a:buChar char="–"/>
+              <a:defRPr/>
+            </a:pPr>
+            <a:r>
+              <a:rPr sz="1200">
+                <a:solidFill>
+                  <a:schemeClr val="tx1"/>
+                </a:solidFill>
+              </a:rPr>
+              <a:t>UI / UX</a:t>
+            </a:r>
+            <a:endParaRPr sz="1200">
+              <a:solidFill>
+                <a:schemeClr val="tx1"/>
+              </a:solidFill>
+            </a:endParaRPr>
+          </a:p>
+          <a:p>
+            <a:pPr marL="283878" indent="-283878">
+              <a:buFont typeface="Arial"/>
+              <a:buChar char="–"/>
+              <a:defRPr/>
+            </a:pPr>
+            <a:endParaRPr sz="1200">
+              <a:solidFill>
+                <a:schemeClr val="tx1"/>
+              </a:solidFill>
+            </a:endParaRPr>
+          </a:p>
+        </p:txBody>
+      </p:sp>
+      <p:cxnSp>
+        <p:nvCxnSpPr>
+          <p:cNvPr id="929940375" name=""/>
+          <p:cNvCxnSpPr>
+            <a:stCxn id="1269980424" idx="1"/>
+          </p:cNvCxnSpPr>
+          <p:nvPr/>
+        </p:nvCxnSpPr>
+        <p:spPr bwMode="auto">
+          <a:xfrm rot="10799989" flipH="0" flipV="0">
+            <a:off x="5539761" y="3391205"/>
+            <a:ext cx="1330463" cy="0"/>
           </a:xfrm>
           <a:prstGeom prst="line">
             <a:avLst/>
@@ -4826,137 +5060,46 @@
       </p:cxnSp>
       <p:sp>
         <p:nvSpPr>
-          <p:cNvPr id="1635421841" name=""/>
-          <p:cNvSpPr/>
+          <p:cNvPr id="101382779" name=""/>
+          <p:cNvSpPr txBox="1"/>
           <p:nvPr/>
         </p:nvSpPr>
         <p:spPr bwMode="auto">
-          <a:xfrm flipH="0" flipV="0">
-            <a:off x="7380435" y="2951781"/>
-            <a:ext cx="1020420" cy="866338"/>
+          <a:xfrm rot="0" flipH="0" flipV="0">
+            <a:off x="5687622" y="2839210"/>
+            <a:ext cx="1123666" cy="366119"/>
           </a:xfrm>
           <a:prstGeom prst="rect">
             <a:avLst/>
           </a:prstGeom>
-          <a:solidFill>
-            <a:schemeClr val="bg1"/>
-          </a:solidFill>
-          <a:ln w="38099" cap="flat" cmpd="sng" algn="ctr">
-            <a:solidFill>
-              <a:srgbClr val="C00000"/>
-            </a:solidFill>
-            <a:prstDash val="solid"/>
-            <a:miter lim="800000"/>
-          </a:ln>
-        </p:spPr>
-        <p:style>
-          <a:lnRef idx="2">
-            <a:schemeClr val="accent1">
-              <a:shade val="50000"/>
-            </a:schemeClr>
-          </a:lnRef>
-          <a:fillRef idx="1">
-            <a:schemeClr val="accent1"/>
-          </a:fillRef>
-          <a:effectRef idx="0">
-            <a:schemeClr val="accent1"/>
-          </a:effectRef>
-          <a:fontRef idx="minor">
-            <a:schemeClr val="lt1"/>
-          </a:fontRef>
-        </p:style>
-        <p:txBody>
-          <a:bodyPr/>
-          <a:p>
-            <a:pPr>
-              <a:defRPr/>
-            </a:pPr>
-            <a:r>
-              <a:rPr sz="1200">
-                <a:solidFill>
-                  <a:schemeClr val="tx1"/>
-                </a:solidFill>
-              </a:rPr>
-              <a:t>FrontEnd</a:t>
-            </a:r>
-            <a:endParaRPr sz="1200">
-              <a:solidFill>
-                <a:schemeClr val="tx1"/>
-              </a:solidFill>
-            </a:endParaRPr>
-          </a:p>
-          <a:p>
-            <a:pPr>
-              <a:defRPr/>
-            </a:pPr>
-            <a:endParaRPr sz="1200">
-              <a:solidFill>
-                <a:schemeClr val="tx1"/>
-              </a:solidFill>
-            </a:endParaRPr>
-          </a:p>
-          <a:p>
-            <a:pPr>
-              <a:defRPr/>
-            </a:pPr>
-            <a:r>
-              <a:rPr sz="1200">
-                <a:solidFill>
-                  <a:schemeClr val="tx1"/>
-                </a:solidFill>
-              </a:rPr>
-              <a:t>Functions:</a:t>
-            </a:r>
-            <a:endParaRPr sz="1200">
-              <a:solidFill>
-                <a:schemeClr val="tx1"/>
-              </a:solidFill>
-            </a:endParaRPr>
-          </a:p>
-          <a:p>
-            <a:pPr marL="283878" indent="-283878">
-              <a:buFont typeface="Arial"/>
-              <a:buChar char="–"/>
-              <a:defRPr/>
-            </a:pPr>
-            <a:r>
-              <a:rPr sz="1200">
-                <a:solidFill>
-                  <a:schemeClr val="tx1"/>
-                </a:solidFill>
-              </a:rPr>
-              <a:t>UI / UX</a:t>
-            </a:r>
-            <a:endParaRPr sz="1200">
-              <a:solidFill>
-                <a:schemeClr val="tx1"/>
-              </a:solidFill>
-            </a:endParaRPr>
-          </a:p>
-          <a:p>
-            <a:pPr marL="283878" indent="-283878">
-              <a:buFont typeface="Arial"/>
-              <a:buChar char="–"/>
-              <a:defRPr/>
-            </a:pPr>
-            <a:endParaRPr sz="1200">
-              <a:solidFill>
-                <a:schemeClr val="tx1"/>
-              </a:solidFill>
-            </a:endParaRPr>
+          <a:noFill/>
+        </p:spPr>
+        <p:txBody>
+          <a:bodyPr vertOverflow="overflow" horzOverflow="overflow" vert="horz" wrap="none" lIns="91440" tIns="45720" rIns="91440" bIns="45720" numCol="1" spcCol="0" rtlCol="0" fromWordArt="0" anchor="t" anchorCtr="0" forceAA="0" upright="0" compatLnSpc="0">
+            <a:spAutoFit/>
+          </a:bodyPr>
+          <a:p>
+            <a:pPr>
+              <a:defRPr/>
+            </a:pPr>
+            <a:r>
+              <a:rPr/>
+              <a:t>API Calls</a:t>
+            </a:r>
+            <a:endParaRPr/>
           </a:p>
         </p:txBody>
       </p:sp>
       <p:cxnSp>
         <p:nvCxnSpPr>
-          <p:cNvPr id="2073718704" name=""/>
+          <p:cNvPr id="49320634" name=""/>
           <p:cNvCxnSpPr/>
           <p:nvPr/>
         </p:nvCxnSpPr>
         <p:spPr bwMode="auto">
-          <a:xfrm rot="10799990" flipH="0" flipV="1">
-            <a:off x="5539761" y="3384951"/>
-            <a:ext cx="1840673" cy="0"/>
+          <a:xfrm rot="10799989" flipH="0" flipV="1">
+            <a:off x="2645707" y="3384951"/>
+            <a:ext cx="991819" cy="981655"/>
           </a:xfrm>
           <a:prstGeom prst="line">
             <a:avLst/>
@@ -4993,89 +5136,13 @@
       </p:cxnSp>
       <p:sp>
         <p:nvSpPr>
-          <p:cNvPr id="1107761049" name=""/>
-          <p:cNvSpPr txBox="1"/>
-          <p:nvPr/>
-        </p:nvSpPr>
-        <p:spPr bwMode="auto">
-          <a:xfrm rot="0" flipH="0" flipV="0">
-            <a:off x="5762800" y="2951781"/>
-            <a:ext cx="1429286" cy="366119"/>
-          </a:xfrm>
-          <a:prstGeom prst="rect">
-            <a:avLst/>
-          </a:prstGeom>
-          <a:noFill/>
-        </p:spPr>
-        <p:txBody>
-          <a:bodyPr vertOverflow="overflow" horzOverflow="overflow" vert="horz" wrap="none" lIns="91440" tIns="45720" rIns="91440" bIns="45720" numCol="1" spcCol="0" rtlCol="0" fromWordArt="0" anchor="t" anchorCtr="0" forceAA="0" upright="0" compatLnSpc="0">
-            <a:spAutoFit/>
-          </a:bodyPr>
-          <a:p>
-            <a:pPr>
-              <a:defRPr/>
-            </a:pPr>
-            <a:r>
-              <a:rPr/>
-              <a:t>Login/logout</a:t>
-            </a:r>
-            <a:endParaRPr/>
-          </a:p>
-        </p:txBody>
-      </p:sp>
-      <p:cxnSp>
-        <p:nvCxnSpPr>
-          <p:cNvPr id="903762901" name=""/>
-          <p:cNvCxnSpPr/>
-          <p:nvPr/>
-        </p:nvCxnSpPr>
-        <p:spPr bwMode="auto">
-          <a:xfrm rot="10799990" flipH="0" flipV="1">
-            <a:off x="2645707" y="3384951"/>
-            <a:ext cx="991819" cy="981655"/>
-          </a:xfrm>
-          <a:prstGeom prst="line">
-            <a:avLst/>
-          </a:prstGeom>
-          <a:ln w="28575" cap="flat" cmpd="sng" algn="ctr">
-            <a:solidFill>
-              <a:schemeClr val="accent2">
-                <a:lumMod val="40000"/>
-                <a:lumOff val="60000"/>
-              </a:schemeClr>
-            </a:solidFill>
-            <a:prstDash val="sysDash"/>
-            <a:miter lim="800000"/>
-            <a:headEnd type="arrow" len="med"/>
-            <a:tailEnd type="arrow" len="med"/>
-          </a:ln>
-        </p:spPr>
-        <p:style>
-          <a:lnRef idx="1">
-            <a:schemeClr val="accent1">
-              <a:shade val="50000"/>
-            </a:schemeClr>
-          </a:lnRef>
-          <a:fillRef idx="0">
-            <a:schemeClr val="accent1"/>
-          </a:fillRef>
-          <a:effectRef idx="0">
-            <a:schemeClr val="accent1"/>
-          </a:effectRef>
-          <a:fontRef idx="minor">
-            <a:schemeClr val="tx1"/>
-          </a:fontRef>
-        </p:style>
-      </p:cxnSp>
-      <p:sp>
-        <p:nvSpPr>
-          <p:cNvPr id="1377032195" name=""/>
+          <p:cNvPr id="1170418410" name=""/>
           <p:cNvSpPr/>
           <p:nvPr/>
         </p:nvSpPr>
         <p:spPr bwMode="auto">
           <a:xfrm flipH="0" flipV="0">
-            <a:off x="9352783" y="4226274"/>
+            <a:off x="8775401" y="3606411"/>
             <a:ext cx="1902232" cy="1277244"/>
           </a:xfrm>
           <a:prstGeom prst="rect">
@@ -5236,13 +5303,13 @@
       </p:sp>
       <p:sp>
         <p:nvSpPr>
-          <p:cNvPr id="286094230" name=""/>
+          <p:cNvPr id="1676337407" name=""/>
           <p:cNvSpPr/>
           <p:nvPr/>
         </p:nvSpPr>
         <p:spPr bwMode="auto">
           <a:xfrm flipH="0" flipV="0">
-            <a:off x="9352783" y="2746329"/>
+            <a:off x="8775401" y="2120213"/>
             <a:ext cx="1902232" cy="1277244"/>
           </a:xfrm>
           <a:prstGeom prst="rect">
@@ -5403,14 +5470,16 @@
       </p:sp>
       <p:cxnSp>
         <p:nvCxnSpPr>
-          <p:cNvPr id="1131868406" name=""/>
-          <p:cNvCxnSpPr/>
+          <p:cNvPr id="176002265" name=""/>
+          <p:cNvCxnSpPr>
+            <a:endCxn id="1676337407" idx="1"/>
+          </p:cNvCxnSpPr>
           <p:nvPr/>
         </p:nvCxnSpPr>
         <p:spPr bwMode="auto">
-          <a:xfrm rot="0" flipH="0" flipV="0">
-            <a:off x="8400855" y="3384951"/>
-            <a:ext cx="951926" cy="0"/>
+          <a:xfrm rot="0" flipH="0" flipV="1">
+            <a:off x="7890644" y="2758835"/>
+            <a:ext cx="884755" cy="638621"/>
           </a:xfrm>
           <a:prstGeom prst="line">
             <a:avLst/>
@@ -5444,14 +5513,17 @@
       </p:cxnSp>
       <p:cxnSp>
         <p:nvCxnSpPr>
-          <p:cNvPr id="719009707" name=""/>
-          <p:cNvCxnSpPr/>
+          <p:cNvPr id="1046957508" name=""/>
+          <p:cNvCxnSpPr>
+            <a:stCxn id="1269980424" idx="3"/>
+            <a:endCxn id="1170418410" idx="1"/>
+          </p:cNvCxnSpPr>
           <p:nvPr/>
         </p:nvCxnSpPr>
         <p:spPr bwMode="auto">
           <a:xfrm rot="0" flipH="0" flipV="0">
-            <a:off x="8400855" y="3384951"/>
-            <a:ext cx="951926" cy="1479942"/>
+            <a:off x="7890644" y="3397456"/>
+            <a:ext cx="884755" cy="847577"/>
           </a:xfrm>
           <a:prstGeom prst="line">
             <a:avLst/>
@@ -5485,14 +5557,16 @@
       </p:cxnSp>
       <p:cxnSp>
         <p:nvCxnSpPr>
-          <p:cNvPr id="1047910390" name=""/>
-          <p:cNvCxnSpPr/>
+          <p:cNvPr id="988870115" name=""/>
+          <p:cNvCxnSpPr>
+            <a:stCxn id="842753003" idx="3"/>
+          </p:cNvCxnSpPr>
           <p:nvPr/>
         </p:nvCxnSpPr>
         <p:spPr bwMode="auto">
           <a:xfrm rot="0" flipH="0" flipV="0">
-            <a:off x="8482361" y="1655473"/>
-            <a:ext cx="1821537" cy="1090854"/>
+            <a:off x="8542194" y="1387798"/>
+            <a:ext cx="1145577" cy="732412"/>
           </a:xfrm>
           <a:prstGeom prst="line">
             <a:avLst/>
@@ -5524,6 +5598,250 @@
           </a:fontRef>
         </p:style>
       </p:cxnSp>
+      <p:pic>
+        <p:nvPicPr>
+          <p:cNvPr id="1834689802" name=""/>
+          <p:cNvPicPr>
+            <a:picLocks noChangeAspect="1"/>
+          </p:cNvPicPr>
+          <p:nvPr/>
+        </p:nvPicPr>
+        <p:blipFill>
+          <a:blip r:embed="rId4"/>
+          <a:stretch/>
+        </p:blipFill>
+        <p:spPr bwMode="auto">
+          <a:xfrm flipH="0" flipV="0">
+            <a:off x="3876004" y="5025296"/>
+            <a:ext cx="1573007" cy="1573007"/>
+          </a:xfrm>
+          <a:prstGeom prst="rect">
+            <a:avLst/>
+          </a:prstGeom>
+        </p:spPr>
+      </p:pic>
+      <p:pic>
+        <p:nvPicPr>
+          <p:cNvPr id="1978043296" name=""/>
+          <p:cNvPicPr>
+            <a:picLocks noChangeAspect="1"/>
+          </p:cNvPicPr>
+          <p:nvPr/>
+        </p:nvPicPr>
+        <p:blipFill>
+          <a:blip r:embed="rId5"/>
+          <a:stretch/>
+        </p:blipFill>
+        <p:spPr bwMode="auto">
+          <a:xfrm flipH="0" flipV="0">
+            <a:off x="1335862" y="5115402"/>
+            <a:ext cx="1129305" cy="635234"/>
+          </a:xfrm>
+          <a:prstGeom prst="rect">
+            <a:avLst/>
+          </a:prstGeom>
+        </p:spPr>
+      </p:pic>
+      <p:pic>
+        <p:nvPicPr>
+          <p:cNvPr id="2145588639" name=""/>
+          <p:cNvPicPr>
+            <a:picLocks noChangeAspect="1"/>
+          </p:cNvPicPr>
+          <p:nvPr/>
+        </p:nvPicPr>
+        <p:blipFill>
+          <a:blip r:embed="rId6"/>
+          <a:srcRect l="24734" t="20562" r="24611" b="21128"/>
+          <a:stretch/>
+        </p:blipFill>
+        <p:spPr bwMode="auto">
+          <a:xfrm flipH="0" flipV="0">
+            <a:off x="9014997" y="5115403"/>
+            <a:ext cx="1543921" cy="1482901"/>
+          </a:xfrm>
+          <a:prstGeom prst="rect">
+            <a:avLst/>
+          </a:prstGeom>
+        </p:spPr>
+      </p:pic>
+      <p:pic>
+        <p:nvPicPr>
+          <p:cNvPr id="935322903" name=""/>
+          <p:cNvPicPr>
+            <a:picLocks noChangeAspect="1"/>
+          </p:cNvPicPr>
+          <p:nvPr/>
+        </p:nvPicPr>
+        <p:blipFill>
+          <a:blip r:embed="rId7"/>
+          <a:stretch/>
+        </p:blipFill>
+        <p:spPr bwMode="auto">
+          <a:xfrm flipH="0" flipV="0">
+            <a:off x="9603742" y="645644"/>
+            <a:ext cx="1474567" cy="1474567"/>
+          </a:xfrm>
+          <a:prstGeom prst="rect">
+            <a:avLst/>
+          </a:prstGeom>
+        </p:spPr>
+      </p:pic>
+      <p:pic>
+        <p:nvPicPr>
+          <p:cNvPr id="2141126661" name=""/>
+          <p:cNvPicPr>
+            <a:picLocks noChangeAspect="1"/>
+          </p:cNvPicPr>
+          <p:nvPr/>
+        </p:nvPicPr>
+        <p:blipFill>
+          <a:blip r:embed="rId8"/>
+          <a:srcRect l="29479" t="21676" r="29543" b="27432"/>
+          <a:stretch/>
+        </p:blipFill>
+        <p:spPr bwMode="auto">
+          <a:xfrm flipH="0" flipV="0">
+            <a:off x="3590746" y="1131922"/>
+            <a:ext cx="1214149" cy="511752"/>
+          </a:xfrm>
+          <a:prstGeom prst="rect">
+            <a:avLst/>
+          </a:prstGeom>
+        </p:spPr>
+      </p:pic>
+      <p:pic>
+        <p:nvPicPr>
+          <p:cNvPr id="591009877" name=""/>
+          <p:cNvPicPr>
+            <a:picLocks noChangeAspect="1"/>
+          </p:cNvPicPr>
+          <p:nvPr/>
+        </p:nvPicPr>
+        <p:blipFill>
+          <a:blip r:embed="rId9"/>
+          <a:stretch/>
+        </p:blipFill>
+        <p:spPr bwMode="auto">
+          <a:xfrm flipH="0" flipV="0">
+            <a:off x="10789262" y="2188642"/>
+            <a:ext cx="1251308" cy="1016687"/>
+          </a:xfrm>
+          <a:prstGeom prst="rect">
+            <a:avLst/>
+          </a:prstGeom>
+        </p:spPr>
+      </p:pic>
+      <p:pic>
+        <p:nvPicPr>
+          <p:cNvPr id="1493429597" name=""/>
+          <p:cNvPicPr>
+            <a:picLocks noChangeAspect="1"/>
+          </p:cNvPicPr>
+          <p:nvPr/>
+        </p:nvPicPr>
+        <p:blipFill>
+          <a:blip r:embed="rId10"/>
+          <a:stretch/>
+        </p:blipFill>
+        <p:spPr bwMode="auto">
+          <a:xfrm flipH="0" flipV="0">
+            <a:off x="10655725" y="3657505"/>
+            <a:ext cx="1518382" cy="759191"/>
+          </a:xfrm>
+          <a:prstGeom prst="rect">
+            <a:avLst/>
+          </a:prstGeom>
+        </p:spPr>
+      </p:pic>
+      <p:pic>
+        <p:nvPicPr>
+          <p:cNvPr id="732640469" name=""/>
+          <p:cNvPicPr>
+            <a:picLocks noChangeAspect="1"/>
+          </p:cNvPicPr>
+          <p:nvPr/>
+        </p:nvPicPr>
+        <p:blipFill>
+          <a:blip r:embed="rId11"/>
+          <a:stretch/>
+        </p:blipFill>
+        <p:spPr bwMode="auto">
+          <a:xfrm flipH="0" flipV="0">
+            <a:off x="10789262" y="4319841"/>
+            <a:ext cx="1313727" cy="656863"/>
+          </a:xfrm>
+          <a:prstGeom prst="rect">
+            <a:avLst/>
+          </a:prstGeom>
+        </p:spPr>
+      </p:pic>
+      <p:pic>
+        <p:nvPicPr>
+          <p:cNvPr id="815009281" name=""/>
+          <p:cNvPicPr>
+            <a:picLocks noChangeAspect="1"/>
+          </p:cNvPicPr>
+          <p:nvPr/>
+        </p:nvPicPr>
+        <p:blipFill>
+          <a:blip r:embed="rId12"/>
+          <a:stretch/>
+        </p:blipFill>
+        <p:spPr bwMode="auto">
+          <a:xfrm flipH="0" flipV="0">
+            <a:off x="1158664" y="1205934"/>
+            <a:ext cx="1243177" cy="532235"/>
+          </a:xfrm>
+          <a:prstGeom prst="rect">
+            <a:avLst/>
+          </a:prstGeom>
+        </p:spPr>
+      </p:pic>
+      <p:pic>
+        <p:nvPicPr>
+          <p:cNvPr id="1029672738" name=""/>
+          <p:cNvPicPr>
+            <a:picLocks noChangeAspect="1"/>
+          </p:cNvPicPr>
+          <p:nvPr/>
+        </p:nvPicPr>
+        <p:blipFill>
+          <a:blip r:embed="rId13"/>
+          <a:stretch/>
+        </p:blipFill>
+        <p:spPr bwMode="auto">
+          <a:xfrm flipH="0" flipV="0">
+            <a:off x="1275847" y="2959002"/>
+            <a:ext cx="1009166" cy="851893"/>
+          </a:xfrm>
+          <a:prstGeom prst="rect">
+            <a:avLst/>
+          </a:prstGeom>
+        </p:spPr>
+      </p:pic>
+      <p:pic>
+        <p:nvPicPr>
+          <p:cNvPr id="852702761" name=""/>
+          <p:cNvPicPr>
+            <a:picLocks noChangeAspect="1"/>
+          </p:cNvPicPr>
+          <p:nvPr/>
+        </p:nvPicPr>
+        <p:blipFill>
+          <a:blip r:embed="rId4"/>
+          <a:stretch/>
+        </p:blipFill>
+        <p:spPr bwMode="auto">
+          <a:xfrm flipH="0" flipV="0">
+            <a:off x="6452379" y="4976703"/>
+            <a:ext cx="1573006" cy="1573006"/>
+          </a:xfrm>
+          <a:prstGeom prst="rect">
+            <a:avLst/>
+          </a:prstGeom>
+        </p:spPr>
+      </p:pic>
     </p:spTree>
   </p:cSld>
   <p:clrMapOvr>
@@ -5559,7 +5877,7 @@
       </p:grpSpPr>
       <p:sp>
         <p:nvSpPr>
-          <p:cNvPr id="1989326985" name=""/>
+          <p:cNvPr id="1696936982" name=""/>
           <p:cNvSpPr/>
           <p:nvPr/>
         </p:nvSpPr>
@@ -5608,7 +5926,7 @@
       </p:sp>
       <p:sp>
         <p:nvSpPr>
-          <p:cNvPr id="1938131776" name=""/>
+          <p:cNvPr id="2128656028" name=""/>
           <p:cNvSpPr/>
           <p:nvPr/>
         </p:nvSpPr>
@@ -5717,7 +6035,7 @@
       </p:sp>
       <p:sp>
         <p:nvSpPr>
-          <p:cNvPr id="814003918" name=""/>
+          <p:cNvPr id="1931292359" name=""/>
           <p:cNvSpPr/>
           <p:nvPr/>
         </p:nvSpPr>
@@ -5812,7 +6130,7 @@
       </p:sp>
       <p:sp>
         <p:nvSpPr>
-          <p:cNvPr id="55169821" name="Título 1"/>
+          <p:cNvPr id="282720531" name="Título 1"/>
           <p:cNvSpPr>
             <a:spLocks noGrp="1"/>
           </p:cNvSpPr>
@@ -5858,7 +6176,7 @@
       </p:sp>
       <p:sp>
         <p:nvSpPr>
-          <p:cNvPr id="2031861097" name=""/>
+          <p:cNvPr id="1888988122" name=""/>
           <p:cNvSpPr/>
           <p:nvPr/>
         </p:nvSpPr>
@@ -5967,7 +6285,7 @@
       </p:sp>
       <p:sp>
         <p:nvSpPr>
-          <p:cNvPr id="520749008" name=""/>
+          <p:cNvPr id="2021581954" name=""/>
           <p:cNvSpPr/>
           <p:nvPr/>
         </p:nvSpPr>
@@ -6274,7 +6592,7 @@
       </p:sp>
       <p:sp>
         <p:nvSpPr>
-          <p:cNvPr id="652237755" name=""/>
+          <p:cNvPr id="1084796001" name=""/>
           <p:cNvSpPr/>
           <p:nvPr/>
         </p:nvSpPr>
@@ -6369,7 +6687,7 @@
       </p:sp>
       <p:sp>
         <p:nvSpPr>
-          <p:cNvPr id="1279569497" name=""/>
+          <p:cNvPr id="159929188" name=""/>
           <p:cNvSpPr/>
           <p:nvPr/>
         </p:nvSpPr>
@@ -6524,15 +6842,15 @@
       </p:sp>
       <p:cxnSp>
         <p:nvCxnSpPr>
-          <p:cNvPr id="1932786060" name=""/>
+          <p:cNvPr id="852643260" name=""/>
           <p:cNvCxnSpPr>
-            <a:stCxn id="2031861097" idx="0"/>
-            <a:endCxn id="520749008" idx="1"/>
+            <a:stCxn id="1888988122" idx="0"/>
+            <a:endCxn id="2021581954" idx="1"/>
           </p:cNvCxnSpPr>
           <p:nvPr/>
         </p:nvCxnSpPr>
         <p:spPr bwMode="auto">
-          <a:xfrm rot="16199934" flipH="0" flipV="0">
+          <a:xfrm rot="16199932" flipH="0" flipV="0">
             <a:off x="1706628" y="1561082"/>
             <a:ext cx="1641641" cy="2945109"/>
           </a:xfrm>
@@ -6571,15 +6889,15 @@
       </p:cxnSp>
       <p:cxnSp>
         <p:nvCxnSpPr>
-          <p:cNvPr id="2003768593" name=""/>
+          <p:cNvPr id="563165706" name=""/>
           <p:cNvCxnSpPr>
-            <a:stCxn id="1279569497" idx="0"/>
-            <a:endCxn id="520749008" idx="3"/>
+            <a:stCxn id="159929188" idx="0"/>
+            <a:endCxn id="2021581954" idx="3"/>
           </p:cNvCxnSpPr>
           <p:nvPr/>
         </p:nvCxnSpPr>
         <p:spPr bwMode="auto">
-          <a:xfrm rot="16199934" flipH="0" flipV="1">
+          <a:xfrm rot="16199932" flipH="0" flipV="1">
             <a:off x="4881916" y="3233138"/>
             <a:ext cx="2958467" cy="917818"/>
           </a:xfrm>
@@ -6618,15 +6936,15 @@
       </p:cxnSp>
       <p:cxnSp>
         <p:nvCxnSpPr>
-          <p:cNvPr id="1032353446" name=""/>
+          <p:cNvPr id="1936786208" name=""/>
           <p:cNvCxnSpPr>
-            <a:stCxn id="814003918" idx="0"/>
-            <a:endCxn id="520749008" idx="2"/>
+            <a:stCxn id="1931292359" idx="0"/>
+            <a:endCxn id="2021581954" idx="2"/>
           </p:cNvCxnSpPr>
           <p:nvPr/>
         </p:nvCxnSpPr>
         <p:spPr bwMode="auto">
-          <a:xfrm rot="16199934" flipH="0" flipV="1">
+          <a:xfrm rot="16199932" flipH="0" flipV="1">
             <a:off x="4784347" y="3730075"/>
             <a:ext cx="333550" cy="0"/>
           </a:xfrm>
@@ -6665,14 +6983,14 @@
       </p:cxnSp>
       <p:sp>
         <p:nvSpPr>
-          <p:cNvPr id="1113766570" name=""/>
+          <p:cNvPr id="982562846" name=""/>
           <p:cNvSpPr/>
           <p:nvPr/>
         </p:nvSpPr>
         <p:spPr bwMode="auto">
           <a:xfrm flipH="0" flipV="0">
             <a:off x="8442960" y="3821234"/>
-            <a:ext cx="1020420" cy="866338"/>
+            <a:ext cx="1020420" cy="866337"/>
           </a:xfrm>
           <a:prstGeom prst="rect">
             <a:avLst/>
@@ -6788,10 +7106,10 @@
       </p:sp>
       <p:cxnSp>
         <p:nvCxnSpPr>
-          <p:cNvPr id="1733568832" name=""/>
+          <p:cNvPr id="1289290586" name=""/>
           <p:cNvCxnSpPr>
-            <a:stCxn id="1279569497" idx="3"/>
-            <a:endCxn id="1113766570" idx="1"/>
+            <a:stCxn id="159929188" idx="3"/>
+            <a:endCxn id="982562846" idx="1"/>
           </p:cNvCxnSpPr>
           <p:nvPr/>
         </p:nvCxnSpPr>
@@ -6832,15 +7150,15 @@
       </p:cxnSp>
       <p:cxnSp>
         <p:nvCxnSpPr>
-          <p:cNvPr id="179806570" name=""/>
+          <p:cNvPr id="2069088655" name=""/>
           <p:cNvCxnSpPr>
-            <a:stCxn id="1279569497" idx="1"/>
-            <a:endCxn id="1938131776" idx="2"/>
+            <a:stCxn id="159929188" idx="1"/>
+            <a:endCxn id="2128656028" idx="2"/>
           </p:cNvCxnSpPr>
           <p:nvPr/>
         </p:nvCxnSpPr>
         <p:spPr bwMode="auto">
-          <a:xfrm rot="10799956" flipH="0" flipV="0">
+          <a:xfrm rot="10799954" flipH="0" flipV="0">
             <a:off x="2917629" y="4848025"/>
             <a:ext cx="2951312" cy="1048743"/>
           </a:xfrm>
@@ -6876,10 +7194,10 @@
       </p:cxnSp>
       <p:cxnSp>
         <p:nvCxnSpPr>
-          <p:cNvPr id="1699561991" name=""/>
+          <p:cNvPr id="2038852732" name=""/>
           <p:cNvCxnSpPr>
-            <a:stCxn id="652237755" idx="3"/>
-            <a:endCxn id="1279569497" idx="1"/>
+            <a:stCxn id="1084796001" idx="3"/>
+            <a:endCxn id="159929188" idx="1"/>
           </p:cNvCxnSpPr>
           <p:nvPr/>
         </p:nvCxnSpPr>
@@ -6920,15 +7238,15 @@
       </p:cxnSp>
       <p:cxnSp>
         <p:nvCxnSpPr>
-          <p:cNvPr id="1898413396" name=""/>
+          <p:cNvPr id="425956064" name=""/>
           <p:cNvCxnSpPr>
-            <a:stCxn id="2031861097" idx="2"/>
-            <a:endCxn id="1279569497" idx="1"/>
+            <a:stCxn id="1888988122" idx="2"/>
+            <a:endCxn id="159929188" idx="1"/>
           </p:cNvCxnSpPr>
           <p:nvPr/>
         </p:nvCxnSpPr>
         <p:spPr bwMode="auto">
-          <a:xfrm rot="5399943" flipH="0" flipV="1">
+          <a:xfrm rot="5399942" flipH="0" flipV="1">
             <a:off x="2939050" y="2966879"/>
             <a:ext cx="1045734" cy="4814046"/>
           </a:xfrm>
@@ -6964,15 +7282,15 @@
       </p:cxnSp>
       <p:cxnSp>
         <p:nvCxnSpPr>
-          <p:cNvPr id="611472172" name=""/>
+          <p:cNvPr id="525619050" name=""/>
           <p:cNvCxnSpPr>
-            <a:stCxn id="1113766570" idx="1"/>
-            <a:endCxn id="520749008" idx="3"/>
+            <a:stCxn id="982562846" idx="1"/>
+            <a:endCxn id="2021581954" idx="3"/>
           </p:cNvCxnSpPr>
           <p:nvPr/>
         </p:nvCxnSpPr>
         <p:spPr bwMode="auto">
-          <a:xfrm rot="10799956" flipH="0" flipV="0">
+          <a:xfrm rot="10799954" flipH="0" flipV="0">
             <a:off x="5902238" y="2212816"/>
             <a:ext cx="2540720" cy="2041587"/>
           </a:xfrm>
@@ -7011,12 +7329,12 @@
       </p:cxnSp>
       <p:sp>
         <p:nvSpPr>
-          <p:cNvPr id="1161018128" name=""/>
+          <p:cNvPr id="1025056842" name=""/>
           <p:cNvSpPr txBox="1"/>
           <p:nvPr/>
         </p:nvSpPr>
         <p:spPr bwMode="auto">
-          <a:xfrm rot="2294180" flipH="0" flipV="0">
+          <a:xfrm rot="2294179" flipH="0" flipV="0">
             <a:off x="6618534" y="2912112"/>
             <a:ext cx="1429285" cy="366118"/>
           </a:xfrm>
@@ -7043,15 +7361,15 @@
       </p:sp>
       <p:cxnSp>
         <p:nvCxnSpPr>
-          <p:cNvPr id="1287973462" name=""/>
+          <p:cNvPr id="1914021133" name=""/>
           <p:cNvCxnSpPr>
-            <a:stCxn id="520749008" idx="1"/>
-            <a:endCxn id="1938131776" idx="0"/>
+            <a:stCxn id="2021581954" idx="1"/>
+            <a:endCxn id="2128656028" idx="0"/>
           </p:cNvCxnSpPr>
           <p:nvPr/>
         </p:nvCxnSpPr>
         <p:spPr bwMode="auto">
-          <a:xfrm rot="10799956" flipH="0" flipV="1">
+          <a:xfrm rot="10799954" flipH="0" flipV="1">
             <a:off x="2917629" y="2212816"/>
             <a:ext cx="1082376" cy="1638632"/>
           </a:xfrm>
@@ -7090,12 +7408,12 @@
       </p:cxnSp>
       <p:sp>
         <p:nvSpPr>
-          <p:cNvPr id="967619984" name=""/>
+          <p:cNvPr id="1408480899" name=""/>
           <p:cNvSpPr txBox="1"/>
           <p:nvPr/>
         </p:nvSpPr>
         <p:spPr bwMode="auto">
-          <a:xfrm rot="4379276" flipH="0" flipV="0">
+          <a:xfrm rot="4379275" flipH="0" flipV="0">
             <a:off x="5852769" y="3714340"/>
             <a:ext cx="1555251" cy="365758"/>
           </a:xfrm>
@@ -7122,7 +7440,7 @@
       </p:sp>
       <p:sp>
         <p:nvSpPr>
-          <p:cNvPr id="528219502" name=""/>
+          <p:cNvPr id="696007995" name=""/>
           <p:cNvSpPr/>
           <p:nvPr/>
         </p:nvSpPr>
@@ -7289,7 +7607,7 @@
       </p:sp>
       <p:sp>
         <p:nvSpPr>
-          <p:cNvPr id="666911365" name=""/>
+          <p:cNvPr id="250599523" name=""/>
           <p:cNvSpPr/>
           <p:nvPr/>
         </p:nvSpPr>
@@ -7456,10 +7774,10 @@
       </p:sp>
       <p:cxnSp>
         <p:nvCxnSpPr>
-          <p:cNvPr id="265269556" name=""/>
+          <p:cNvPr id="2045415339" name=""/>
           <p:cNvCxnSpPr>
-            <a:stCxn id="1113766570" idx="3"/>
-            <a:endCxn id="666911365" idx="1"/>
+            <a:stCxn id="982562846" idx="3"/>
+            <a:endCxn id="250599523" idx="1"/>
           </p:cNvCxnSpPr>
           <p:nvPr/>
         </p:nvCxnSpPr>
@@ -7500,10 +7818,10 @@
       </p:cxnSp>
       <p:cxnSp>
         <p:nvCxnSpPr>
-          <p:cNvPr id="1769903166" name=""/>
+          <p:cNvPr id="1168448175" name=""/>
           <p:cNvCxnSpPr>
-            <a:stCxn id="1113766570" idx="3"/>
-            <a:endCxn id="528219502" idx="1"/>
+            <a:stCxn id="982562846" idx="3"/>
+            <a:endCxn id="696007995" idx="1"/>
           </p:cNvCxnSpPr>
           <p:nvPr/>
         </p:nvCxnSpPr>
@@ -7577,7 +7895,7 @@
       </p:grpSpPr>
       <p:sp>
         <p:nvSpPr>
-          <p:cNvPr id="972270815" name=""/>
+          <p:cNvPr id="1478918025" name=""/>
           <p:cNvSpPr/>
           <p:nvPr/>
         </p:nvSpPr>
@@ -7672,7 +7990,7 @@
       </p:sp>
       <p:sp>
         <p:nvSpPr>
-          <p:cNvPr id="699313828" name="Título 1"/>
+          <p:cNvPr id="226491601" name="Título 1"/>
           <p:cNvSpPr>
             <a:spLocks noGrp="1"/>
           </p:cNvSpPr>
@@ -7718,7 +8036,7 @@
       </p:sp>
       <p:sp>
         <p:nvSpPr>
-          <p:cNvPr id="150304252" name=""/>
+          <p:cNvPr id="211951224" name=""/>
           <p:cNvSpPr/>
           <p:nvPr/>
         </p:nvSpPr>
@@ -7827,7 +8145,7 @@
       </p:sp>
       <p:sp>
         <p:nvSpPr>
-          <p:cNvPr id="1755451110" name=""/>
+          <p:cNvPr id="1779168902" name=""/>
           <p:cNvSpPr/>
           <p:nvPr/>
         </p:nvSpPr>
@@ -8106,7 +8424,7 @@
       </p:sp>
       <p:sp>
         <p:nvSpPr>
-          <p:cNvPr id="993119708" name=""/>
+          <p:cNvPr id="411018336" name=""/>
           <p:cNvSpPr/>
           <p:nvPr/>
         </p:nvSpPr>
@@ -8201,7 +8519,7 @@
       </p:sp>
       <p:sp>
         <p:nvSpPr>
-          <p:cNvPr id="231327988" name=""/>
+          <p:cNvPr id="1858074718" name=""/>
           <p:cNvSpPr/>
           <p:nvPr/>
         </p:nvSpPr>
@@ -8396,10 +8714,10 @@
       </p:sp>
       <p:cxnSp>
         <p:nvCxnSpPr>
-          <p:cNvPr id="495691564" name=""/>
+          <p:cNvPr id="1867844537" name=""/>
           <p:cNvCxnSpPr>
-            <a:stCxn id="150304252" idx="3"/>
-            <a:endCxn id="1755451110" idx="1"/>
+            <a:stCxn id="211951224" idx="3"/>
+            <a:endCxn id="1779168902" idx="1"/>
           </p:cNvCxnSpPr>
           <p:nvPr/>
         </p:nvCxnSpPr>
@@ -8443,10 +8761,10 @@
       </p:cxnSp>
       <p:cxnSp>
         <p:nvCxnSpPr>
-          <p:cNvPr id="2097128085" name=""/>
+          <p:cNvPr id="840269748" name=""/>
           <p:cNvCxnSpPr>
-            <a:stCxn id="231327988" idx="0"/>
-            <a:endCxn id="1755451110" idx="3"/>
+            <a:stCxn id="1858074718" idx="0"/>
+            <a:endCxn id="1779168902" idx="3"/>
           </p:cNvCxnSpPr>
           <p:nvPr/>
         </p:nvCxnSpPr>
@@ -8490,10 +8808,10 @@
       </p:cxnSp>
       <p:cxnSp>
         <p:nvCxnSpPr>
-          <p:cNvPr id="193217881" name=""/>
+          <p:cNvPr id="1251056429" name=""/>
           <p:cNvCxnSpPr>
-            <a:stCxn id="972270815" idx="0"/>
-            <a:endCxn id="1755451110" idx="2"/>
+            <a:stCxn id="1478918025" idx="0"/>
+            <a:endCxn id="1779168902" idx="2"/>
           </p:cNvCxnSpPr>
           <p:nvPr/>
         </p:nvCxnSpPr>
@@ -8537,7 +8855,7 @@
       </p:cxnSp>
       <p:sp>
         <p:nvSpPr>
-          <p:cNvPr id="1461932743" name=""/>
+          <p:cNvPr id="998150284" name=""/>
           <p:cNvSpPr/>
           <p:nvPr/>
         </p:nvSpPr>
@@ -8704,10 +9022,10 @@
       </p:sp>
       <p:cxnSp>
         <p:nvCxnSpPr>
-          <p:cNvPr id="1541545770" name=""/>
+          <p:cNvPr id="355135210" name=""/>
           <p:cNvCxnSpPr>
-            <a:stCxn id="231327988" idx="3"/>
-            <a:endCxn id="1461932743" idx="1"/>
+            <a:stCxn id="1858074718" idx="3"/>
+            <a:endCxn id="998150284" idx="1"/>
           </p:cNvCxnSpPr>
           <p:nvPr/>
         </p:nvCxnSpPr>
@@ -8748,10 +9066,10 @@
       </p:cxnSp>
       <p:cxnSp>
         <p:nvCxnSpPr>
-          <p:cNvPr id="1884605674" name=""/>
+          <p:cNvPr id="605449172" name=""/>
           <p:cNvCxnSpPr>
-            <a:stCxn id="231327988" idx="1"/>
-            <a:endCxn id="201668146" idx="3"/>
+            <a:stCxn id="1858074718" idx="1"/>
+            <a:endCxn id="328520043" idx="3"/>
           </p:cNvCxnSpPr>
           <p:nvPr/>
         </p:nvCxnSpPr>
@@ -8792,10 +9110,10 @@
       </p:cxnSp>
       <p:cxnSp>
         <p:nvCxnSpPr>
-          <p:cNvPr id="937375480" name=""/>
+          <p:cNvPr id="40959668" name=""/>
           <p:cNvCxnSpPr>
-            <a:stCxn id="993119708" idx="3"/>
-            <a:endCxn id="231327988" idx="1"/>
+            <a:stCxn id="411018336" idx="3"/>
+            <a:endCxn id="1858074718" idx="1"/>
           </p:cNvCxnSpPr>
           <p:nvPr/>
         </p:nvCxnSpPr>
@@ -8836,7 +9154,7 @@
       </p:cxnSp>
       <p:sp>
         <p:nvSpPr>
-          <p:cNvPr id="201668146" name=""/>
+          <p:cNvPr id="328520043" name=""/>
           <p:cNvSpPr/>
           <p:nvPr/>
         </p:nvSpPr>
@@ -8945,10 +9263,10 @@
       </p:sp>
       <p:cxnSp>
         <p:nvCxnSpPr>
-          <p:cNvPr id="292663514" name=""/>
+          <p:cNvPr id="1020827882" name=""/>
           <p:cNvCxnSpPr>
-            <a:stCxn id="150304252" idx="2"/>
-            <a:endCxn id="231327988" idx="1"/>
+            <a:stCxn id="211951224" idx="2"/>
+            <a:endCxn id="1858074718" idx="1"/>
           </p:cNvCxnSpPr>
           <p:nvPr/>
         </p:nvCxnSpPr>

</xml_diff>